<commit_message>
INF 301 - Module 2 - Git
</commit_message>
<xml_diff>
--- a/assets/courses/INF301-EngineeringToolsInSoftwareDevelopment/Module2-Git/assets/slides/Slide.pptx
+++ b/assets/courses/INF301-EngineeringToolsInSoftwareDevelopment/Module2-Git/assets/slides/Slide.pptx
@@ -6,6 +6,13 @@
   </p:sldMasterIdLst>
   <p:sldIdLst>
     <p:sldId id="256" r:id="rId5"/>
+    <p:sldId id="258" r:id="rId6"/>
+    <p:sldId id="260" r:id="rId7"/>
+    <p:sldId id="257" r:id="rId8"/>
+    <p:sldId id="261" r:id="rId9"/>
+    <p:sldId id="263" r:id="rId10"/>
+    <p:sldId id="264" r:id="rId11"/>
+    <p:sldId id="259" r:id="rId12"/>
   </p:sldIdLst>
   <p:sldSz cx="12192000" cy="6858000"/>
   <p:notesSz cx="6858000" cy="9144000"/>
@@ -104,13 +111,18 @@
       </a:defRPr>
     </a:lvl9pPr>
   </p:defaultTextStyle>
+  <p:extLst>
+    <p:ext uri="{EFAFB233-063F-42B5-8137-9DF3F51BA10A}">
+      <p15:sldGuideLst xmlns:p15="http://schemas.microsoft.com/office/powerpoint/2012/main"/>
+    </p:ext>
+  </p:extLst>
 </p:presentation>
 </file>
 
 <file path=ppt/revisionInfo.xml><?xml version="1.0" encoding="utf-8"?>
 <p1510:revInfo xmlns:a="http://schemas.openxmlformats.org/drawingml/2006/main" xmlns:r="http://schemas.openxmlformats.org/officeDocument/2006/relationships" xmlns:p1510="http://schemas.microsoft.com/office/powerpoint/2015/10/main">
   <p1510:revLst>
-    <p1510:client id="{51DED03C-BB6F-49A2-B443-0FC1DDC50DED}" v="536" dt="2019-11-11T21:21:23.837"/>
+    <p1510:client id="{51DED03C-BB6F-49A2-B443-0FC1DDC50DED}" v="630" dt="2019-11-11T23:49:37.933"/>
   </p1510:revLst>
 </p1510:revInfo>
 </file>
@@ -119,17 +131,25 @@
 <pc:chgInfo xmlns:a="http://schemas.openxmlformats.org/drawingml/2006/main" xmlns:r="http://schemas.openxmlformats.org/officeDocument/2006/relationships" xmlns:ac="http://schemas.microsoft.com/office/drawing/2013/main/command" xmlns:pc="http://schemas.microsoft.com/office/powerpoint/2013/main/command">
   <pc:docChgLst>
     <pc:chgData name="Nhut DOAN NGUYEN" userId="d7212ade-34df-43ef-b0a5-cb321af945d9" providerId="ADAL" clId="{51DED03C-BB6F-49A2-B443-0FC1DDC50DED}"/>
-    <pc:docChg chg="undo redo custSel modSld">
-      <pc:chgData name="Nhut DOAN NGUYEN" userId="d7212ade-34df-43ef-b0a5-cb321af945d9" providerId="ADAL" clId="{51DED03C-BB6F-49A2-B443-0FC1DDC50DED}" dt="2019-11-11T21:21:23.837" v="535" actId="20577"/>
+    <pc:docChg chg="undo redo custSel addSld delSld modSld">
+      <pc:chgData name="Nhut DOAN NGUYEN" userId="d7212ade-34df-43ef-b0a5-cb321af945d9" providerId="ADAL" clId="{51DED03C-BB6F-49A2-B443-0FC1DDC50DED}" dt="2019-11-11T23:49:37.933" v="629" actId="478"/>
       <pc:docMkLst>
         <pc:docMk/>
       </pc:docMkLst>
       <pc:sldChg chg="addSp delSp modSp">
-        <pc:chgData name="Nhut DOAN NGUYEN" userId="d7212ade-34df-43ef-b0a5-cb321af945d9" providerId="ADAL" clId="{51DED03C-BB6F-49A2-B443-0FC1DDC50DED}" dt="2019-11-11T21:21:23.837" v="535" actId="20577"/>
+        <pc:chgData name="Nhut DOAN NGUYEN" userId="d7212ade-34df-43ef-b0a5-cb321af945d9" providerId="ADAL" clId="{51DED03C-BB6F-49A2-B443-0FC1DDC50DED}" dt="2019-11-11T22:44:47.015" v="537"/>
         <pc:sldMkLst>
           <pc:docMk/>
           <pc:sldMk cId="1590397713" sldId="256"/>
         </pc:sldMkLst>
+        <pc:spChg chg="add del">
+          <ac:chgData name="Nhut DOAN NGUYEN" userId="d7212ade-34df-43ef-b0a5-cb321af945d9" providerId="ADAL" clId="{51DED03C-BB6F-49A2-B443-0FC1DDC50DED}" dt="2019-11-11T22:44:47.015" v="537"/>
+          <ac:spMkLst>
+            <pc:docMk/>
+            <pc:sldMk cId="1590397713" sldId="256"/>
+            <ac:spMk id="2" creationId="{C61FF153-34E7-40E5-89E2-23283BCF3EDA}"/>
+          </ac:spMkLst>
+        </pc:spChg>
         <pc:spChg chg="mod">
           <ac:chgData name="Nhut DOAN NGUYEN" userId="d7212ade-34df-43ef-b0a5-cb321af945d9" providerId="ADAL" clId="{51DED03C-BB6F-49A2-B443-0FC1DDC50DED}" dt="2019-11-11T20:58:19.883" v="90" actId="13822"/>
           <ac:spMkLst>
@@ -543,6 +563,2238 @@
           <ac:cxnSpMkLst>
             <pc:docMk/>
             <pc:sldMk cId="1590397713" sldId="256"/>
+            <ac:cxnSpMk id="54" creationId="{EEA28B46-16E8-4A0E-848B-F682B64CE995}"/>
+          </ac:cxnSpMkLst>
+        </pc:cxnChg>
+      </pc:sldChg>
+      <pc:sldChg chg="addSp delSp modSp add">
+        <pc:chgData name="Nhut DOAN NGUYEN" userId="d7212ade-34df-43ef-b0a5-cb321af945d9" providerId="ADAL" clId="{51DED03C-BB6F-49A2-B443-0FC1DDC50DED}" dt="2019-11-11T22:48:10.602" v="583" actId="478"/>
+        <pc:sldMkLst>
+          <pc:docMk/>
+          <pc:sldMk cId="4063598463" sldId="257"/>
+        </pc:sldMkLst>
+        <pc:spChg chg="add del">
+          <ac:chgData name="Nhut DOAN NGUYEN" userId="d7212ade-34df-43ef-b0a5-cb321af945d9" providerId="ADAL" clId="{51DED03C-BB6F-49A2-B443-0FC1DDC50DED}" dt="2019-11-11T22:48:10.602" v="583" actId="478"/>
+          <ac:spMkLst>
+            <pc:docMk/>
+            <pc:sldMk cId="4063598463" sldId="257"/>
+            <ac:spMk id="4" creationId="{F697C020-4794-47E4-B14F-D062237DA5BC}"/>
+          </ac:spMkLst>
+        </pc:spChg>
+        <pc:spChg chg="add del mod">
+          <ac:chgData name="Nhut DOAN NGUYEN" userId="d7212ade-34df-43ef-b0a5-cb321af945d9" providerId="ADAL" clId="{51DED03C-BB6F-49A2-B443-0FC1DDC50DED}" dt="2019-11-11T22:48:07.423" v="581" actId="20577"/>
+          <ac:spMkLst>
+            <pc:docMk/>
+            <pc:sldMk cId="4063598463" sldId="257"/>
+            <ac:spMk id="5" creationId="{6746CAAB-D3C5-4C1A-9C3F-3DBB89E5C95B}"/>
+          </ac:spMkLst>
+        </pc:spChg>
+        <pc:spChg chg="del">
+          <ac:chgData name="Nhut DOAN NGUYEN" userId="d7212ade-34df-43ef-b0a5-cb321af945d9" providerId="ADAL" clId="{51DED03C-BB6F-49A2-B443-0FC1DDC50DED}" dt="2019-11-11T22:44:56.376" v="539" actId="478"/>
+          <ac:spMkLst>
+            <pc:docMk/>
+            <pc:sldMk cId="4063598463" sldId="257"/>
+            <ac:spMk id="7" creationId="{EA89A71D-2FE3-4A36-B820-3508994A7EC3}"/>
+          </ac:spMkLst>
+        </pc:spChg>
+        <pc:spChg chg="add del">
+          <ac:chgData name="Nhut DOAN NGUYEN" userId="d7212ade-34df-43ef-b0a5-cb321af945d9" providerId="ADAL" clId="{51DED03C-BB6F-49A2-B443-0FC1DDC50DED}" dt="2019-11-11T22:45:59.920" v="554" actId="478"/>
+          <ac:spMkLst>
+            <pc:docMk/>
+            <pc:sldMk cId="4063598463" sldId="257"/>
+            <ac:spMk id="8" creationId="{04ECF46D-C76B-4D43-A1AC-A21ADA02A34D}"/>
+          </ac:spMkLst>
+        </pc:spChg>
+        <pc:spChg chg="del">
+          <ac:chgData name="Nhut DOAN NGUYEN" userId="d7212ade-34df-43ef-b0a5-cb321af945d9" providerId="ADAL" clId="{51DED03C-BB6F-49A2-B443-0FC1DDC50DED}" dt="2019-11-11T22:44:56.376" v="539" actId="478"/>
+          <ac:spMkLst>
+            <pc:docMk/>
+            <pc:sldMk cId="4063598463" sldId="257"/>
+            <ac:spMk id="9" creationId="{29680307-A9F2-4402-B9FD-23DA3BC5544A}"/>
+          </ac:spMkLst>
+        </pc:spChg>
+        <pc:spChg chg="del">
+          <ac:chgData name="Nhut DOAN NGUYEN" userId="d7212ade-34df-43ef-b0a5-cb321af945d9" providerId="ADAL" clId="{51DED03C-BB6F-49A2-B443-0FC1DDC50DED}" dt="2019-11-11T22:44:56.376" v="539" actId="478"/>
+          <ac:spMkLst>
+            <pc:docMk/>
+            <pc:sldMk cId="4063598463" sldId="257"/>
+            <ac:spMk id="10" creationId="{FF83EDEB-EEE1-41C4-9756-CD597487D99B}"/>
+          </ac:spMkLst>
+        </pc:spChg>
+        <pc:spChg chg="add del">
+          <ac:chgData name="Nhut DOAN NGUYEN" userId="d7212ade-34df-43ef-b0a5-cb321af945d9" providerId="ADAL" clId="{51DED03C-BB6F-49A2-B443-0FC1DDC50DED}" dt="2019-11-11T22:45:59.920" v="554" actId="478"/>
+          <ac:spMkLst>
+            <pc:docMk/>
+            <pc:sldMk cId="4063598463" sldId="257"/>
+            <ac:spMk id="11" creationId="{ED525DFF-504A-4070-94F5-463213F78CBB}"/>
+          </ac:spMkLst>
+        </pc:spChg>
+        <pc:spChg chg="del">
+          <ac:chgData name="Nhut DOAN NGUYEN" userId="d7212ade-34df-43ef-b0a5-cb321af945d9" providerId="ADAL" clId="{51DED03C-BB6F-49A2-B443-0FC1DDC50DED}" dt="2019-11-11T22:44:56.376" v="539" actId="478"/>
+          <ac:spMkLst>
+            <pc:docMk/>
+            <pc:sldMk cId="4063598463" sldId="257"/>
+            <ac:spMk id="12" creationId="{8C9AB467-55CA-4EEF-9363-22CE9EBABB8E}"/>
+          </ac:spMkLst>
+        </pc:spChg>
+        <pc:spChg chg="del">
+          <ac:chgData name="Nhut DOAN NGUYEN" userId="d7212ade-34df-43ef-b0a5-cb321af945d9" providerId="ADAL" clId="{51DED03C-BB6F-49A2-B443-0FC1DDC50DED}" dt="2019-11-11T22:44:56.376" v="539" actId="478"/>
+          <ac:spMkLst>
+            <pc:docMk/>
+            <pc:sldMk cId="4063598463" sldId="257"/>
+            <ac:spMk id="14" creationId="{577D9363-6DC6-45C5-9712-A8623B11DD83}"/>
+          </ac:spMkLst>
+        </pc:spChg>
+        <pc:spChg chg="add del">
+          <ac:chgData name="Nhut DOAN NGUYEN" userId="d7212ade-34df-43ef-b0a5-cb321af945d9" providerId="ADAL" clId="{51DED03C-BB6F-49A2-B443-0FC1DDC50DED}" dt="2019-11-11T22:46:31.404" v="555" actId="478"/>
+          <ac:spMkLst>
+            <pc:docMk/>
+            <pc:sldMk cId="4063598463" sldId="257"/>
+            <ac:spMk id="43" creationId="{F1560C9A-6DA2-4B77-A23B-C8D3527EABA5}"/>
+          </ac:spMkLst>
+        </pc:spChg>
+        <pc:spChg chg="add del">
+          <ac:chgData name="Nhut DOAN NGUYEN" userId="d7212ade-34df-43ef-b0a5-cb321af945d9" providerId="ADAL" clId="{51DED03C-BB6F-49A2-B443-0FC1DDC50DED}" dt="2019-11-11T22:48:05.153" v="577"/>
+          <ac:spMkLst>
+            <pc:docMk/>
+            <pc:sldMk cId="4063598463" sldId="257"/>
+            <ac:spMk id="45" creationId="{9B75B604-C522-4EB2-B11B-F7297AFDFE87}"/>
+          </ac:spMkLst>
+        </pc:spChg>
+        <pc:spChg chg="del">
+          <ac:chgData name="Nhut DOAN NGUYEN" userId="d7212ade-34df-43ef-b0a5-cb321af945d9" providerId="ADAL" clId="{51DED03C-BB6F-49A2-B443-0FC1DDC50DED}" dt="2019-11-11T22:44:56.376" v="539" actId="478"/>
+          <ac:spMkLst>
+            <pc:docMk/>
+            <pc:sldMk cId="4063598463" sldId="257"/>
+            <ac:spMk id="55" creationId="{A24E4A53-116A-4B05-931E-25E6DA986428}"/>
+          </ac:spMkLst>
+        </pc:spChg>
+        <pc:spChg chg="del">
+          <ac:chgData name="Nhut DOAN NGUYEN" userId="d7212ade-34df-43ef-b0a5-cb321af945d9" providerId="ADAL" clId="{51DED03C-BB6F-49A2-B443-0FC1DDC50DED}" dt="2019-11-11T22:44:56.376" v="539" actId="478"/>
+          <ac:spMkLst>
+            <pc:docMk/>
+            <pc:sldMk cId="4063598463" sldId="257"/>
+            <ac:spMk id="56" creationId="{D98C9F07-B468-48B8-A2EC-CB4AA3433007}"/>
+          </ac:spMkLst>
+        </pc:spChg>
+        <pc:spChg chg="del">
+          <ac:chgData name="Nhut DOAN NGUYEN" userId="d7212ade-34df-43ef-b0a5-cb321af945d9" providerId="ADAL" clId="{51DED03C-BB6F-49A2-B443-0FC1DDC50DED}" dt="2019-11-11T22:44:56.376" v="539" actId="478"/>
+          <ac:spMkLst>
+            <pc:docMk/>
+            <pc:sldMk cId="4063598463" sldId="257"/>
+            <ac:spMk id="57" creationId="{BE9A953B-4140-4D55-AA29-8EAA3E6EAC19}"/>
+          </ac:spMkLst>
+        </pc:spChg>
+        <pc:spChg chg="del">
+          <ac:chgData name="Nhut DOAN NGUYEN" userId="d7212ade-34df-43ef-b0a5-cb321af945d9" providerId="ADAL" clId="{51DED03C-BB6F-49A2-B443-0FC1DDC50DED}" dt="2019-11-11T22:45:11.660" v="542" actId="478"/>
+          <ac:spMkLst>
+            <pc:docMk/>
+            <pc:sldMk cId="4063598463" sldId="257"/>
+            <ac:spMk id="58" creationId="{8CEF25F8-000F-4664-BD3A-6C5DECBD41A7}"/>
+          </ac:spMkLst>
+        </pc:spChg>
+        <pc:spChg chg="del">
+          <ac:chgData name="Nhut DOAN NGUYEN" userId="d7212ade-34df-43ef-b0a5-cb321af945d9" providerId="ADAL" clId="{51DED03C-BB6F-49A2-B443-0FC1DDC50DED}" dt="2019-11-11T22:44:56.376" v="539" actId="478"/>
+          <ac:spMkLst>
+            <pc:docMk/>
+            <pc:sldMk cId="4063598463" sldId="257"/>
+            <ac:spMk id="66" creationId="{F3CCD863-4E7C-4D17-BEFE-A65DDFB8F83D}"/>
+          </ac:spMkLst>
+        </pc:spChg>
+        <pc:spChg chg="del">
+          <ac:chgData name="Nhut DOAN NGUYEN" userId="d7212ade-34df-43ef-b0a5-cb321af945d9" providerId="ADAL" clId="{51DED03C-BB6F-49A2-B443-0FC1DDC50DED}" dt="2019-11-11T22:44:56.376" v="539" actId="478"/>
+          <ac:spMkLst>
+            <pc:docMk/>
+            <pc:sldMk cId="4063598463" sldId="257"/>
+            <ac:spMk id="67" creationId="{8990D107-3C45-438C-9E5F-FC91985ABA79}"/>
+          </ac:spMkLst>
+        </pc:spChg>
+        <pc:spChg chg="del">
+          <ac:chgData name="Nhut DOAN NGUYEN" userId="d7212ade-34df-43ef-b0a5-cb321af945d9" providerId="ADAL" clId="{51DED03C-BB6F-49A2-B443-0FC1DDC50DED}" dt="2019-11-11T22:44:56.376" v="539" actId="478"/>
+          <ac:spMkLst>
+            <pc:docMk/>
+            <pc:sldMk cId="4063598463" sldId="257"/>
+            <ac:spMk id="69" creationId="{CCF4AD14-7522-4FDC-9A66-DF9A4812E745}"/>
+          </ac:spMkLst>
+        </pc:spChg>
+        <pc:spChg chg="del">
+          <ac:chgData name="Nhut DOAN NGUYEN" userId="d7212ade-34df-43ef-b0a5-cb321af945d9" providerId="ADAL" clId="{51DED03C-BB6F-49A2-B443-0FC1DDC50DED}" dt="2019-11-11T22:44:56.376" v="539" actId="478"/>
+          <ac:spMkLst>
+            <pc:docMk/>
+            <pc:sldMk cId="4063598463" sldId="257"/>
+            <ac:spMk id="70" creationId="{BFE1B509-7AE7-4AFF-8DE3-7810CF89A8D4}"/>
+          </ac:spMkLst>
+        </pc:spChg>
+        <pc:spChg chg="del">
+          <ac:chgData name="Nhut DOAN NGUYEN" userId="d7212ade-34df-43ef-b0a5-cb321af945d9" providerId="ADAL" clId="{51DED03C-BB6F-49A2-B443-0FC1DDC50DED}" dt="2019-11-11T22:44:56.376" v="539" actId="478"/>
+          <ac:spMkLst>
+            <pc:docMk/>
+            <pc:sldMk cId="4063598463" sldId="257"/>
+            <ac:spMk id="73" creationId="{443F4DC3-BB07-4A15-997E-36D2C9A663CB}"/>
+          </ac:spMkLst>
+        </pc:spChg>
+        <pc:spChg chg="add del">
+          <ac:chgData name="Nhut DOAN NGUYEN" userId="d7212ade-34df-43ef-b0a5-cb321af945d9" providerId="ADAL" clId="{51DED03C-BB6F-49A2-B443-0FC1DDC50DED}" dt="2019-11-11T22:45:59.920" v="554" actId="478"/>
+          <ac:spMkLst>
+            <pc:docMk/>
+            <pc:sldMk cId="4063598463" sldId="257"/>
+            <ac:spMk id="74" creationId="{21DC3087-8AB3-4078-AB9F-694E8C3C4DC1}"/>
+          </ac:spMkLst>
+        </pc:spChg>
+        <pc:spChg chg="add del">
+          <ac:chgData name="Nhut DOAN NGUYEN" userId="d7212ade-34df-43ef-b0a5-cb321af945d9" providerId="ADAL" clId="{51DED03C-BB6F-49A2-B443-0FC1DDC50DED}" dt="2019-11-11T22:45:59.920" v="554" actId="478"/>
+          <ac:spMkLst>
+            <pc:docMk/>
+            <pc:sldMk cId="4063598463" sldId="257"/>
+            <ac:spMk id="75" creationId="{7FD7AE9E-A357-4388-A42A-3C97CC57DFEA}"/>
+          </ac:spMkLst>
+        </pc:spChg>
+        <pc:spChg chg="add del">
+          <ac:chgData name="Nhut DOAN NGUYEN" userId="d7212ade-34df-43ef-b0a5-cb321af945d9" providerId="ADAL" clId="{51DED03C-BB6F-49A2-B443-0FC1DDC50DED}" dt="2019-11-11T22:45:59.920" v="554" actId="478"/>
+          <ac:spMkLst>
+            <pc:docMk/>
+            <pc:sldMk cId="4063598463" sldId="257"/>
+            <ac:spMk id="76" creationId="{E5C0CD96-8B55-4284-B656-E38771588BEA}"/>
+          </ac:spMkLst>
+        </pc:spChg>
+        <pc:spChg chg="del">
+          <ac:chgData name="Nhut DOAN NGUYEN" userId="d7212ade-34df-43ef-b0a5-cb321af945d9" providerId="ADAL" clId="{51DED03C-BB6F-49A2-B443-0FC1DDC50DED}" dt="2019-11-11T22:44:56.376" v="539" actId="478"/>
+          <ac:spMkLst>
+            <pc:docMk/>
+            <pc:sldMk cId="4063598463" sldId="257"/>
+            <ac:spMk id="78" creationId="{CF6DC8DB-46A6-4165-A360-9116ABA15F2B}"/>
+          </ac:spMkLst>
+        </pc:spChg>
+        <pc:spChg chg="add del">
+          <ac:chgData name="Nhut DOAN NGUYEN" userId="d7212ade-34df-43ef-b0a5-cb321af945d9" providerId="ADAL" clId="{51DED03C-BB6F-49A2-B443-0FC1DDC50DED}" dt="2019-11-11T22:45:59.920" v="554" actId="478"/>
+          <ac:spMkLst>
+            <pc:docMk/>
+            <pc:sldMk cId="4063598463" sldId="257"/>
+            <ac:spMk id="79" creationId="{61F91505-AE21-4E8D-9F65-2F4FC3D5AD56}"/>
+          </ac:spMkLst>
+        </pc:spChg>
+        <pc:spChg chg="del">
+          <ac:chgData name="Nhut DOAN NGUYEN" userId="d7212ade-34df-43ef-b0a5-cb321af945d9" providerId="ADAL" clId="{51DED03C-BB6F-49A2-B443-0FC1DDC50DED}" dt="2019-11-11T22:44:56.376" v="539" actId="478"/>
+          <ac:spMkLst>
+            <pc:docMk/>
+            <pc:sldMk cId="4063598463" sldId="257"/>
+            <ac:spMk id="80" creationId="{0643C5FA-7C93-4EFD-B0D9-C18F58DE5EC0}"/>
+          </ac:spMkLst>
+        </pc:spChg>
+        <pc:spChg chg="del">
+          <ac:chgData name="Nhut DOAN NGUYEN" userId="d7212ade-34df-43ef-b0a5-cb321af945d9" providerId="ADAL" clId="{51DED03C-BB6F-49A2-B443-0FC1DDC50DED}" dt="2019-11-11T22:44:56.376" v="539" actId="478"/>
+          <ac:spMkLst>
+            <pc:docMk/>
+            <pc:sldMk cId="4063598463" sldId="257"/>
+            <ac:spMk id="81" creationId="{2E1E23C0-6EB5-4FA8-A1D4-3573C87A01BE}"/>
+          </ac:spMkLst>
+        </pc:spChg>
+        <pc:cxnChg chg="add del mod">
+          <ac:chgData name="Nhut DOAN NGUYEN" userId="d7212ade-34df-43ef-b0a5-cb321af945d9" providerId="ADAL" clId="{51DED03C-BB6F-49A2-B443-0FC1DDC50DED}" dt="2019-11-11T22:46:32.569" v="556" actId="478"/>
+          <ac:cxnSpMkLst>
+            <pc:docMk/>
+            <pc:sldMk cId="4063598463" sldId="257"/>
+            <ac:cxnSpMk id="16" creationId="{4438300A-2C1E-4714-BFD4-2E5E8E4EA2B6}"/>
+          </ac:cxnSpMkLst>
+        </pc:cxnChg>
+        <pc:cxnChg chg="del">
+          <ac:chgData name="Nhut DOAN NGUYEN" userId="d7212ade-34df-43ef-b0a5-cb321af945d9" providerId="ADAL" clId="{51DED03C-BB6F-49A2-B443-0FC1DDC50DED}" dt="2019-11-11T22:44:59.224" v="540" actId="478"/>
+          <ac:cxnSpMkLst>
+            <pc:docMk/>
+            <pc:sldMk cId="4063598463" sldId="257"/>
+            <ac:cxnSpMk id="18" creationId="{11FD1652-9ED9-43DD-A19A-55069D295275}"/>
+          </ac:cxnSpMkLst>
+        </pc:cxnChg>
+        <pc:cxnChg chg="del mod">
+          <ac:chgData name="Nhut DOAN NGUYEN" userId="d7212ade-34df-43ef-b0a5-cb321af945d9" providerId="ADAL" clId="{51DED03C-BB6F-49A2-B443-0FC1DDC50DED}" dt="2019-11-11T22:44:59.224" v="540" actId="478"/>
+          <ac:cxnSpMkLst>
+            <pc:docMk/>
+            <pc:sldMk cId="4063598463" sldId="257"/>
+            <ac:cxnSpMk id="20" creationId="{D6DCB3F2-50A5-4804-95A8-E80A7E5F5AB3}"/>
+          </ac:cxnSpMkLst>
+        </pc:cxnChg>
+        <pc:cxnChg chg="add del">
+          <ac:chgData name="Nhut DOAN NGUYEN" userId="d7212ade-34df-43ef-b0a5-cb321af945d9" providerId="ADAL" clId="{51DED03C-BB6F-49A2-B443-0FC1DDC50DED}" dt="2019-11-11T22:45:59.277" v="553" actId="478"/>
+          <ac:cxnSpMkLst>
+            <pc:docMk/>
+            <pc:sldMk cId="4063598463" sldId="257"/>
+            <ac:cxnSpMk id="24" creationId="{D062D7D3-6D26-4A3C-BF9A-4FEECD7FAD8E}"/>
+          </ac:cxnSpMkLst>
+        </pc:cxnChg>
+        <pc:cxnChg chg="del">
+          <ac:chgData name="Nhut DOAN NGUYEN" userId="d7212ade-34df-43ef-b0a5-cb321af945d9" providerId="ADAL" clId="{51DED03C-BB6F-49A2-B443-0FC1DDC50DED}" dt="2019-11-11T22:44:59.224" v="540" actId="478"/>
+          <ac:cxnSpMkLst>
+            <pc:docMk/>
+            <pc:sldMk cId="4063598463" sldId="257"/>
+            <ac:cxnSpMk id="26" creationId="{F308478F-E970-41C9-933D-A44F5058D6EE}"/>
+          </ac:cxnSpMkLst>
+        </pc:cxnChg>
+        <pc:cxnChg chg="del">
+          <ac:chgData name="Nhut DOAN NGUYEN" userId="d7212ade-34df-43ef-b0a5-cb321af945d9" providerId="ADAL" clId="{51DED03C-BB6F-49A2-B443-0FC1DDC50DED}" dt="2019-11-11T22:44:59.224" v="540" actId="478"/>
+          <ac:cxnSpMkLst>
+            <pc:docMk/>
+            <pc:sldMk cId="4063598463" sldId="257"/>
+            <ac:cxnSpMk id="28" creationId="{2E01EA5D-3799-4FE9-A15E-691AFAAD8FEB}"/>
+          </ac:cxnSpMkLst>
+        </pc:cxnChg>
+        <pc:cxnChg chg="add del">
+          <ac:chgData name="Nhut DOAN NGUYEN" userId="d7212ade-34df-43ef-b0a5-cb321af945d9" providerId="ADAL" clId="{51DED03C-BB6F-49A2-B443-0FC1DDC50DED}" dt="2019-11-11T22:45:59.920" v="554" actId="478"/>
+          <ac:cxnSpMkLst>
+            <pc:docMk/>
+            <pc:sldMk cId="4063598463" sldId="257"/>
+            <ac:cxnSpMk id="30" creationId="{190B51C5-F37B-4C40-9CAB-A3F6873AAC4E}"/>
+          </ac:cxnSpMkLst>
+        </pc:cxnChg>
+        <pc:cxnChg chg="add del mod">
+          <ac:chgData name="Nhut DOAN NGUYEN" userId="d7212ade-34df-43ef-b0a5-cb321af945d9" providerId="ADAL" clId="{51DED03C-BB6F-49A2-B443-0FC1DDC50DED}" dt="2019-11-11T22:45:59.920" v="554" actId="478"/>
+          <ac:cxnSpMkLst>
+            <pc:docMk/>
+            <pc:sldMk cId="4063598463" sldId="257"/>
+            <ac:cxnSpMk id="32" creationId="{2FAF8528-0D59-48E1-91CE-1C72F174FA27}"/>
+          </ac:cxnSpMkLst>
+        </pc:cxnChg>
+        <pc:cxnChg chg="del mod">
+          <ac:chgData name="Nhut DOAN NGUYEN" userId="d7212ade-34df-43ef-b0a5-cb321af945d9" providerId="ADAL" clId="{51DED03C-BB6F-49A2-B443-0FC1DDC50DED}" dt="2019-11-11T22:44:56.376" v="539" actId="478"/>
+          <ac:cxnSpMkLst>
+            <pc:docMk/>
+            <pc:sldMk cId="4063598463" sldId="257"/>
+            <ac:cxnSpMk id="40" creationId="{4F4BD4E8-52F0-42E6-AD0F-2C340DBEA386}"/>
+          </ac:cxnSpMkLst>
+        </pc:cxnChg>
+        <pc:cxnChg chg="del">
+          <ac:chgData name="Nhut DOAN NGUYEN" userId="d7212ade-34df-43ef-b0a5-cb321af945d9" providerId="ADAL" clId="{51DED03C-BB6F-49A2-B443-0FC1DDC50DED}" dt="2019-11-11T22:44:56.376" v="539" actId="478"/>
+          <ac:cxnSpMkLst>
+            <pc:docMk/>
+            <pc:sldMk cId="4063598463" sldId="257"/>
+            <ac:cxnSpMk id="42" creationId="{228BA909-583C-4327-A629-F80912AB7A83}"/>
+          </ac:cxnSpMkLst>
+        </pc:cxnChg>
+        <pc:cxnChg chg="add del mod">
+          <ac:chgData name="Nhut DOAN NGUYEN" userId="d7212ade-34df-43ef-b0a5-cb321af945d9" providerId="ADAL" clId="{51DED03C-BB6F-49A2-B443-0FC1DDC50DED}" dt="2019-11-11T22:45:59.920" v="554" actId="478"/>
+          <ac:cxnSpMkLst>
+            <pc:docMk/>
+            <pc:sldMk cId="4063598463" sldId="257"/>
+            <ac:cxnSpMk id="44" creationId="{40E6EC3D-9B26-4BF0-9D31-37859FFC2D51}"/>
+          </ac:cxnSpMkLst>
+        </pc:cxnChg>
+        <pc:cxnChg chg="add del">
+          <ac:chgData name="Nhut DOAN NGUYEN" userId="d7212ade-34df-43ef-b0a5-cb321af945d9" providerId="ADAL" clId="{51DED03C-BB6F-49A2-B443-0FC1DDC50DED}" dt="2019-11-11T22:45:59.920" v="554" actId="478"/>
+          <ac:cxnSpMkLst>
+            <pc:docMk/>
+            <pc:sldMk cId="4063598463" sldId="257"/>
+            <ac:cxnSpMk id="46" creationId="{95330A63-B35C-4DB6-A98A-B47B77085D88}"/>
+          </ac:cxnSpMkLst>
+        </pc:cxnChg>
+        <pc:cxnChg chg="del mod">
+          <ac:chgData name="Nhut DOAN NGUYEN" userId="d7212ade-34df-43ef-b0a5-cb321af945d9" providerId="ADAL" clId="{51DED03C-BB6F-49A2-B443-0FC1DDC50DED}" dt="2019-11-11T22:44:56.376" v="539" actId="478"/>
+          <ac:cxnSpMkLst>
+            <pc:docMk/>
+            <pc:sldMk cId="4063598463" sldId="257"/>
+            <ac:cxnSpMk id="48" creationId="{2123147A-306D-4360-B4D1-F2AF513BEEEF}"/>
+          </ac:cxnSpMkLst>
+        </pc:cxnChg>
+        <pc:cxnChg chg="del">
+          <ac:chgData name="Nhut DOAN NGUYEN" userId="d7212ade-34df-43ef-b0a5-cb321af945d9" providerId="ADAL" clId="{51DED03C-BB6F-49A2-B443-0FC1DDC50DED}" dt="2019-11-11T22:44:56.376" v="539" actId="478"/>
+          <ac:cxnSpMkLst>
+            <pc:docMk/>
+            <pc:sldMk cId="4063598463" sldId="257"/>
+            <ac:cxnSpMk id="50" creationId="{19843E4A-054B-4217-B9C4-A89ACCA72B2F}"/>
+          </ac:cxnSpMkLst>
+        </pc:cxnChg>
+        <pc:cxnChg chg="del mod">
+          <ac:chgData name="Nhut DOAN NGUYEN" userId="d7212ade-34df-43ef-b0a5-cb321af945d9" providerId="ADAL" clId="{51DED03C-BB6F-49A2-B443-0FC1DDC50DED}" dt="2019-11-11T22:44:56.376" v="539" actId="478"/>
+          <ac:cxnSpMkLst>
+            <pc:docMk/>
+            <pc:sldMk cId="4063598463" sldId="257"/>
+            <ac:cxnSpMk id="52" creationId="{0CAF88D5-BE1C-4A4C-9A3C-F70B5570AA3A}"/>
+          </ac:cxnSpMkLst>
+        </pc:cxnChg>
+        <pc:cxnChg chg="del">
+          <ac:chgData name="Nhut DOAN NGUYEN" userId="d7212ade-34df-43ef-b0a5-cb321af945d9" providerId="ADAL" clId="{51DED03C-BB6F-49A2-B443-0FC1DDC50DED}" dt="2019-11-11T22:44:56.376" v="539" actId="478"/>
+          <ac:cxnSpMkLst>
+            <pc:docMk/>
+            <pc:sldMk cId="4063598463" sldId="257"/>
+            <ac:cxnSpMk id="54" creationId="{EEA28B46-16E8-4A0E-848B-F682B64CE995}"/>
+          </ac:cxnSpMkLst>
+        </pc:cxnChg>
+      </pc:sldChg>
+      <pc:sldChg chg="delSp modSp add">
+        <pc:chgData name="Nhut DOAN NGUYEN" userId="d7212ade-34df-43ef-b0a5-cb321af945d9" providerId="ADAL" clId="{51DED03C-BB6F-49A2-B443-0FC1DDC50DED}" dt="2019-11-11T22:48:16.989" v="585" actId="478"/>
+        <pc:sldMkLst>
+          <pc:docMk/>
+          <pc:sldMk cId="3173195116" sldId="258"/>
+        </pc:sldMkLst>
+        <pc:spChg chg="del">
+          <ac:chgData name="Nhut DOAN NGUYEN" userId="d7212ade-34df-43ef-b0a5-cb321af945d9" providerId="ADAL" clId="{51DED03C-BB6F-49A2-B443-0FC1DDC50DED}" dt="2019-11-11T22:48:16.989" v="585" actId="478"/>
+          <ac:spMkLst>
+            <pc:docMk/>
+            <pc:sldMk cId="3173195116" sldId="258"/>
+            <ac:spMk id="5" creationId="{6746CAAB-D3C5-4C1A-9C3F-3DBB89E5C95B}"/>
+          </ac:spMkLst>
+        </pc:spChg>
+        <pc:spChg chg="del">
+          <ac:chgData name="Nhut DOAN NGUYEN" userId="d7212ade-34df-43ef-b0a5-cb321af945d9" providerId="ADAL" clId="{51DED03C-BB6F-49A2-B443-0FC1DDC50DED}" dt="2019-11-11T22:48:16.989" v="585" actId="478"/>
+          <ac:spMkLst>
+            <pc:docMk/>
+            <pc:sldMk cId="3173195116" sldId="258"/>
+            <ac:spMk id="7" creationId="{EA89A71D-2FE3-4A36-B820-3508994A7EC3}"/>
+          </ac:spMkLst>
+        </pc:spChg>
+        <pc:spChg chg="del">
+          <ac:chgData name="Nhut DOAN NGUYEN" userId="d7212ade-34df-43ef-b0a5-cb321af945d9" providerId="ADAL" clId="{51DED03C-BB6F-49A2-B443-0FC1DDC50DED}" dt="2019-11-11T22:48:16.989" v="585" actId="478"/>
+          <ac:spMkLst>
+            <pc:docMk/>
+            <pc:sldMk cId="3173195116" sldId="258"/>
+            <ac:spMk id="8" creationId="{04ECF46D-C76B-4D43-A1AC-A21ADA02A34D}"/>
+          </ac:spMkLst>
+        </pc:spChg>
+        <pc:spChg chg="del">
+          <ac:chgData name="Nhut DOAN NGUYEN" userId="d7212ade-34df-43ef-b0a5-cb321af945d9" providerId="ADAL" clId="{51DED03C-BB6F-49A2-B443-0FC1DDC50DED}" dt="2019-11-11T22:48:16.989" v="585" actId="478"/>
+          <ac:spMkLst>
+            <pc:docMk/>
+            <pc:sldMk cId="3173195116" sldId="258"/>
+            <ac:spMk id="9" creationId="{29680307-A9F2-4402-B9FD-23DA3BC5544A}"/>
+          </ac:spMkLst>
+        </pc:spChg>
+        <pc:spChg chg="del">
+          <ac:chgData name="Nhut DOAN NGUYEN" userId="d7212ade-34df-43ef-b0a5-cb321af945d9" providerId="ADAL" clId="{51DED03C-BB6F-49A2-B443-0FC1DDC50DED}" dt="2019-11-11T22:48:16.989" v="585" actId="478"/>
+          <ac:spMkLst>
+            <pc:docMk/>
+            <pc:sldMk cId="3173195116" sldId="258"/>
+            <ac:spMk id="10" creationId="{FF83EDEB-EEE1-41C4-9756-CD597487D99B}"/>
+          </ac:spMkLst>
+        </pc:spChg>
+        <pc:spChg chg="del">
+          <ac:chgData name="Nhut DOAN NGUYEN" userId="d7212ade-34df-43ef-b0a5-cb321af945d9" providerId="ADAL" clId="{51DED03C-BB6F-49A2-B443-0FC1DDC50DED}" dt="2019-11-11T22:48:16.989" v="585" actId="478"/>
+          <ac:spMkLst>
+            <pc:docMk/>
+            <pc:sldMk cId="3173195116" sldId="258"/>
+            <ac:spMk id="11" creationId="{ED525DFF-504A-4070-94F5-463213F78CBB}"/>
+          </ac:spMkLst>
+        </pc:spChg>
+        <pc:spChg chg="del">
+          <ac:chgData name="Nhut DOAN NGUYEN" userId="d7212ade-34df-43ef-b0a5-cb321af945d9" providerId="ADAL" clId="{51DED03C-BB6F-49A2-B443-0FC1DDC50DED}" dt="2019-11-11T22:48:16.989" v="585" actId="478"/>
+          <ac:spMkLst>
+            <pc:docMk/>
+            <pc:sldMk cId="3173195116" sldId="258"/>
+            <ac:spMk id="12" creationId="{8C9AB467-55CA-4EEF-9363-22CE9EBABB8E}"/>
+          </ac:spMkLst>
+        </pc:spChg>
+        <pc:spChg chg="del">
+          <ac:chgData name="Nhut DOAN NGUYEN" userId="d7212ade-34df-43ef-b0a5-cb321af945d9" providerId="ADAL" clId="{51DED03C-BB6F-49A2-B443-0FC1DDC50DED}" dt="2019-11-11T22:48:16.989" v="585" actId="478"/>
+          <ac:spMkLst>
+            <pc:docMk/>
+            <pc:sldMk cId="3173195116" sldId="258"/>
+            <ac:spMk id="14" creationId="{577D9363-6DC6-45C5-9712-A8623B11DD83}"/>
+          </ac:spMkLst>
+        </pc:spChg>
+        <pc:spChg chg="del">
+          <ac:chgData name="Nhut DOAN NGUYEN" userId="d7212ade-34df-43ef-b0a5-cb321af945d9" providerId="ADAL" clId="{51DED03C-BB6F-49A2-B443-0FC1DDC50DED}" dt="2019-11-11T22:48:16.989" v="585" actId="478"/>
+          <ac:spMkLst>
+            <pc:docMk/>
+            <pc:sldMk cId="3173195116" sldId="258"/>
+            <ac:spMk id="55" creationId="{A24E4A53-116A-4B05-931E-25E6DA986428}"/>
+          </ac:spMkLst>
+        </pc:spChg>
+        <pc:spChg chg="del">
+          <ac:chgData name="Nhut DOAN NGUYEN" userId="d7212ade-34df-43ef-b0a5-cb321af945d9" providerId="ADAL" clId="{51DED03C-BB6F-49A2-B443-0FC1DDC50DED}" dt="2019-11-11T22:48:16.989" v="585" actId="478"/>
+          <ac:spMkLst>
+            <pc:docMk/>
+            <pc:sldMk cId="3173195116" sldId="258"/>
+            <ac:spMk id="56" creationId="{D98C9F07-B468-48B8-A2EC-CB4AA3433007}"/>
+          </ac:spMkLst>
+        </pc:spChg>
+        <pc:spChg chg="del">
+          <ac:chgData name="Nhut DOAN NGUYEN" userId="d7212ade-34df-43ef-b0a5-cb321af945d9" providerId="ADAL" clId="{51DED03C-BB6F-49A2-B443-0FC1DDC50DED}" dt="2019-11-11T22:48:16.989" v="585" actId="478"/>
+          <ac:spMkLst>
+            <pc:docMk/>
+            <pc:sldMk cId="3173195116" sldId="258"/>
+            <ac:spMk id="57" creationId="{BE9A953B-4140-4D55-AA29-8EAA3E6EAC19}"/>
+          </ac:spMkLst>
+        </pc:spChg>
+        <pc:spChg chg="del">
+          <ac:chgData name="Nhut DOAN NGUYEN" userId="d7212ade-34df-43ef-b0a5-cb321af945d9" providerId="ADAL" clId="{51DED03C-BB6F-49A2-B443-0FC1DDC50DED}" dt="2019-11-11T22:48:16.989" v="585" actId="478"/>
+          <ac:spMkLst>
+            <pc:docMk/>
+            <pc:sldMk cId="3173195116" sldId="258"/>
+            <ac:spMk id="58" creationId="{8CEF25F8-000F-4664-BD3A-6C5DECBD41A7}"/>
+          </ac:spMkLst>
+        </pc:spChg>
+        <pc:spChg chg="del">
+          <ac:chgData name="Nhut DOAN NGUYEN" userId="d7212ade-34df-43ef-b0a5-cb321af945d9" providerId="ADAL" clId="{51DED03C-BB6F-49A2-B443-0FC1DDC50DED}" dt="2019-11-11T22:48:16.989" v="585" actId="478"/>
+          <ac:spMkLst>
+            <pc:docMk/>
+            <pc:sldMk cId="3173195116" sldId="258"/>
+            <ac:spMk id="66" creationId="{F3CCD863-4E7C-4D17-BEFE-A65DDFB8F83D}"/>
+          </ac:spMkLst>
+        </pc:spChg>
+        <pc:spChg chg="del">
+          <ac:chgData name="Nhut DOAN NGUYEN" userId="d7212ade-34df-43ef-b0a5-cb321af945d9" providerId="ADAL" clId="{51DED03C-BB6F-49A2-B443-0FC1DDC50DED}" dt="2019-11-11T22:48:16.989" v="585" actId="478"/>
+          <ac:spMkLst>
+            <pc:docMk/>
+            <pc:sldMk cId="3173195116" sldId="258"/>
+            <ac:spMk id="67" creationId="{8990D107-3C45-438C-9E5F-FC91985ABA79}"/>
+          </ac:spMkLst>
+        </pc:spChg>
+        <pc:spChg chg="del">
+          <ac:chgData name="Nhut DOAN NGUYEN" userId="d7212ade-34df-43ef-b0a5-cb321af945d9" providerId="ADAL" clId="{51DED03C-BB6F-49A2-B443-0FC1DDC50DED}" dt="2019-11-11T22:48:16.989" v="585" actId="478"/>
+          <ac:spMkLst>
+            <pc:docMk/>
+            <pc:sldMk cId="3173195116" sldId="258"/>
+            <ac:spMk id="69" creationId="{CCF4AD14-7522-4FDC-9A66-DF9A4812E745}"/>
+          </ac:spMkLst>
+        </pc:spChg>
+        <pc:spChg chg="del">
+          <ac:chgData name="Nhut DOAN NGUYEN" userId="d7212ade-34df-43ef-b0a5-cb321af945d9" providerId="ADAL" clId="{51DED03C-BB6F-49A2-B443-0FC1DDC50DED}" dt="2019-11-11T22:48:16.989" v="585" actId="478"/>
+          <ac:spMkLst>
+            <pc:docMk/>
+            <pc:sldMk cId="3173195116" sldId="258"/>
+            <ac:spMk id="70" creationId="{BFE1B509-7AE7-4AFF-8DE3-7810CF89A8D4}"/>
+          </ac:spMkLst>
+        </pc:spChg>
+        <pc:spChg chg="del">
+          <ac:chgData name="Nhut DOAN NGUYEN" userId="d7212ade-34df-43ef-b0a5-cb321af945d9" providerId="ADAL" clId="{51DED03C-BB6F-49A2-B443-0FC1DDC50DED}" dt="2019-11-11T22:48:16.989" v="585" actId="478"/>
+          <ac:spMkLst>
+            <pc:docMk/>
+            <pc:sldMk cId="3173195116" sldId="258"/>
+            <ac:spMk id="73" creationId="{443F4DC3-BB07-4A15-997E-36D2C9A663CB}"/>
+          </ac:spMkLst>
+        </pc:spChg>
+        <pc:spChg chg="del">
+          <ac:chgData name="Nhut DOAN NGUYEN" userId="d7212ade-34df-43ef-b0a5-cb321af945d9" providerId="ADAL" clId="{51DED03C-BB6F-49A2-B443-0FC1DDC50DED}" dt="2019-11-11T22:48:16.989" v="585" actId="478"/>
+          <ac:spMkLst>
+            <pc:docMk/>
+            <pc:sldMk cId="3173195116" sldId="258"/>
+            <ac:spMk id="74" creationId="{21DC3087-8AB3-4078-AB9F-694E8C3C4DC1}"/>
+          </ac:spMkLst>
+        </pc:spChg>
+        <pc:spChg chg="del">
+          <ac:chgData name="Nhut DOAN NGUYEN" userId="d7212ade-34df-43ef-b0a5-cb321af945d9" providerId="ADAL" clId="{51DED03C-BB6F-49A2-B443-0FC1DDC50DED}" dt="2019-11-11T22:48:16.989" v="585" actId="478"/>
+          <ac:spMkLst>
+            <pc:docMk/>
+            <pc:sldMk cId="3173195116" sldId="258"/>
+            <ac:spMk id="75" creationId="{7FD7AE9E-A357-4388-A42A-3C97CC57DFEA}"/>
+          </ac:spMkLst>
+        </pc:spChg>
+        <pc:spChg chg="del">
+          <ac:chgData name="Nhut DOAN NGUYEN" userId="d7212ade-34df-43ef-b0a5-cb321af945d9" providerId="ADAL" clId="{51DED03C-BB6F-49A2-B443-0FC1DDC50DED}" dt="2019-11-11T22:48:16.989" v="585" actId="478"/>
+          <ac:spMkLst>
+            <pc:docMk/>
+            <pc:sldMk cId="3173195116" sldId="258"/>
+            <ac:spMk id="76" creationId="{E5C0CD96-8B55-4284-B656-E38771588BEA}"/>
+          </ac:spMkLst>
+        </pc:spChg>
+        <pc:spChg chg="del">
+          <ac:chgData name="Nhut DOAN NGUYEN" userId="d7212ade-34df-43ef-b0a5-cb321af945d9" providerId="ADAL" clId="{51DED03C-BB6F-49A2-B443-0FC1DDC50DED}" dt="2019-11-11T22:48:16.989" v="585" actId="478"/>
+          <ac:spMkLst>
+            <pc:docMk/>
+            <pc:sldMk cId="3173195116" sldId="258"/>
+            <ac:spMk id="78" creationId="{CF6DC8DB-46A6-4165-A360-9116ABA15F2B}"/>
+          </ac:spMkLst>
+        </pc:spChg>
+        <pc:spChg chg="del">
+          <ac:chgData name="Nhut DOAN NGUYEN" userId="d7212ade-34df-43ef-b0a5-cb321af945d9" providerId="ADAL" clId="{51DED03C-BB6F-49A2-B443-0FC1DDC50DED}" dt="2019-11-11T22:48:16.989" v="585" actId="478"/>
+          <ac:spMkLst>
+            <pc:docMk/>
+            <pc:sldMk cId="3173195116" sldId="258"/>
+            <ac:spMk id="79" creationId="{61F91505-AE21-4E8D-9F65-2F4FC3D5AD56}"/>
+          </ac:spMkLst>
+        </pc:spChg>
+        <pc:spChg chg="del">
+          <ac:chgData name="Nhut DOAN NGUYEN" userId="d7212ade-34df-43ef-b0a5-cb321af945d9" providerId="ADAL" clId="{51DED03C-BB6F-49A2-B443-0FC1DDC50DED}" dt="2019-11-11T22:48:16.989" v="585" actId="478"/>
+          <ac:spMkLst>
+            <pc:docMk/>
+            <pc:sldMk cId="3173195116" sldId="258"/>
+            <ac:spMk id="80" creationId="{0643C5FA-7C93-4EFD-B0D9-C18F58DE5EC0}"/>
+          </ac:spMkLst>
+        </pc:spChg>
+        <pc:spChg chg="del">
+          <ac:chgData name="Nhut DOAN NGUYEN" userId="d7212ade-34df-43ef-b0a5-cb321af945d9" providerId="ADAL" clId="{51DED03C-BB6F-49A2-B443-0FC1DDC50DED}" dt="2019-11-11T22:48:16.989" v="585" actId="478"/>
+          <ac:spMkLst>
+            <pc:docMk/>
+            <pc:sldMk cId="3173195116" sldId="258"/>
+            <ac:spMk id="81" creationId="{2E1E23C0-6EB5-4FA8-A1D4-3573C87A01BE}"/>
+          </ac:spMkLst>
+        </pc:spChg>
+        <pc:cxnChg chg="del mod">
+          <ac:chgData name="Nhut DOAN NGUYEN" userId="d7212ade-34df-43ef-b0a5-cb321af945d9" providerId="ADAL" clId="{51DED03C-BB6F-49A2-B443-0FC1DDC50DED}" dt="2019-11-11T22:48:16.989" v="585" actId="478"/>
+          <ac:cxnSpMkLst>
+            <pc:docMk/>
+            <pc:sldMk cId="3173195116" sldId="258"/>
+            <ac:cxnSpMk id="16" creationId="{4438300A-2C1E-4714-BFD4-2E5E8E4EA2B6}"/>
+          </ac:cxnSpMkLst>
+        </pc:cxnChg>
+        <pc:cxnChg chg="del">
+          <ac:chgData name="Nhut DOAN NGUYEN" userId="d7212ade-34df-43ef-b0a5-cb321af945d9" providerId="ADAL" clId="{51DED03C-BB6F-49A2-B443-0FC1DDC50DED}" dt="2019-11-11T22:48:16.989" v="585" actId="478"/>
+          <ac:cxnSpMkLst>
+            <pc:docMk/>
+            <pc:sldMk cId="3173195116" sldId="258"/>
+            <ac:cxnSpMk id="18" creationId="{11FD1652-9ED9-43DD-A19A-55069D295275}"/>
+          </ac:cxnSpMkLst>
+        </pc:cxnChg>
+        <pc:cxnChg chg="del mod">
+          <ac:chgData name="Nhut DOAN NGUYEN" userId="d7212ade-34df-43ef-b0a5-cb321af945d9" providerId="ADAL" clId="{51DED03C-BB6F-49A2-B443-0FC1DDC50DED}" dt="2019-11-11T22:48:16.989" v="585" actId="478"/>
+          <ac:cxnSpMkLst>
+            <pc:docMk/>
+            <pc:sldMk cId="3173195116" sldId="258"/>
+            <ac:cxnSpMk id="20" creationId="{D6DCB3F2-50A5-4804-95A8-E80A7E5F5AB3}"/>
+          </ac:cxnSpMkLst>
+        </pc:cxnChg>
+        <pc:cxnChg chg="del">
+          <ac:chgData name="Nhut DOAN NGUYEN" userId="d7212ade-34df-43ef-b0a5-cb321af945d9" providerId="ADAL" clId="{51DED03C-BB6F-49A2-B443-0FC1DDC50DED}" dt="2019-11-11T22:48:16.989" v="585" actId="478"/>
+          <ac:cxnSpMkLst>
+            <pc:docMk/>
+            <pc:sldMk cId="3173195116" sldId="258"/>
+            <ac:cxnSpMk id="24" creationId="{D062D7D3-6D26-4A3C-BF9A-4FEECD7FAD8E}"/>
+          </ac:cxnSpMkLst>
+        </pc:cxnChg>
+        <pc:cxnChg chg="del">
+          <ac:chgData name="Nhut DOAN NGUYEN" userId="d7212ade-34df-43ef-b0a5-cb321af945d9" providerId="ADAL" clId="{51DED03C-BB6F-49A2-B443-0FC1DDC50DED}" dt="2019-11-11T22:48:16.989" v="585" actId="478"/>
+          <ac:cxnSpMkLst>
+            <pc:docMk/>
+            <pc:sldMk cId="3173195116" sldId="258"/>
+            <ac:cxnSpMk id="26" creationId="{F308478F-E970-41C9-933D-A44F5058D6EE}"/>
+          </ac:cxnSpMkLst>
+        </pc:cxnChg>
+        <pc:cxnChg chg="del">
+          <ac:chgData name="Nhut DOAN NGUYEN" userId="d7212ade-34df-43ef-b0a5-cb321af945d9" providerId="ADAL" clId="{51DED03C-BB6F-49A2-B443-0FC1DDC50DED}" dt="2019-11-11T22:48:16.989" v="585" actId="478"/>
+          <ac:cxnSpMkLst>
+            <pc:docMk/>
+            <pc:sldMk cId="3173195116" sldId="258"/>
+            <ac:cxnSpMk id="28" creationId="{2E01EA5D-3799-4FE9-A15E-691AFAAD8FEB}"/>
+          </ac:cxnSpMkLst>
+        </pc:cxnChg>
+        <pc:cxnChg chg="del">
+          <ac:chgData name="Nhut DOAN NGUYEN" userId="d7212ade-34df-43ef-b0a5-cb321af945d9" providerId="ADAL" clId="{51DED03C-BB6F-49A2-B443-0FC1DDC50DED}" dt="2019-11-11T22:48:16.989" v="585" actId="478"/>
+          <ac:cxnSpMkLst>
+            <pc:docMk/>
+            <pc:sldMk cId="3173195116" sldId="258"/>
+            <ac:cxnSpMk id="30" creationId="{190B51C5-F37B-4C40-9CAB-A3F6873AAC4E}"/>
+          </ac:cxnSpMkLst>
+        </pc:cxnChg>
+        <pc:cxnChg chg="del mod">
+          <ac:chgData name="Nhut DOAN NGUYEN" userId="d7212ade-34df-43ef-b0a5-cb321af945d9" providerId="ADAL" clId="{51DED03C-BB6F-49A2-B443-0FC1DDC50DED}" dt="2019-11-11T22:48:16.989" v="585" actId="478"/>
+          <ac:cxnSpMkLst>
+            <pc:docMk/>
+            <pc:sldMk cId="3173195116" sldId="258"/>
+            <ac:cxnSpMk id="32" creationId="{2FAF8528-0D59-48E1-91CE-1C72F174FA27}"/>
+          </ac:cxnSpMkLst>
+        </pc:cxnChg>
+        <pc:cxnChg chg="del mod">
+          <ac:chgData name="Nhut DOAN NGUYEN" userId="d7212ade-34df-43ef-b0a5-cb321af945d9" providerId="ADAL" clId="{51DED03C-BB6F-49A2-B443-0FC1DDC50DED}" dt="2019-11-11T22:48:16.989" v="585" actId="478"/>
+          <ac:cxnSpMkLst>
+            <pc:docMk/>
+            <pc:sldMk cId="3173195116" sldId="258"/>
+            <ac:cxnSpMk id="40" creationId="{4F4BD4E8-52F0-42E6-AD0F-2C340DBEA386}"/>
+          </ac:cxnSpMkLst>
+        </pc:cxnChg>
+        <pc:cxnChg chg="del">
+          <ac:chgData name="Nhut DOAN NGUYEN" userId="d7212ade-34df-43ef-b0a5-cb321af945d9" providerId="ADAL" clId="{51DED03C-BB6F-49A2-B443-0FC1DDC50DED}" dt="2019-11-11T22:48:16.989" v="585" actId="478"/>
+          <ac:cxnSpMkLst>
+            <pc:docMk/>
+            <pc:sldMk cId="3173195116" sldId="258"/>
+            <ac:cxnSpMk id="42" creationId="{228BA909-583C-4327-A629-F80912AB7A83}"/>
+          </ac:cxnSpMkLst>
+        </pc:cxnChg>
+        <pc:cxnChg chg="del mod">
+          <ac:chgData name="Nhut DOAN NGUYEN" userId="d7212ade-34df-43ef-b0a5-cb321af945d9" providerId="ADAL" clId="{51DED03C-BB6F-49A2-B443-0FC1DDC50DED}" dt="2019-11-11T22:48:16.989" v="585" actId="478"/>
+          <ac:cxnSpMkLst>
+            <pc:docMk/>
+            <pc:sldMk cId="3173195116" sldId="258"/>
+            <ac:cxnSpMk id="44" creationId="{40E6EC3D-9B26-4BF0-9D31-37859FFC2D51}"/>
+          </ac:cxnSpMkLst>
+        </pc:cxnChg>
+        <pc:cxnChg chg="del">
+          <ac:chgData name="Nhut DOAN NGUYEN" userId="d7212ade-34df-43ef-b0a5-cb321af945d9" providerId="ADAL" clId="{51DED03C-BB6F-49A2-B443-0FC1DDC50DED}" dt="2019-11-11T22:48:16.989" v="585" actId="478"/>
+          <ac:cxnSpMkLst>
+            <pc:docMk/>
+            <pc:sldMk cId="3173195116" sldId="258"/>
+            <ac:cxnSpMk id="46" creationId="{95330A63-B35C-4DB6-A98A-B47B77085D88}"/>
+          </ac:cxnSpMkLst>
+        </pc:cxnChg>
+        <pc:cxnChg chg="del mod">
+          <ac:chgData name="Nhut DOAN NGUYEN" userId="d7212ade-34df-43ef-b0a5-cb321af945d9" providerId="ADAL" clId="{51DED03C-BB6F-49A2-B443-0FC1DDC50DED}" dt="2019-11-11T22:48:16.989" v="585" actId="478"/>
+          <ac:cxnSpMkLst>
+            <pc:docMk/>
+            <pc:sldMk cId="3173195116" sldId="258"/>
+            <ac:cxnSpMk id="48" creationId="{2123147A-306D-4360-B4D1-F2AF513BEEEF}"/>
+          </ac:cxnSpMkLst>
+        </pc:cxnChg>
+        <pc:cxnChg chg="del">
+          <ac:chgData name="Nhut DOAN NGUYEN" userId="d7212ade-34df-43ef-b0a5-cb321af945d9" providerId="ADAL" clId="{51DED03C-BB6F-49A2-B443-0FC1DDC50DED}" dt="2019-11-11T22:48:16.989" v="585" actId="478"/>
+          <ac:cxnSpMkLst>
+            <pc:docMk/>
+            <pc:sldMk cId="3173195116" sldId="258"/>
+            <ac:cxnSpMk id="50" creationId="{19843E4A-054B-4217-B9C4-A89ACCA72B2F}"/>
+          </ac:cxnSpMkLst>
+        </pc:cxnChg>
+        <pc:cxnChg chg="del mod">
+          <ac:chgData name="Nhut DOAN NGUYEN" userId="d7212ade-34df-43ef-b0a5-cb321af945d9" providerId="ADAL" clId="{51DED03C-BB6F-49A2-B443-0FC1DDC50DED}" dt="2019-11-11T22:48:16.989" v="585" actId="478"/>
+          <ac:cxnSpMkLst>
+            <pc:docMk/>
+            <pc:sldMk cId="3173195116" sldId="258"/>
+            <ac:cxnSpMk id="52" creationId="{0CAF88D5-BE1C-4A4C-9A3C-F70B5570AA3A}"/>
+          </ac:cxnSpMkLst>
+        </pc:cxnChg>
+        <pc:cxnChg chg="del">
+          <ac:chgData name="Nhut DOAN NGUYEN" userId="d7212ade-34df-43ef-b0a5-cb321af945d9" providerId="ADAL" clId="{51DED03C-BB6F-49A2-B443-0FC1DDC50DED}" dt="2019-11-11T22:48:16.989" v="585" actId="478"/>
+          <ac:cxnSpMkLst>
+            <pc:docMk/>
+            <pc:sldMk cId="3173195116" sldId="258"/>
+            <ac:cxnSpMk id="54" creationId="{EEA28B46-16E8-4A0E-848B-F682B64CE995}"/>
+          </ac:cxnSpMkLst>
+        </pc:cxnChg>
+      </pc:sldChg>
+      <pc:sldChg chg="delSp modSp add">
+        <pc:chgData name="Nhut DOAN NGUYEN" userId="d7212ade-34df-43ef-b0a5-cb321af945d9" providerId="ADAL" clId="{51DED03C-BB6F-49A2-B443-0FC1DDC50DED}" dt="2019-11-11T22:59:25.030" v="590" actId="478"/>
+        <pc:sldMkLst>
+          <pc:docMk/>
+          <pc:sldMk cId="1254696603" sldId="259"/>
+        </pc:sldMkLst>
+        <pc:spChg chg="del">
+          <ac:chgData name="Nhut DOAN NGUYEN" userId="d7212ade-34df-43ef-b0a5-cb321af945d9" providerId="ADAL" clId="{51DED03C-BB6F-49A2-B443-0FC1DDC50DED}" dt="2019-11-11T22:59:09.271" v="587" actId="478"/>
+          <ac:spMkLst>
+            <pc:docMk/>
+            <pc:sldMk cId="1254696603" sldId="259"/>
+            <ac:spMk id="5" creationId="{6746CAAB-D3C5-4C1A-9C3F-3DBB89E5C95B}"/>
+          </ac:spMkLst>
+        </pc:spChg>
+        <pc:spChg chg="del">
+          <ac:chgData name="Nhut DOAN NGUYEN" userId="d7212ade-34df-43ef-b0a5-cb321af945d9" providerId="ADAL" clId="{51DED03C-BB6F-49A2-B443-0FC1DDC50DED}" dt="2019-11-11T22:59:25.030" v="590" actId="478"/>
+          <ac:spMkLst>
+            <pc:docMk/>
+            <pc:sldMk cId="1254696603" sldId="259"/>
+            <ac:spMk id="7" creationId="{EA89A71D-2FE3-4A36-B820-3508994A7EC3}"/>
+          </ac:spMkLst>
+        </pc:spChg>
+        <pc:spChg chg="del">
+          <ac:chgData name="Nhut DOAN NGUYEN" userId="d7212ade-34df-43ef-b0a5-cb321af945d9" providerId="ADAL" clId="{51DED03C-BB6F-49A2-B443-0FC1DDC50DED}" dt="2019-11-11T22:59:09.271" v="587" actId="478"/>
+          <ac:spMkLst>
+            <pc:docMk/>
+            <pc:sldMk cId="1254696603" sldId="259"/>
+            <ac:spMk id="8" creationId="{04ECF46D-C76B-4D43-A1AC-A21ADA02A34D}"/>
+          </ac:spMkLst>
+        </pc:spChg>
+        <pc:spChg chg="del">
+          <ac:chgData name="Nhut DOAN NGUYEN" userId="d7212ade-34df-43ef-b0a5-cb321af945d9" providerId="ADAL" clId="{51DED03C-BB6F-49A2-B443-0FC1DDC50DED}" dt="2019-11-11T22:59:25.030" v="590" actId="478"/>
+          <ac:spMkLst>
+            <pc:docMk/>
+            <pc:sldMk cId="1254696603" sldId="259"/>
+            <ac:spMk id="10" creationId="{FF83EDEB-EEE1-41C4-9756-CD597487D99B}"/>
+          </ac:spMkLst>
+        </pc:spChg>
+        <pc:spChg chg="del">
+          <ac:chgData name="Nhut DOAN NGUYEN" userId="d7212ade-34df-43ef-b0a5-cb321af945d9" providerId="ADAL" clId="{51DED03C-BB6F-49A2-B443-0FC1DDC50DED}" dt="2019-11-11T22:59:09.271" v="587" actId="478"/>
+          <ac:spMkLst>
+            <pc:docMk/>
+            <pc:sldMk cId="1254696603" sldId="259"/>
+            <ac:spMk id="11" creationId="{ED525DFF-504A-4070-94F5-463213F78CBB}"/>
+          </ac:spMkLst>
+        </pc:spChg>
+        <pc:spChg chg="del">
+          <ac:chgData name="Nhut DOAN NGUYEN" userId="d7212ade-34df-43ef-b0a5-cb321af945d9" providerId="ADAL" clId="{51DED03C-BB6F-49A2-B443-0FC1DDC50DED}" dt="2019-11-11T22:59:25.030" v="590" actId="478"/>
+          <ac:spMkLst>
+            <pc:docMk/>
+            <pc:sldMk cId="1254696603" sldId="259"/>
+            <ac:spMk id="14" creationId="{577D9363-6DC6-45C5-9712-A8623B11DD83}"/>
+          </ac:spMkLst>
+        </pc:spChg>
+        <pc:spChg chg="del">
+          <ac:chgData name="Nhut DOAN NGUYEN" userId="d7212ade-34df-43ef-b0a5-cb321af945d9" providerId="ADAL" clId="{51DED03C-BB6F-49A2-B443-0FC1DDC50DED}" dt="2019-11-11T22:59:09.271" v="587" actId="478"/>
+          <ac:spMkLst>
+            <pc:docMk/>
+            <pc:sldMk cId="1254696603" sldId="259"/>
+            <ac:spMk id="55" creationId="{A24E4A53-116A-4B05-931E-25E6DA986428}"/>
+          </ac:spMkLst>
+        </pc:spChg>
+        <pc:spChg chg="mod">
+          <ac:chgData name="Nhut DOAN NGUYEN" userId="d7212ade-34df-43ef-b0a5-cb321af945d9" providerId="ADAL" clId="{51DED03C-BB6F-49A2-B443-0FC1DDC50DED}" dt="2019-11-11T22:59:17.187" v="589" actId="6549"/>
+          <ac:spMkLst>
+            <pc:docMk/>
+            <pc:sldMk cId="1254696603" sldId="259"/>
+            <ac:spMk id="56" creationId="{D98C9F07-B468-48B8-A2EC-CB4AA3433007}"/>
+          </ac:spMkLst>
+        </pc:spChg>
+        <pc:spChg chg="del">
+          <ac:chgData name="Nhut DOAN NGUYEN" userId="d7212ade-34df-43ef-b0a5-cb321af945d9" providerId="ADAL" clId="{51DED03C-BB6F-49A2-B443-0FC1DDC50DED}" dt="2019-11-11T22:59:25.030" v="590" actId="478"/>
+          <ac:spMkLst>
+            <pc:docMk/>
+            <pc:sldMk cId="1254696603" sldId="259"/>
+            <ac:spMk id="57" creationId="{BE9A953B-4140-4D55-AA29-8EAA3E6EAC19}"/>
+          </ac:spMkLst>
+        </pc:spChg>
+        <pc:spChg chg="del">
+          <ac:chgData name="Nhut DOAN NGUYEN" userId="d7212ade-34df-43ef-b0a5-cb321af945d9" providerId="ADAL" clId="{51DED03C-BB6F-49A2-B443-0FC1DDC50DED}" dt="2019-11-11T22:59:09.271" v="587" actId="478"/>
+          <ac:spMkLst>
+            <pc:docMk/>
+            <pc:sldMk cId="1254696603" sldId="259"/>
+            <ac:spMk id="58" creationId="{8CEF25F8-000F-4664-BD3A-6C5DECBD41A7}"/>
+          </ac:spMkLst>
+        </pc:spChg>
+        <pc:spChg chg="del">
+          <ac:chgData name="Nhut DOAN NGUYEN" userId="d7212ade-34df-43ef-b0a5-cb321af945d9" providerId="ADAL" clId="{51DED03C-BB6F-49A2-B443-0FC1DDC50DED}" dt="2019-11-11T22:59:25.030" v="590" actId="478"/>
+          <ac:spMkLst>
+            <pc:docMk/>
+            <pc:sldMk cId="1254696603" sldId="259"/>
+            <ac:spMk id="66" creationId="{F3CCD863-4E7C-4D17-BEFE-A65DDFB8F83D}"/>
+          </ac:spMkLst>
+        </pc:spChg>
+        <pc:spChg chg="del">
+          <ac:chgData name="Nhut DOAN NGUYEN" userId="d7212ade-34df-43ef-b0a5-cb321af945d9" providerId="ADAL" clId="{51DED03C-BB6F-49A2-B443-0FC1DDC50DED}" dt="2019-11-11T22:59:25.030" v="590" actId="478"/>
+          <ac:spMkLst>
+            <pc:docMk/>
+            <pc:sldMk cId="1254696603" sldId="259"/>
+            <ac:spMk id="67" creationId="{8990D107-3C45-438C-9E5F-FC91985ABA79}"/>
+          </ac:spMkLst>
+        </pc:spChg>
+        <pc:spChg chg="del">
+          <ac:chgData name="Nhut DOAN NGUYEN" userId="d7212ade-34df-43ef-b0a5-cb321af945d9" providerId="ADAL" clId="{51DED03C-BB6F-49A2-B443-0FC1DDC50DED}" dt="2019-11-11T22:59:25.030" v="590" actId="478"/>
+          <ac:spMkLst>
+            <pc:docMk/>
+            <pc:sldMk cId="1254696603" sldId="259"/>
+            <ac:spMk id="69" creationId="{CCF4AD14-7522-4FDC-9A66-DF9A4812E745}"/>
+          </ac:spMkLst>
+        </pc:spChg>
+        <pc:spChg chg="del">
+          <ac:chgData name="Nhut DOAN NGUYEN" userId="d7212ade-34df-43ef-b0a5-cb321af945d9" providerId="ADAL" clId="{51DED03C-BB6F-49A2-B443-0FC1DDC50DED}" dt="2019-11-11T22:59:25.030" v="590" actId="478"/>
+          <ac:spMkLst>
+            <pc:docMk/>
+            <pc:sldMk cId="1254696603" sldId="259"/>
+            <ac:spMk id="70" creationId="{BFE1B509-7AE7-4AFF-8DE3-7810CF89A8D4}"/>
+          </ac:spMkLst>
+        </pc:spChg>
+        <pc:spChg chg="del">
+          <ac:chgData name="Nhut DOAN NGUYEN" userId="d7212ade-34df-43ef-b0a5-cb321af945d9" providerId="ADAL" clId="{51DED03C-BB6F-49A2-B443-0FC1DDC50DED}" dt="2019-11-11T22:59:25.030" v="590" actId="478"/>
+          <ac:spMkLst>
+            <pc:docMk/>
+            <pc:sldMk cId="1254696603" sldId="259"/>
+            <ac:spMk id="73" creationId="{443F4DC3-BB07-4A15-997E-36D2C9A663CB}"/>
+          </ac:spMkLst>
+        </pc:spChg>
+        <pc:spChg chg="del">
+          <ac:chgData name="Nhut DOAN NGUYEN" userId="d7212ade-34df-43ef-b0a5-cb321af945d9" providerId="ADAL" clId="{51DED03C-BB6F-49A2-B443-0FC1DDC50DED}" dt="2019-11-11T22:59:09.271" v="587" actId="478"/>
+          <ac:spMkLst>
+            <pc:docMk/>
+            <pc:sldMk cId="1254696603" sldId="259"/>
+            <ac:spMk id="74" creationId="{21DC3087-8AB3-4078-AB9F-694E8C3C4DC1}"/>
+          </ac:spMkLst>
+        </pc:spChg>
+        <pc:spChg chg="del">
+          <ac:chgData name="Nhut DOAN NGUYEN" userId="d7212ade-34df-43ef-b0a5-cb321af945d9" providerId="ADAL" clId="{51DED03C-BB6F-49A2-B443-0FC1DDC50DED}" dt="2019-11-11T22:59:09.271" v="587" actId="478"/>
+          <ac:spMkLst>
+            <pc:docMk/>
+            <pc:sldMk cId="1254696603" sldId="259"/>
+            <ac:spMk id="75" creationId="{7FD7AE9E-A357-4388-A42A-3C97CC57DFEA}"/>
+          </ac:spMkLst>
+        </pc:spChg>
+        <pc:spChg chg="del">
+          <ac:chgData name="Nhut DOAN NGUYEN" userId="d7212ade-34df-43ef-b0a5-cb321af945d9" providerId="ADAL" clId="{51DED03C-BB6F-49A2-B443-0FC1DDC50DED}" dt="2019-11-11T22:59:09.271" v="587" actId="478"/>
+          <ac:spMkLst>
+            <pc:docMk/>
+            <pc:sldMk cId="1254696603" sldId="259"/>
+            <ac:spMk id="76" creationId="{E5C0CD96-8B55-4284-B656-E38771588BEA}"/>
+          </ac:spMkLst>
+        </pc:spChg>
+        <pc:spChg chg="del">
+          <ac:chgData name="Nhut DOAN NGUYEN" userId="d7212ade-34df-43ef-b0a5-cb321af945d9" providerId="ADAL" clId="{51DED03C-BB6F-49A2-B443-0FC1DDC50DED}" dt="2019-11-11T22:59:25.030" v="590" actId="478"/>
+          <ac:spMkLst>
+            <pc:docMk/>
+            <pc:sldMk cId="1254696603" sldId="259"/>
+            <ac:spMk id="78" creationId="{CF6DC8DB-46A6-4165-A360-9116ABA15F2B}"/>
+          </ac:spMkLst>
+        </pc:spChg>
+        <pc:spChg chg="del">
+          <ac:chgData name="Nhut DOAN NGUYEN" userId="d7212ade-34df-43ef-b0a5-cb321af945d9" providerId="ADAL" clId="{51DED03C-BB6F-49A2-B443-0FC1DDC50DED}" dt="2019-11-11T22:59:09.271" v="587" actId="478"/>
+          <ac:spMkLst>
+            <pc:docMk/>
+            <pc:sldMk cId="1254696603" sldId="259"/>
+            <ac:spMk id="79" creationId="{61F91505-AE21-4E8D-9F65-2F4FC3D5AD56}"/>
+          </ac:spMkLst>
+        </pc:spChg>
+        <pc:spChg chg="del">
+          <ac:chgData name="Nhut DOAN NGUYEN" userId="d7212ade-34df-43ef-b0a5-cb321af945d9" providerId="ADAL" clId="{51DED03C-BB6F-49A2-B443-0FC1DDC50DED}" dt="2019-11-11T22:59:09.271" v="587" actId="478"/>
+          <ac:spMkLst>
+            <pc:docMk/>
+            <pc:sldMk cId="1254696603" sldId="259"/>
+            <ac:spMk id="80" creationId="{0643C5FA-7C93-4EFD-B0D9-C18F58DE5EC0}"/>
+          </ac:spMkLst>
+        </pc:spChg>
+        <pc:spChg chg="del">
+          <ac:chgData name="Nhut DOAN NGUYEN" userId="d7212ade-34df-43ef-b0a5-cb321af945d9" providerId="ADAL" clId="{51DED03C-BB6F-49A2-B443-0FC1DDC50DED}" dt="2019-11-11T22:59:25.030" v="590" actId="478"/>
+          <ac:spMkLst>
+            <pc:docMk/>
+            <pc:sldMk cId="1254696603" sldId="259"/>
+            <ac:spMk id="81" creationId="{2E1E23C0-6EB5-4FA8-A1D4-3573C87A01BE}"/>
+          </ac:spMkLst>
+        </pc:spChg>
+        <pc:cxnChg chg="del mod">
+          <ac:chgData name="Nhut DOAN NGUYEN" userId="d7212ade-34df-43ef-b0a5-cb321af945d9" providerId="ADAL" clId="{51DED03C-BB6F-49A2-B443-0FC1DDC50DED}" dt="2019-11-11T22:59:12.018" v="588" actId="478"/>
+          <ac:cxnSpMkLst>
+            <pc:docMk/>
+            <pc:sldMk cId="1254696603" sldId="259"/>
+            <ac:cxnSpMk id="16" creationId="{4438300A-2C1E-4714-BFD4-2E5E8E4EA2B6}"/>
+          </ac:cxnSpMkLst>
+        </pc:cxnChg>
+        <pc:cxnChg chg="del mod">
+          <ac:chgData name="Nhut DOAN NGUYEN" userId="d7212ade-34df-43ef-b0a5-cb321af945d9" providerId="ADAL" clId="{51DED03C-BB6F-49A2-B443-0FC1DDC50DED}" dt="2019-11-11T22:59:25.030" v="590" actId="478"/>
+          <ac:cxnSpMkLst>
+            <pc:docMk/>
+            <pc:sldMk cId="1254696603" sldId="259"/>
+            <ac:cxnSpMk id="20" creationId="{D6DCB3F2-50A5-4804-95A8-E80A7E5F5AB3}"/>
+          </ac:cxnSpMkLst>
+        </pc:cxnChg>
+        <pc:cxnChg chg="del">
+          <ac:chgData name="Nhut DOAN NGUYEN" userId="d7212ade-34df-43ef-b0a5-cb321af945d9" providerId="ADAL" clId="{51DED03C-BB6F-49A2-B443-0FC1DDC50DED}" dt="2019-11-11T22:59:09.271" v="587" actId="478"/>
+          <ac:cxnSpMkLst>
+            <pc:docMk/>
+            <pc:sldMk cId="1254696603" sldId="259"/>
+            <ac:cxnSpMk id="24" creationId="{D062D7D3-6D26-4A3C-BF9A-4FEECD7FAD8E}"/>
+          </ac:cxnSpMkLst>
+        </pc:cxnChg>
+        <pc:cxnChg chg="del">
+          <ac:chgData name="Nhut DOAN NGUYEN" userId="d7212ade-34df-43ef-b0a5-cb321af945d9" providerId="ADAL" clId="{51DED03C-BB6F-49A2-B443-0FC1DDC50DED}" dt="2019-11-11T22:59:25.030" v="590" actId="478"/>
+          <ac:cxnSpMkLst>
+            <pc:docMk/>
+            <pc:sldMk cId="1254696603" sldId="259"/>
+            <ac:cxnSpMk id="26" creationId="{F308478F-E970-41C9-933D-A44F5058D6EE}"/>
+          </ac:cxnSpMkLst>
+        </pc:cxnChg>
+        <pc:cxnChg chg="del">
+          <ac:chgData name="Nhut DOAN NGUYEN" userId="d7212ade-34df-43ef-b0a5-cb321af945d9" providerId="ADAL" clId="{51DED03C-BB6F-49A2-B443-0FC1DDC50DED}" dt="2019-11-11T22:59:25.030" v="590" actId="478"/>
+          <ac:cxnSpMkLst>
+            <pc:docMk/>
+            <pc:sldMk cId="1254696603" sldId="259"/>
+            <ac:cxnSpMk id="28" creationId="{2E01EA5D-3799-4FE9-A15E-691AFAAD8FEB}"/>
+          </ac:cxnSpMkLst>
+        </pc:cxnChg>
+        <pc:cxnChg chg="del">
+          <ac:chgData name="Nhut DOAN NGUYEN" userId="d7212ade-34df-43ef-b0a5-cb321af945d9" providerId="ADAL" clId="{51DED03C-BB6F-49A2-B443-0FC1DDC50DED}" dt="2019-11-11T22:59:09.271" v="587" actId="478"/>
+          <ac:cxnSpMkLst>
+            <pc:docMk/>
+            <pc:sldMk cId="1254696603" sldId="259"/>
+            <ac:cxnSpMk id="30" creationId="{190B51C5-F37B-4C40-9CAB-A3F6873AAC4E}"/>
+          </ac:cxnSpMkLst>
+        </pc:cxnChg>
+        <pc:cxnChg chg="del mod">
+          <ac:chgData name="Nhut DOAN NGUYEN" userId="d7212ade-34df-43ef-b0a5-cb321af945d9" providerId="ADAL" clId="{51DED03C-BB6F-49A2-B443-0FC1DDC50DED}" dt="2019-11-11T22:59:09.271" v="587" actId="478"/>
+          <ac:cxnSpMkLst>
+            <pc:docMk/>
+            <pc:sldMk cId="1254696603" sldId="259"/>
+            <ac:cxnSpMk id="32" creationId="{2FAF8528-0D59-48E1-91CE-1C72F174FA27}"/>
+          </ac:cxnSpMkLst>
+        </pc:cxnChg>
+        <pc:cxnChg chg="del mod">
+          <ac:chgData name="Nhut DOAN NGUYEN" userId="d7212ade-34df-43ef-b0a5-cb321af945d9" providerId="ADAL" clId="{51DED03C-BB6F-49A2-B443-0FC1DDC50DED}" dt="2019-11-11T22:59:25.030" v="590" actId="478"/>
+          <ac:cxnSpMkLst>
+            <pc:docMk/>
+            <pc:sldMk cId="1254696603" sldId="259"/>
+            <ac:cxnSpMk id="40" creationId="{4F4BD4E8-52F0-42E6-AD0F-2C340DBEA386}"/>
+          </ac:cxnSpMkLst>
+        </pc:cxnChg>
+        <pc:cxnChg chg="del">
+          <ac:chgData name="Nhut DOAN NGUYEN" userId="d7212ade-34df-43ef-b0a5-cb321af945d9" providerId="ADAL" clId="{51DED03C-BB6F-49A2-B443-0FC1DDC50DED}" dt="2019-11-11T22:59:25.030" v="590" actId="478"/>
+          <ac:cxnSpMkLst>
+            <pc:docMk/>
+            <pc:sldMk cId="1254696603" sldId="259"/>
+            <ac:cxnSpMk id="42" creationId="{228BA909-583C-4327-A629-F80912AB7A83}"/>
+          </ac:cxnSpMkLst>
+        </pc:cxnChg>
+        <pc:cxnChg chg="del mod">
+          <ac:chgData name="Nhut DOAN NGUYEN" userId="d7212ade-34df-43ef-b0a5-cb321af945d9" providerId="ADAL" clId="{51DED03C-BB6F-49A2-B443-0FC1DDC50DED}" dt="2019-11-11T22:59:09.271" v="587" actId="478"/>
+          <ac:cxnSpMkLst>
+            <pc:docMk/>
+            <pc:sldMk cId="1254696603" sldId="259"/>
+            <ac:cxnSpMk id="44" creationId="{40E6EC3D-9B26-4BF0-9D31-37859FFC2D51}"/>
+          </ac:cxnSpMkLst>
+        </pc:cxnChg>
+        <pc:cxnChg chg="del">
+          <ac:chgData name="Nhut DOAN NGUYEN" userId="d7212ade-34df-43ef-b0a5-cb321af945d9" providerId="ADAL" clId="{51DED03C-BB6F-49A2-B443-0FC1DDC50DED}" dt="2019-11-11T22:59:09.271" v="587" actId="478"/>
+          <ac:cxnSpMkLst>
+            <pc:docMk/>
+            <pc:sldMk cId="1254696603" sldId="259"/>
+            <ac:cxnSpMk id="46" creationId="{95330A63-B35C-4DB6-A98A-B47B77085D88}"/>
+          </ac:cxnSpMkLst>
+        </pc:cxnChg>
+        <pc:cxnChg chg="del mod">
+          <ac:chgData name="Nhut DOAN NGUYEN" userId="d7212ade-34df-43ef-b0a5-cb321af945d9" providerId="ADAL" clId="{51DED03C-BB6F-49A2-B443-0FC1DDC50DED}" dt="2019-11-11T22:59:25.030" v="590" actId="478"/>
+          <ac:cxnSpMkLst>
+            <pc:docMk/>
+            <pc:sldMk cId="1254696603" sldId="259"/>
+            <ac:cxnSpMk id="48" creationId="{2123147A-306D-4360-B4D1-F2AF513BEEEF}"/>
+          </ac:cxnSpMkLst>
+        </pc:cxnChg>
+        <pc:cxnChg chg="del mod">
+          <ac:chgData name="Nhut DOAN NGUYEN" userId="d7212ade-34df-43ef-b0a5-cb321af945d9" providerId="ADAL" clId="{51DED03C-BB6F-49A2-B443-0FC1DDC50DED}" dt="2019-11-11T22:59:25.030" v="590" actId="478"/>
+          <ac:cxnSpMkLst>
+            <pc:docMk/>
+            <pc:sldMk cId="1254696603" sldId="259"/>
+            <ac:cxnSpMk id="52" creationId="{0CAF88D5-BE1C-4A4C-9A3C-F70B5570AA3A}"/>
+          </ac:cxnSpMkLst>
+        </pc:cxnChg>
+        <pc:cxnChg chg="del">
+          <ac:chgData name="Nhut DOAN NGUYEN" userId="d7212ade-34df-43ef-b0a5-cb321af945d9" providerId="ADAL" clId="{51DED03C-BB6F-49A2-B443-0FC1DDC50DED}" dt="2019-11-11T22:59:25.030" v="590" actId="478"/>
+          <ac:cxnSpMkLst>
+            <pc:docMk/>
+            <pc:sldMk cId="1254696603" sldId="259"/>
+            <ac:cxnSpMk id="54" creationId="{EEA28B46-16E8-4A0E-848B-F682B64CE995}"/>
+          </ac:cxnSpMkLst>
+        </pc:cxnChg>
+      </pc:sldChg>
+      <pc:sldChg chg="addSp delSp modSp add">
+        <pc:chgData name="Nhut DOAN NGUYEN" userId="d7212ade-34df-43ef-b0a5-cb321af945d9" providerId="ADAL" clId="{51DED03C-BB6F-49A2-B443-0FC1DDC50DED}" dt="2019-11-11T23:02:02.042" v="598" actId="478"/>
+        <pc:sldMkLst>
+          <pc:docMk/>
+          <pc:sldMk cId="1284329534" sldId="260"/>
+        </pc:sldMkLst>
+        <pc:spChg chg="add del mod">
+          <ac:chgData name="Nhut DOAN NGUYEN" userId="d7212ade-34df-43ef-b0a5-cb321af945d9" providerId="ADAL" clId="{51DED03C-BB6F-49A2-B443-0FC1DDC50DED}" dt="2019-11-11T23:01:50.549" v="595" actId="478"/>
+          <ac:spMkLst>
+            <pc:docMk/>
+            <pc:sldMk cId="1284329534" sldId="260"/>
+            <ac:spMk id="7" creationId="{EA89A71D-2FE3-4A36-B820-3508994A7EC3}"/>
+          </ac:spMkLst>
+        </pc:spChg>
+        <pc:spChg chg="del">
+          <ac:chgData name="Nhut DOAN NGUYEN" userId="d7212ade-34df-43ef-b0a5-cb321af945d9" providerId="ADAL" clId="{51DED03C-BB6F-49A2-B443-0FC1DDC50DED}" dt="2019-11-11T23:02:02.042" v="598" actId="478"/>
+          <ac:spMkLst>
+            <pc:docMk/>
+            <pc:sldMk cId="1284329534" sldId="260"/>
+            <ac:spMk id="8" creationId="{04ECF46D-C76B-4D43-A1AC-A21ADA02A34D}"/>
+          </ac:spMkLst>
+        </pc:spChg>
+        <pc:spChg chg="add del mod">
+          <ac:chgData name="Nhut DOAN NGUYEN" userId="d7212ade-34df-43ef-b0a5-cb321af945d9" providerId="ADAL" clId="{51DED03C-BB6F-49A2-B443-0FC1DDC50DED}" dt="2019-11-11T23:01:50.549" v="595" actId="478"/>
+          <ac:spMkLst>
+            <pc:docMk/>
+            <pc:sldMk cId="1284329534" sldId="260"/>
+            <ac:spMk id="9" creationId="{29680307-A9F2-4402-B9FD-23DA3BC5544A}"/>
+          </ac:spMkLst>
+        </pc:spChg>
+        <pc:spChg chg="add del mod">
+          <ac:chgData name="Nhut DOAN NGUYEN" userId="d7212ade-34df-43ef-b0a5-cb321af945d9" providerId="ADAL" clId="{51DED03C-BB6F-49A2-B443-0FC1DDC50DED}" dt="2019-11-11T23:01:50.549" v="595" actId="478"/>
+          <ac:spMkLst>
+            <pc:docMk/>
+            <pc:sldMk cId="1284329534" sldId="260"/>
+            <ac:spMk id="10" creationId="{FF83EDEB-EEE1-41C4-9756-CD597487D99B}"/>
+          </ac:spMkLst>
+        </pc:spChg>
+        <pc:spChg chg="del">
+          <ac:chgData name="Nhut DOAN NGUYEN" userId="d7212ade-34df-43ef-b0a5-cb321af945d9" providerId="ADAL" clId="{51DED03C-BB6F-49A2-B443-0FC1DDC50DED}" dt="2019-11-11T23:02:02.042" v="598" actId="478"/>
+          <ac:spMkLst>
+            <pc:docMk/>
+            <pc:sldMk cId="1284329534" sldId="260"/>
+            <ac:spMk id="11" creationId="{ED525DFF-504A-4070-94F5-463213F78CBB}"/>
+          </ac:spMkLst>
+        </pc:spChg>
+        <pc:spChg chg="add del mod">
+          <ac:chgData name="Nhut DOAN NGUYEN" userId="d7212ade-34df-43ef-b0a5-cb321af945d9" providerId="ADAL" clId="{51DED03C-BB6F-49A2-B443-0FC1DDC50DED}" dt="2019-11-11T23:01:50.549" v="595" actId="478"/>
+          <ac:spMkLst>
+            <pc:docMk/>
+            <pc:sldMk cId="1284329534" sldId="260"/>
+            <ac:spMk id="12" creationId="{8C9AB467-55CA-4EEF-9363-22CE9EBABB8E}"/>
+          </ac:spMkLst>
+        </pc:spChg>
+        <pc:spChg chg="add del mod">
+          <ac:chgData name="Nhut DOAN NGUYEN" userId="d7212ade-34df-43ef-b0a5-cb321af945d9" providerId="ADAL" clId="{51DED03C-BB6F-49A2-B443-0FC1DDC50DED}" dt="2019-11-11T23:01:50.549" v="595" actId="478"/>
+          <ac:spMkLst>
+            <pc:docMk/>
+            <pc:sldMk cId="1284329534" sldId="260"/>
+            <ac:spMk id="14" creationId="{577D9363-6DC6-45C5-9712-A8623B11DD83}"/>
+          </ac:spMkLst>
+        </pc:spChg>
+        <pc:spChg chg="add">
+          <ac:chgData name="Nhut DOAN NGUYEN" userId="d7212ade-34df-43ef-b0a5-cb321af945d9" providerId="ADAL" clId="{51DED03C-BB6F-49A2-B443-0FC1DDC50DED}" dt="2019-11-11T23:01:56.696" v="596"/>
+          <ac:spMkLst>
+            <pc:docMk/>
+            <pc:sldMk cId="1284329534" sldId="260"/>
+            <ac:spMk id="49" creationId="{D453986A-1040-49C6-9861-A7C244E7DB73}"/>
+          </ac:spMkLst>
+        </pc:spChg>
+        <pc:spChg chg="add del mod">
+          <ac:chgData name="Nhut DOAN NGUYEN" userId="d7212ade-34df-43ef-b0a5-cb321af945d9" providerId="ADAL" clId="{51DED03C-BB6F-49A2-B443-0FC1DDC50DED}" dt="2019-11-11T23:01:50.549" v="595" actId="478"/>
+          <ac:spMkLst>
+            <pc:docMk/>
+            <pc:sldMk cId="1284329534" sldId="260"/>
+            <ac:spMk id="55" creationId="{A24E4A53-116A-4B05-931E-25E6DA986428}"/>
+          </ac:spMkLst>
+        </pc:spChg>
+        <pc:spChg chg="add del mod">
+          <ac:chgData name="Nhut DOAN NGUYEN" userId="d7212ade-34df-43ef-b0a5-cb321af945d9" providerId="ADAL" clId="{51DED03C-BB6F-49A2-B443-0FC1DDC50DED}" dt="2019-11-11T23:01:50.549" v="595" actId="478"/>
+          <ac:spMkLst>
+            <pc:docMk/>
+            <pc:sldMk cId="1284329534" sldId="260"/>
+            <ac:spMk id="56" creationId="{D98C9F07-B468-48B8-A2EC-CB4AA3433007}"/>
+          </ac:spMkLst>
+        </pc:spChg>
+        <pc:spChg chg="add del mod">
+          <ac:chgData name="Nhut DOAN NGUYEN" userId="d7212ade-34df-43ef-b0a5-cb321af945d9" providerId="ADAL" clId="{51DED03C-BB6F-49A2-B443-0FC1DDC50DED}" dt="2019-11-11T23:01:50.549" v="595" actId="478"/>
+          <ac:spMkLst>
+            <pc:docMk/>
+            <pc:sldMk cId="1284329534" sldId="260"/>
+            <ac:spMk id="57" creationId="{BE9A953B-4140-4D55-AA29-8EAA3E6EAC19}"/>
+          </ac:spMkLst>
+        </pc:spChg>
+        <pc:spChg chg="add del mod">
+          <ac:chgData name="Nhut DOAN NGUYEN" userId="d7212ade-34df-43ef-b0a5-cb321af945d9" providerId="ADAL" clId="{51DED03C-BB6F-49A2-B443-0FC1DDC50DED}" dt="2019-11-11T23:01:50.549" v="595" actId="478"/>
+          <ac:spMkLst>
+            <pc:docMk/>
+            <pc:sldMk cId="1284329534" sldId="260"/>
+            <ac:spMk id="58" creationId="{8CEF25F8-000F-4664-BD3A-6C5DECBD41A7}"/>
+          </ac:spMkLst>
+        </pc:spChg>
+        <pc:spChg chg="add del mod">
+          <ac:chgData name="Nhut DOAN NGUYEN" userId="d7212ade-34df-43ef-b0a5-cb321af945d9" providerId="ADAL" clId="{51DED03C-BB6F-49A2-B443-0FC1DDC50DED}" dt="2019-11-11T23:01:50.549" v="595" actId="478"/>
+          <ac:spMkLst>
+            <pc:docMk/>
+            <pc:sldMk cId="1284329534" sldId="260"/>
+            <ac:spMk id="66" creationId="{F3CCD863-4E7C-4D17-BEFE-A65DDFB8F83D}"/>
+          </ac:spMkLst>
+        </pc:spChg>
+        <pc:spChg chg="add del mod">
+          <ac:chgData name="Nhut DOAN NGUYEN" userId="d7212ade-34df-43ef-b0a5-cb321af945d9" providerId="ADAL" clId="{51DED03C-BB6F-49A2-B443-0FC1DDC50DED}" dt="2019-11-11T23:01:50.549" v="595" actId="478"/>
+          <ac:spMkLst>
+            <pc:docMk/>
+            <pc:sldMk cId="1284329534" sldId="260"/>
+            <ac:spMk id="67" creationId="{8990D107-3C45-438C-9E5F-FC91985ABA79}"/>
+          </ac:spMkLst>
+        </pc:spChg>
+        <pc:spChg chg="add del mod">
+          <ac:chgData name="Nhut DOAN NGUYEN" userId="d7212ade-34df-43ef-b0a5-cb321af945d9" providerId="ADAL" clId="{51DED03C-BB6F-49A2-B443-0FC1DDC50DED}" dt="2019-11-11T23:01:50.549" v="595" actId="478"/>
+          <ac:spMkLst>
+            <pc:docMk/>
+            <pc:sldMk cId="1284329534" sldId="260"/>
+            <ac:spMk id="69" creationId="{CCF4AD14-7522-4FDC-9A66-DF9A4812E745}"/>
+          </ac:spMkLst>
+        </pc:spChg>
+        <pc:spChg chg="add del mod">
+          <ac:chgData name="Nhut DOAN NGUYEN" userId="d7212ade-34df-43ef-b0a5-cb321af945d9" providerId="ADAL" clId="{51DED03C-BB6F-49A2-B443-0FC1DDC50DED}" dt="2019-11-11T23:01:50.549" v="595" actId="478"/>
+          <ac:spMkLst>
+            <pc:docMk/>
+            <pc:sldMk cId="1284329534" sldId="260"/>
+            <ac:spMk id="70" creationId="{BFE1B509-7AE7-4AFF-8DE3-7810CF89A8D4}"/>
+          </ac:spMkLst>
+        </pc:spChg>
+        <pc:spChg chg="add del mod">
+          <ac:chgData name="Nhut DOAN NGUYEN" userId="d7212ade-34df-43ef-b0a5-cb321af945d9" providerId="ADAL" clId="{51DED03C-BB6F-49A2-B443-0FC1DDC50DED}" dt="2019-11-11T23:01:50.549" v="595" actId="478"/>
+          <ac:spMkLst>
+            <pc:docMk/>
+            <pc:sldMk cId="1284329534" sldId="260"/>
+            <ac:spMk id="73" creationId="{443F4DC3-BB07-4A15-997E-36D2C9A663CB}"/>
+          </ac:spMkLst>
+        </pc:spChg>
+        <pc:spChg chg="del">
+          <ac:chgData name="Nhut DOAN NGUYEN" userId="d7212ade-34df-43ef-b0a5-cb321af945d9" providerId="ADAL" clId="{51DED03C-BB6F-49A2-B443-0FC1DDC50DED}" dt="2019-11-11T23:02:02.042" v="598" actId="478"/>
+          <ac:spMkLst>
+            <pc:docMk/>
+            <pc:sldMk cId="1284329534" sldId="260"/>
+            <ac:spMk id="74" creationId="{21DC3087-8AB3-4078-AB9F-694E8C3C4DC1}"/>
+          </ac:spMkLst>
+        </pc:spChg>
+        <pc:spChg chg="del">
+          <ac:chgData name="Nhut DOAN NGUYEN" userId="d7212ade-34df-43ef-b0a5-cb321af945d9" providerId="ADAL" clId="{51DED03C-BB6F-49A2-B443-0FC1DDC50DED}" dt="2019-11-11T23:02:02.042" v="598" actId="478"/>
+          <ac:spMkLst>
+            <pc:docMk/>
+            <pc:sldMk cId="1284329534" sldId="260"/>
+            <ac:spMk id="75" creationId="{7FD7AE9E-A357-4388-A42A-3C97CC57DFEA}"/>
+          </ac:spMkLst>
+        </pc:spChg>
+        <pc:spChg chg="del">
+          <ac:chgData name="Nhut DOAN NGUYEN" userId="d7212ade-34df-43ef-b0a5-cb321af945d9" providerId="ADAL" clId="{51DED03C-BB6F-49A2-B443-0FC1DDC50DED}" dt="2019-11-11T23:02:02.042" v="598" actId="478"/>
+          <ac:spMkLst>
+            <pc:docMk/>
+            <pc:sldMk cId="1284329534" sldId="260"/>
+            <ac:spMk id="76" creationId="{E5C0CD96-8B55-4284-B656-E38771588BEA}"/>
+          </ac:spMkLst>
+        </pc:spChg>
+        <pc:spChg chg="add del mod">
+          <ac:chgData name="Nhut DOAN NGUYEN" userId="d7212ade-34df-43ef-b0a5-cb321af945d9" providerId="ADAL" clId="{51DED03C-BB6F-49A2-B443-0FC1DDC50DED}" dt="2019-11-11T23:01:50.549" v="595" actId="478"/>
+          <ac:spMkLst>
+            <pc:docMk/>
+            <pc:sldMk cId="1284329534" sldId="260"/>
+            <ac:spMk id="78" creationId="{CF6DC8DB-46A6-4165-A360-9116ABA15F2B}"/>
+          </ac:spMkLst>
+        </pc:spChg>
+        <pc:spChg chg="del">
+          <ac:chgData name="Nhut DOAN NGUYEN" userId="d7212ade-34df-43ef-b0a5-cb321af945d9" providerId="ADAL" clId="{51DED03C-BB6F-49A2-B443-0FC1DDC50DED}" dt="2019-11-11T23:02:02.042" v="598" actId="478"/>
+          <ac:spMkLst>
+            <pc:docMk/>
+            <pc:sldMk cId="1284329534" sldId="260"/>
+            <ac:spMk id="79" creationId="{61F91505-AE21-4E8D-9F65-2F4FC3D5AD56}"/>
+          </ac:spMkLst>
+        </pc:spChg>
+        <pc:spChg chg="add del mod">
+          <ac:chgData name="Nhut DOAN NGUYEN" userId="d7212ade-34df-43ef-b0a5-cb321af945d9" providerId="ADAL" clId="{51DED03C-BB6F-49A2-B443-0FC1DDC50DED}" dt="2019-11-11T23:01:50.549" v="595" actId="478"/>
+          <ac:spMkLst>
+            <pc:docMk/>
+            <pc:sldMk cId="1284329534" sldId="260"/>
+            <ac:spMk id="80" creationId="{0643C5FA-7C93-4EFD-B0D9-C18F58DE5EC0}"/>
+          </ac:spMkLst>
+        </pc:spChg>
+        <pc:spChg chg="add del mod">
+          <ac:chgData name="Nhut DOAN NGUYEN" userId="d7212ade-34df-43ef-b0a5-cb321af945d9" providerId="ADAL" clId="{51DED03C-BB6F-49A2-B443-0FC1DDC50DED}" dt="2019-11-11T23:01:50.549" v="595" actId="478"/>
+          <ac:spMkLst>
+            <pc:docMk/>
+            <pc:sldMk cId="1284329534" sldId="260"/>
+            <ac:spMk id="81" creationId="{2E1E23C0-6EB5-4FA8-A1D4-3573C87A01BE}"/>
+          </ac:spMkLst>
+        </pc:spChg>
+        <pc:cxnChg chg="add del mod">
+          <ac:chgData name="Nhut DOAN NGUYEN" userId="d7212ade-34df-43ef-b0a5-cb321af945d9" providerId="ADAL" clId="{51DED03C-BB6F-49A2-B443-0FC1DDC50DED}" dt="2019-11-11T23:01:50.549" v="595" actId="478"/>
+          <ac:cxnSpMkLst>
+            <pc:docMk/>
+            <pc:sldMk cId="1284329534" sldId="260"/>
+            <ac:cxnSpMk id="18" creationId="{11FD1652-9ED9-43DD-A19A-55069D295275}"/>
+          </ac:cxnSpMkLst>
+        </pc:cxnChg>
+        <pc:cxnChg chg="add del mod">
+          <ac:chgData name="Nhut DOAN NGUYEN" userId="d7212ade-34df-43ef-b0a5-cb321af945d9" providerId="ADAL" clId="{51DED03C-BB6F-49A2-B443-0FC1DDC50DED}" dt="2019-11-11T23:01:50.549" v="595" actId="478"/>
+          <ac:cxnSpMkLst>
+            <pc:docMk/>
+            <pc:sldMk cId="1284329534" sldId="260"/>
+            <ac:cxnSpMk id="20" creationId="{D6DCB3F2-50A5-4804-95A8-E80A7E5F5AB3}"/>
+          </ac:cxnSpMkLst>
+        </pc:cxnChg>
+        <pc:cxnChg chg="del">
+          <ac:chgData name="Nhut DOAN NGUYEN" userId="d7212ade-34df-43ef-b0a5-cb321af945d9" providerId="ADAL" clId="{51DED03C-BB6F-49A2-B443-0FC1DDC50DED}" dt="2019-11-11T23:01:58.873" v="597" actId="478"/>
+          <ac:cxnSpMkLst>
+            <pc:docMk/>
+            <pc:sldMk cId="1284329534" sldId="260"/>
+            <ac:cxnSpMk id="24" creationId="{D062D7D3-6D26-4A3C-BF9A-4FEECD7FAD8E}"/>
+          </ac:cxnSpMkLst>
+        </pc:cxnChg>
+        <pc:cxnChg chg="add del mod">
+          <ac:chgData name="Nhut DOAN NGUYEN" userId="d7212ade-34df-43ef-b0a5-cb321af945d9" providerId="ADAL" clId="{51DED03C-BB6F-49A2-B443-0FC1DDC50DED}" dt="2019-11-11T23:01:50.549" v="595" actId="478"/>
+          <ac:cxnSpMkLst>
+            <pc:docMk/>
+            <pc:sldMk cId="1284329534" sldId="260"/>
+            <ac:cxnSpMk id="26" creationId="{F308478F-E970-41C9-933D-A44F5058D6EE}"/>
+          </ac:cxnSpMkLst>
+        </pc:cxnChg>
+        <pc:cxnChg chg="add del mod">
+          <ac:chgData name="Nhut DOAN NGUYEN" userId="d7212ade-34df-43ef-b0a5-cb321af945d9" providerId="ADAL" clId="{51DED03C-BB6F-49A2-B443-0FC1DDC50DED}" dt="2019-11-11T23:01:50.549" v="595" actId="478"/>
+          <ac:cxnSpMkLst>
+            <pc:docMk/>
+            <pc:sldMk cId="1284329534" sldId="260"/>
+            <ac:cxnSpMk id="28" creationId="{2E01EA5D-3799-4FE9-A15E-691AFAAD8FEB}"/>
+          </ac:cxnSpMkLst>
+        </pc:cxnChg>
+        <pc:cxnChg chg="del">
+          <ac:chgData name="Nhut DOAN NGUYEN" userId="d7212ade-34df-43ef-b0a5-cb321af945d9" providerId="ADAL" clId="{51DED03C-BB6F-49A2-B443-0FC1DDC50DED}" dt="2019-11-11T23:02:02.042" v="598" actId="478"/>
+          <ac:cxnSpMkLst>
+            <pc:docMk/>
+            <pc:sldMk cId="1284329534" sldId="260"/>
+            <ac:cxnSpMk id="30" creationId="{190B51C5-F37B-4C40-9CAB-A3F6873AAC4E}"/>
+          </ac:cxnSpMkLst>
+        </pc:cxnChg>
+        <pc:cxnChg chg="del mod">
+          <ac:chgData name="Nhut DOAN NGUYEN" userId="d7212ade-34df-43ef-b0a5-cb321af945d9" providerId="ADAL" clId="{51DED03C-BB6F-49A2-B443-0FC1DDC50DED}" dt="2019-11-11T23:02:02.042" v="598" actId="478"/>
+          <ac:cxnSpMkLst>
+            <pc:docMk/>
+            <pc:sldMk cId="1284329534" sldId="260"/>
+            <ac:cxnSpMk id="32" creationId="{2FAF8528-0D59-48E1-91CE-1C72F174FA27}"/>
+          </ac:cxnSpMkLst>
+        </pc:cxnChg>
+        <pc:cxnChg chg="add del mod">
+          <ac:chgData name="Nhut DOAN NGUYEN" userId="d7212ade-34df-43ef-b0a5-cb321af945d9" providerId="ADAL" clId="{51DED03C-BB6F-49A2-B443-0FC1DDC50DED}" dt="2019-11-11T23:01:50.549" v="595" actId="478"/>
+          <ac:cxnSpMkLst>
+            <pc:docMk/>
+            <pc:sldMk cId="1284329534" sldId="260"/>
+            <ac:cxnSpMk id="40" creationId="{4F4BD4E8-52F0-42E6-AD0F-2C340DBEA386}"/>
+          </ac:cxnSpMkLst>
+        </pc:cxnChg>
+        <pc:cxnChg chg="add del mod">
+          <ac:chgData name="Nhut DOAN NGUYEN" userId="d7212ade-34df-43ef-b0a5-cb321af945d9" providerId="ADAL" clId="{51DED03C-BB6F-49A2-B443-0FC1DDC50DED}" dt="2019-11-11T23:01:50.549" v="595" actId="478"/>
+          <ac:cxnSpMkLst>
+            <pc:docMk/>
+            <pc:sldMk cId="1284329534" sldId="260"/>
+            <ac:cxnSpMk id="42" creationId="{228BA909-583C-4327-A629-F80912AB7A83}"/>
+          </ac:cxnSpMkLst>
+        </pc:cxnChg>
+        <pc:cxnChg chg="del mod">
+          <ac:chgData name="Nhut DOAN NGUYEN" userId="d7212ade-34df-43ef-b0a5-cb321af945d9" providerId="ADAL" clId="{51DED03C-BB6F-49A2-B443-0FC1DDC50DED}" dt="2019-11-11T23:02:02.042" v="598" actId="478"/>
+          <ac:cxnSpMkLst>
+            <pc:docMk/>
+            <pc:sldMk cId="1284329534" sldId="260"/>
+            <ac:cxnSpMk id="44" creationId="{40E6EC3D-9B26-4BF0-9D31-37859FFC2D51}"/>
+          </ac:cxnSpMkLst>
+        </pc:cxnChg>
+        <pc:cxnChg chg="del">
+          <ac:chgData name="Nhut DOAN NGUYEN" userId="d7212ade-34df-43ef-b0a5-cb321af945d9" providerId="ADAL" clId="{51DED03C-BB6F-49A2-B443-0FC1DDC50DED}" dt="2019-11-11T23:02:02.042" v="598" actId="478"/>
+          <ac:cxnSpMkLst>
+            <pc:docMk/>
+            <pc:sldMk cId="1284329534" sldId="260"/>
+            <ac:cxnSpMk id="46" creationId="{95330A63-B35C-4DB6-A98A-B47B77085D88}"/>
+          </ac:cxnSpMkLst>
+        </pc:cxnChg>
+        <pc:cxnChg chg="add del mod">
+          <ac:chgData name="Nhut DOAN NGUYEN" userId="d7212ade-34df-43ef-b0a5-cb321af945d9" providerId="ADAL" clId="{51DED03C-BB6F-49A2-B443-0FC1DDC50DED}" dt="2019-11-11T23:01:50.549" v="595" actId="478"/>
+          <ac:cxnSpMkLst>
+            <pc:docMk/>
+            <pc:sldMk cId="1284329534" sldId="260"/>
+            <ac:cxnSpMk id="48" creationId="{2123147A-306D-4360-B4D1-F2AF513BEEEF}"/>
+          </ac:cxnSpMkLst>
+        </pc:cxnChg>
+        <pc:cxnChg chg="add del mod">
+          <ac:chgData name="Nhut DOAN NGUYEN" userId="d7212ade-34df-43ef-b0a5-cb321af945d9" providerId="ADAL" clId="{51DED03C-BB6F-49A2-B443-0FC1DDC50DED}" dt="2019-11-11T23:01:50.549" v="595" actId="478"/>
+          <ac:cxnSpMkLst>
+            <pc:docMk/>
+            <pc:sldMk cId="1284329534" sldId="260"/>
+            <ac:cxnSpMk id="50" creationId="{19843E4A-054B-4217-B9C4-A89ACCA72B2F}"/>
+          </ac:cxnSpMkLst>
+        </pc:cxnChg>
+        <pc:cxnChg chg="add del mod">
+          <ac:chgData name="Nhut DOAN NGUYEN" userId="d7212ade-34df-43ef-b0a5-cb321af945d9" providerId="ADAL" clId="{51DED03C-BB6F-49A2-B443-0FC1DDC50DED}" dt="2019-11-11T23:01:50.549" v="595" actId="478"/>
+          <ac:cxnSpMkLst>
+            <pc:docMk/>
+            <pc:sldMk cId="1284329534" sldId="260"/>
+            <ac:cxnSpMk id="52" creationId="{0CAF88D5-BE1C-4A4C-9A3C-F70B5570AA3A}"/>
+          </ac:cxnSpMkLst>
+        </pc:cxnChg>
+        <pc:cxnChg chg="add del mod">
+          <ac:chgData name="Nhut DOAN NGUYEN" userId="d7212ade-34df-43ef-b0a5-cb321af945d9" providerId="ADAL" clId="{51DED03C-BB6F-49A2-B443-0FC1DDC50DED}" dt="2019-11-11T23:01:50.549" v="595" actId="478"/>
+          <ac:cxnSpMkLst>
+            <pc:docMk/>
+            <pc:sldMk cId="1284329534" sldId="260"/>
+            <ac:cxnSpMk id="54" creationId="{EEA28B46-16E8-4A0E-848B-F682B64CE995}"/>
+          </ac:cxnSpMkLst>
+        </pc:cxnChg>
+      </pc:sldChg>
+      <pc:sldChg chg="delSp modSp add">
+        <pc:chgData name="Nhut DOAN NGUYEN" userId="d7212ade-34df-43ef-b0a5-cb321af945d9" providerId="ADAL" clId="{51DED03C-BB6F-49A2-B443-0FC1DDC50DED}" dt="2019-11-11T23:24:30.896" v="614" actId="20577"/>
+        <pc:sldMkLst>
+          <pc:docMk/>
+          <pc:sldMk cId="1440260042" sldId="261"/>
+        </pc:sldMkLst>
+        <pc:spChg chg="del">
+          <ac:chgData name="Nhut DOAN NGUYEN" userId="d7212ade-34df-43ef-b0a5-cb321af945d9" providerId="ADAL" clId="{51DED03C-BB6F-49A2-B443-0FC1DDC50DED}" dt="2019-11-11T23:24:11.934" v="602" actId="478"/>
+          <ac:spMkLst>
+            <pc:docMk/>
+            <pc:sldMk cId="1440260042" sldId="261"/>
+            <ac:spMk id="4" creationId="{F697C020-4794-47E4-B14F-D062237DA5BC}"/>
+          </ac:spMkLst>
+        </pc:spChg>
+        <pc:spChg chg="del">
+          <ac:chgData name="Nhut DOAN NGUYEN" userId="d7212ade-34df-43ef-b0a5-cb321af945d9" providerId="ADAL" clId="{51DED03C-BB6F-49A2-B443-0FC1DDC50DED}" dt="2019-11-11T23:24:09.812" v="601" actId="478"/>
+          <ac:spMkLst>
+            <pc:docMk/>
+            <pc:sldMk cId="1440260042" sldId="261"/>
+            <ac:spMk id="5" creationId="{6746CAAB-D3C5-4C1A-9C3F-3DBB89E5C95B}"/>
+          </ac:spMkLst>
+        </pc:spChg>
+        <pc:spChg chg="del">
+          <ac:chgData name="Nhut DOAN NGUYEN" userId="d7212ade-34df-43ef-b0a5-cb321af945d9" providerId="ADAL" clId="{51DED03C-BB6F-49A2-B443-0FC1DDC50DED}" dt="2019-11-11T23:24:09.812" v="601" actId="478"/>
+          <ac:spMkLst>
+            <pc:docMk/>
+            <pc:sldMk cId="1440260042" sldId="261"/>
+            <ac:spMk id="7" creationId="{EA89A71D-2FE3-4A36-B820-3508994A7EC3}"/>
+          </ac:spMkLst>
+        </pc:spChg>
+        <pc:spChg chg="del">
+          <ac:chgData name="Nhut DOAN NGUYEN" userId="d7212ade-34df-43ef-b0a5-cb321af945d9" providerId="ADAL" clId="{51DED03C-BB6F-49A2-B443-0FC1DDC50DED}" dt="2019-11-11T23:24:09.812" v="601" actId="478"/>
+          <ac:spMkLst>
+            <pc:docMk/>
+            <pc:sldMk cId="1440260042" sldId="261"/>
+            <ac:spMk id="8" creationId="{04ECF46D-C76B-4D43-A1AC-A21ADA02A34D}"/>
+          </ac:spMkLst>
+        </pc:spChg>
+        <pc:spChg chg="del">
+          <ac:chgData name="Nhut DOAN NGUYEN" userId="d7212ade-34df-43ef-b0a5-cb321af945d9" providerId="ADAL" clId="{51DED03C-BB6F-49A2-B443-0FC1DDC50DED}" dt="2019-11-11T23:24:09.812" v="601" actId="478"/>
+          <ac:spMkLst>
+            <pc:docMk/>
+            <pc:sldMk cId="1440260042" sldId="261"/>
+            <ac:spMk id="9" creationId="{29680307-A9F2-4402-B9FD-23DA3BC5544A}"/>
+          </ac:spMkLst>
+        </pc:spChg>
+        <pc:spChg chg="del">
+          <ac:chgData name="Nhut DOAN NGUYEN" userId="d7212ade-34df-43ef-b0a5-cb321af945d9" providerId="ADAL" clId="{51DED03C-BB6F-49A2-B443-0FC1DDC50DED}" dt="2019-11-11T23:24:09.812" v="601" actId="478"/>
+          <ac:spMkLst>
+            <pc:docMk/>
+            <pc:sldMk cId="1440260042" sldId="261"/>
+            <ac:spMk id="10" creationId="{FF83EDEB-EEE1-41C4-9756-CD597487D99B}"/>
+          </ac:spMkLst>
+        </pc:spChg>
+        <pc:spChg chg="del">
+          <ac:chgData name="Nhut DOAN NGUYEN" userId="d7212ade-34df-43ef-b0a5-cb321af945d9" providerId="ADAL" clId="{51DED03C-BB6F-49A2-B443-0FC1DDC50DED}" dt="2019-11-11T23:24:14.774" v="603" actId="478"/>
+          <ac:spMkLst>
+            <pc:docMk/>
+            <pc:sldMk cId="1440260042" sldId="261"/>
+            <ac:spMk id="11" creationId="{ED525DFF-504A-4070-94F5-463213F78CBB}"/>
+          </ac:spMkLst>
+        </pc:spChg>
+        <pc:spChg chg="del mod">
+          <ac:chgData name="Nhut DOAN NGUYEN" userId="d7212ade-34df-43ef-b0a5-cb321af945d9" providerId="ADAL" clId="{51DED03C-BB6F-49A2-B443-0FC1DDC50DED}" dt="2019-11-11T23:24:20.626" v="606" actId="478"/>
+          <ac:spMkLst>
+            <pc:docMk/>
+            <pc:sldMk cId="1440260042" sldId="261"/>
+            <ac:spMk id="14" creationId="{577D9363-6DC6-45C5-9712-A8623B11DD83}"/>
+          </ac:spMkLst>
+        </pc:spChg>
+        <pc:spChg chg="del">
+          <ac:chgData name="Nhut DOAN NGUYEN" userId="d7212ade-34df-43ef-b0a5-cb321af945d9" providerId="ADAL" clId="{51DED03C-BB6F-49A2-B443-0FC1DDC50DED}" dt="2019-11-11T23:24:09.812" v="601" actId="478"/>
+          <ac:spMkLst>
+            <pc:docMk/>
+            <pc:sldMk cId="1440260042" sldId="261"/>
+            <ac:spMk id="55" creationId="{A24E4A53-116A-4B05-931E-25E6DA986428}"/>
+          </ac:spMkLst>
+        </pc:spChg>
+        <pc:spChg chg="del">
+          <ac:chgData name="Nhut DOAN NGUYEN" userId="d7212ade-34df-43ef-b0a5-cb321af945d9" providerId="ADAL" clId="{51DED03C-BB6F-49A2-B443-0FC1DDC50DED}" dt="2019-11-11T23:24:09.812" v="601" actId="478"/>
+          <ac:spMkLst>
+            <pc:docMk/>
+            <pc:sldMk cId="1440260042" sldId="261"/>
+            <ac:spMk id="56" creationId="{D98C9F07-B468-48B8-A2EC-CB4AA3433007}"/>
+          </ac:spMkLst>
+        </pc:spChg>
+        <pc:spChg chg="del">
+          <ac:chgData name="Nhut DOAN NGUYEN" userId="d7212ade-34df-43ef-b0a5-cb321af945d9" providerId="ADAL" clId="{51DED03C-BB6F-49A2-B443-0FC1DDC50DED}" dt="2019-11-11T23:24:09.812" v="601" actId="478"/>
+          <ac:spMkLst>
+            <pc:docMk/>
+            <pc:sldMk cId="1440260042" sldId="261"/>
+            <ac:spMk id="57" creationId="{BE9A953B-4140-4D55-AA29-8EAA3E6EAC19}"/>
+          </ac:spMkLst>
+        </pc:spChg>
+        <pc:spChg chg="del">
+          <ac:chgData name="Nhut DOAN NGUYEN" userId="d7212ade-34df-43ef-b0a5-cb321af945d9" providerId="ADAL" clId="{51DED03C-BB6F-49A2-B443-0FC1DDC50DED}" dt="2019-11-11T23:24:09.812" v="601" actId="478"/>
+          <ac:spMkLst>
+            <pc:docMk/>
+            <pc:sldMk cId="1440260042" sldId="261"/>
+            <ac:spMk id="58" creationId="{8CEF25F8-000F-4664-BD3A-6C5DECBD41A7}"/>
+          </ac:spMkLst>
+        </pc:spChg>
+        <pc:spChg chg="del">
+          <ac:chgData name="Nhut DOAN NGUYEN" userId="d7212ade-34df-43ef-b0a5-cb321af945d9" providerId="ADAL" clId="{51DED03C-BB6F-49A2-B443-0FC1DDC50DED}" dt="2019-11-11T23:24:22.870" v="607" actId="478"/>
+          <ac:spMkLst>
+            <pc:docMk/>
+            <pc:sldMk cId="1440260042" sldId="261"/>
+            <ac:spMk id="66" creationId="{F3CCD863-4E7C-4D17-BEFE-A65DDFB8F83D}"/>
+          </ac:spMkLst>
+        </pc:spChg>
+        <pc:spChg chg="del">
+          <ac:chgData name="Nhut DOAN NGUYEN" userId="d7212ade-34df-43ef-b0a5-cb321af945d9" providerId="ADAL" clId="{51DED03C-BB6F-49A2-B443-0FC1DDC50DED}" dt="2019-11-11T23:24:09.812" v="601" actId="478"/>
+          <ac:spMkLst>
+            <pc:docMk/>
+            <pc:sldMk cId="1440260042" sldId="261"/>
+            <ac:spMk id="67" creationId="{8990D107-3C45-438C-9E5F-FC91985ABA79}"/>
+          </ac:spMkLst>
+        </pc:spChg>
+        <pc:spChg chg="del">
+          <ac:chgData name="Nhut DOAN NGUYEN" userId="d7212ade-34df-43ef-b0a5-cb321af945d9" providerId="ADAL" clId="{51DED03C-BB6F-49A2-B443-0FC1DDC50DED}" dt="2019-11-11T23:24:09.812" v="601" actId="478"/>
+          <ac:spMkLst>
+            <pc:docMk/>
+            <pc:sldMk cId="1440260042" sldId="261"/>
+            <ac:spMk id="69" creationId="{CCF4AD14-7522-4FDC-9A66-DF9A4812E745}"/>
+          </ac:spMkLst>
+        </pc:spChg>
+        <pc:spChg chg="del">
+          <ac:chgData name="Nhut DOAN NGUYEN" userId="d7212ade-34df-43ef-b0a5-cb321af945d9" providerId="ADAL" clId="{51DED03C-BB6F-49A2-B443-0FC1DDC50DED}" dt="2019-11-11T23:24:09.812" v="601" actId="478"/>
+          <ac:spMkLst>
+            <pc:docMk/>
+            <pc:sldMk cId="1440260042" sldId="261"/>
+            <ac:spMk id="70" creationId="{BFE1B509-7AE7-4AFF-8DE3-7810CF89A8D4}"/>
+          </ac:spMkLst>
+        </pc:spChg>
+        <pc:spChg chg="del">
+          <ac:chgData name="Nhut DOAN NGUYEN" userId="d7212ade-34df-43ef-b0a5-cb321af945d9" providerId="ADAL" clId="{51DED03C-BB6F-49A2-B443-0FC1DDC50DED}" dt="2019-11-11T23:24:09.812" v="601" actId="478"/>
+          <ac:spMkLst>
+            <pc:docMk/>
+            <pc:sldMk cId="1440260042" sldId="261"/>
+            <ac:spMk id="73" creationId="{443F4DC3-BB07-4A15-997E-36D2C9A663CB}"/>
+          </ac:spMkLst>
+        </pc:spChg>
+        <pc:spChg chg="del">
+          <ac:chgData name="Nhut DOAN NGUYEN" userId="d7212ade-34df-43ef-b0a5-cb321af945d9" providerId="ADAL" clId="{51DED03C-BB6F-49A2-B443-0FC1DDC50DED}" dt="2019-11-11T23:24:09.812" v="601" actId="478"/>
+          <ac:spMkLst>
+            <pc:docMk/>
+            <pc:sldMk cId="1440260042" sldId="261"/>
+            <ac:spMk id="74" creationId="{21DC3087-8AB3-4078-AB9F-694E8C3C4DC1}"/>
+          </ac:spMkLst>
+        </pc:spChg>
+        <pc:spChg chg="del">
+          <ac:chgData name="Nhut DOAN NGUYEN" userId="d7212ade-34df-43ef-b0a5-cb321af945d9" providerId="ADAL" clId="{51DED03C-BB6F-49A2-B443-0FC1DDC50DED}" dt="2019-11-11T23:24:09.812" v="601" actId="478"/>
+          <ac:spMkLst>
+            <pc:docMk/>
+            <pc:sldMk cId="1440260042" sldId="261"/>
+            <ac:spMk id="75" creationId="{7FD7AE9E-A357-4388-A42A-3C97CC57DFEA}"/>
+          </ac:spMkLst>
+        </pc:spChg>
+        <pc:spChg chg="del">
+          <ac:chgData name="Nhut DOAN NGUYEN" userId="d7212ade-34df-43ef-b0a5-cb321af945d9" providerId="ADAL" clId="{51DED03C-BB6F-49A2-B443-0FC1DDC50DED}" dt="2019-11-11T23:24:14.774" v="603" actId="478"/>
+          <ac:spMkLst>
+            <pc:docMk/>
+            <pc:sldMk cId="1440260042" sldId="261"/>
+            <ac:spMk id="76" creationId="{E5C0CD96-8B55-4284-B656-E38771588BEA}"/>
+          </ac:spMkLst>
+        </pc:spChg>
+        <pc:spChg chg="del">
+          <ac:chgData name="Nhut DOAN NGUYEN" userId="d7212ade-34df-43ef-b0a5-cb321af945d9" providerId="ADAL" clId="{51DED03C-BB6F-49A2-B443-0FC1DDC50DED}" dt="2019-11-11T23:24:17.172" v="604" actId="478"/>
+          <ac:spMkLst>
+            <pc:docMk/>
+            <pc:sldMk cId="1440260042" sldId="261"/>
+            <ac:spMk id="78" creationId="{CF6DC8DB-46A6-4165-A360-9116ABA15F2B}"/>
+          </ac:spMkLst>
+        </pc:spChg>
+        <pc:spChg chg="del">
+          <ac:chgData name="Nhut DOAN NGUYEN" userId="d7212ade-34df-43ef-b0a5-cb321af945d9" providerId="ADAL" clId="{51DED03C-BB6F-49A2-B443-0FC1DDC50DED}" dt="2019-11-11T23:24:14.774" v="603" actId="478"/>
+          <ac:spMkLst>
+            <pc:docMk/>
+            <pc:sldMk cId="1440260042" sldId="261"/>
+            <ac:spMk id="79" creationId="{61F91505-AE21-4E8D-9F65-2F4FC3D5AD56}"/>
+          </ac:spMkLst>
+        </pc:spChg>
+        <pc:spChg chg="mod">
+          <ac:chgData name="Nhut DOAN NGUYEN" userId="d7212ade-34df-43ef-b0a5-cb321af945d9" providerId="ADAL" clId="{51DED03C-BB6F-49A2-B443-0FC1DDC50DED}" dt="2019-11-11T23:24:30.896" v="614" actId="20577"/>
+          <ac:spMkLst>
+            <pc:docMk/>
+            <pc:sldMk cId="1440260042" sldId="261"/>
+            <ac:spMk id="80" creationId="{0643C5FA-7C93-4EFD-B0D9-C18F58DE5EC0}"/>
+          </ac:spMkLst>
+        </pc:spChg>
+        <pc:spChg chg="del">
+          <ac:chgData name="Nhut DOAN NGUYEN" userId="d7212ade-34df-43ef-b0a5-cb321af945d9" providerId="ADAL" clId="{51DED03C-BB6F-49A2-B443-0FC1DDC50DED}" dt="2019-11-11T23:24:17.172" v="604" actId="478"/>
+          <ac:spMkLst>
+            <pc:docMk/>
+            <pc:sldMk cId="1440260042" sldId="261"/>
+            <ac:spMk id="81" creationId="{2E1E23C0-6EB5-4FA8-A1D4-3573C87A01BE}"/>
+          </ac:spMkLst>
+        </pc:spChg>
+        <pc:cxnChg chg="del mod">
+          <ac:chgData name="Nhut DOAN NGUYEN" userId="d7212ade-34df-43ef-b0a5-cb321af945d9" providerId="ADAL" clId="{51DED03C-BB6F-49A2-B443-0FC1DDC50DED}" dt="2019-11-11T23:24:09.812" v="601" actId="478"/>
+          <ac:cxnSpMkLst>
+            <pc:docMk/>
+            <pc:sldMk cId="1440260042" sldId="261"/>
+            <ac:cxnSpMk id="16" creationId="{4438300A-2C1E-4714-BFD4-2E5E8E4EA2B6}"/>
+          </ac:cxnSpMkLst>
+        </pc:cxnChg>
+        <pc:cxnChg chg="del">
+          <ac:chgData name="Nhut DOAN NGUYEN" userId="d7212ade-34df-43ef-b0a5-cb321af945d9" providerId="ADAL" clId="{51DED03C-BB6F-49A2-B443-0FC1DDC50DED}" dt="2019-11-11T23:24:09.812" v="601" actId="478"/>
+          <ac:cxnSpMkLst>
+            <pc:docMk/>
+            <pc:sldMk cId="1440260042" sldId="261"/>
+            <ac:cxnSpMk id="18" creationId="{11FD1652-9ED9-43DD-A19A-55069D295275}"/>
+          </ac:cxnSpMkLst>
+        </pc:cxnChg>
+        <pc:cxnChg chg="del mod">
+          <ac:chgData name="Nhut DOAN NGUYEN" userId="d7212ade-34df-43ef-b0a5-cb321af945d9" providerId="ADAL" clId="{51DED03C-BB6F-49A2-B443-0FC1DDC50DED}" dt="2019-11-11T23:24:09.812" v="601" actId="478"/>
+          <ac:cxnSpMkLst>
+            <pc:docMk/>
+            <pc:sldMk cId="1440260042" sldId="261"/>
+            <ac:cxnSpMk id="20" creationId="{D6DCB3F2-50A5-4804-95A8-E80A7E5F5AB3}"/>
+          </ac:cxnSpMkLst>
+        </pc:cxnChg>
+        <pc:cxnChg chg="del">
+          <ac:chgData name="Nhut DOAN NGUYEN" userId="d7212ade-34df-43ef-b0a5-cb321af945d9" providerId="ADAL" clId="{51DED03C-BB6F-49A2-B443-0FC1DDC50DED}" dt="2019-11-11T23:24:09.812" v="601" actId="478"/>
+          <ac:cxnSpMkLst>
+            <pc:docMk/>
+            <pc:sldMk cId="1440260042" sldId="261"/>
+            <ac:cxnSpMk id="24" creationId="{D062D7D3-6D26-4A3C-BF9A-4FEECD7FAD8E}"/>
+          </ac:cxnSpMkLst>
+        </pc:cxnChg>
+        <pc:cxnChg chg="del">
+          <ac:chgData name="Nhut DOAN NGUYEN" userId="d7212ade-34df-43ef-b0a5-cb321af945d9" providerId="ADAL" clId="{51DED03C-BB6F-49A2-B443-0FC1DDC50DED}" dt="2019-11-11T23:24:09.812" v="601" actId="478"/>
+          <ac:cxnSpMkLst>
+            <pc:docMk/>
+            <pc:sldMk cId="1440260042" sldId="261"/>
+            <ac:cxnSpMk id="26" creationId="{F308478F-E970-41C9-933D-A44F5058D6EE}"/>
+          </ac:cxnSpMkLst>
+        </pc:cxnChg>
+        <pc:cxnChg chg="del">
+          <ac:chgData name="Nhut DOAN NGUYEN" userId="d7212ade-34df-43ef-b0a5-cb321af945d9" providerId="ADAL" clId="{51DED03C-BB6F-49A2-B443-0FC1DDC50DED}" dt="2019-11-11T23:24:09.812" v="601" actId="478"/>
+          <ac:cxnSpMkLst>
+            <pc:docMk/>
+            <pc:sldMk cId="1440260042" sldId="261"/>
+            <ac:cxnSpMk id="28" creationId="{2E01EA5D-3799-4FE9-A15E-691AFAAD8FEB}"/>
+          </ac:cxnSpMkLst>
+        </pc:cxnChg>
+        <pc:cxnChg chg="del">
+          <ac:chgData name="Nhut DOAN NGUYEN" userId="d7212ade-34df-43ef-b0a5-cb321af945d9" providerId="ADAL" clId="{51DED03C-BB6F-49A2-B443-0FC1DDC50DED}" dt="2019-11-11T23:24:09.812" v="601" actId="478"/>
+          <ac:cxnSpMkLst>
+            <pc:docMk/>
+            <pc:sldMk cId="1440260042" sldId="261"/>
+            <ac:cxnSpMk id="30" creationId="{190B51C5-F37B-4C40-9CAB-A3F6873AAC4E}"/>
+          </ac:cxnSpMkLst>
+        </pc:cxnChg>
+        <pc:cxnChg chg="del mod">
+          <ac:chgData name="Nhut DOAN NGUYEN" userId="d7212ade-34df-43ef-b0a5-cb321af945d9" providerId="ADAL" clId="{51DED03C-BB6F-49A2-B443-0FC1DDC50DED}" dt="2019-11-11T23:24:09.812" v="601" actId="478"/>
+          <ac:cxnSpMkLst>
+            <pc:docMk/>
+            <pc:sldMk cId="1440260042" sldId="261"/>
+            <ac:cxnSpMk id="32" creationId="{2FAF8528-0D59-48E1-91CE-1C72F174FA27}"/>
+          </ac:cxnSpMkLst>
+        </pc:cxnChg>
+        <pc:cxnChg chg="del mod">
+          <ac:chgData name="Nhut DOAN NGUYEN" userId="d7212ade-34df-43ef-b0a5-cb321af945d9" providerId="ADAL" clId="{51DED03C-BB6F-49A2-B443-0FC1DDC50DED}" dt="2019-11-11T23:24:09.812" v="601" actId="478"/>
+          <ac:cxnSpMkLst>
+            <pc:docMk/>
+            <pc:sldMk cId="1440260042" sldId="261"/>
+            <ac:cxnSpMk id="40" creationId="{4F4BD4E8-52F0-42E6-AD0F-2C340DBEA386}"/>
+          </ac:cxnSpMkLst>
+        </pc:cxnChg>
+        <pc:cxnChg chg="del">
+          <ac:chgData name="Nhut DOAN NGUYEN" userId="d7212ade-34df-43ef-b0a5-cb321af945d9" providerId="ADAL" clId="{51DED03C-BB6F-49A2-B443-0FC1DDC50DED}" dt="2019-11-11T23:24:09.812" v="601" actId="478"/>
+          <ac:cxnSpMkLst>
+            <pc:docMk/>
+            <pc:sldMk cId="1440260042" sldId="261"/>
+            <ac:cxnSpMk id="42" creationId="{228BA909-583C-4327-A629-F80912AB7A83}"/>
+          </ac:cxnSpMkLst>
+        </pc:cxnChg>
+        <pc:cxnChg chg="del mod">
+          <ac:chgData name="Nhut DOAN NGUYEN" userId="d7212ade-34df-43ef-b0a5-cb321af945d9" providerId="ADAL" clId="{51DED03C-BB6F-49A2-B443-0FC1DDC50DED}" dt="2019-11-11T23:24:14.774" v="603" actId="478"/>
+          <ac:cxnSpMkLst>
+            <pc:docMk/>
+            <pc:sldMk cId="1440260042" sldId="261"/>
+            <ac:cxnSpMk id="44" creationId="{40E6EC3D-9B26-4BF0-9D31-37859FFC2D51}"/>
+          </ac:cxnSpMkLst>
+        </pc:cxnChg>
+        <pc:cxnChg chg="del">
+          <ac:chgData name="Nhut DOAN NGUYEN" userId="d7212ade-34df-43ef-b0a5-cb321af945d9" providerId="ADAL" clId="{51DED03C-BB6F-49A2-B443-0FC1DDC50DED}" dt="2019-11-11T23:24:14.774" v="603" actId="478"/>
+          <ac:cxnSpMkLst>
+            <pc:docMk/>
+            <pc:sldMk cId="1440260042" sldId="261"/>
+            <ac:cxnSpMk id="46" creationId="{95330A63-B35C-4DB6-A98A-B47B77085D88}"/>
+          </ac:cxnSpMkLst>
+        </pc:cxnChg>
+        <pc:cxnChg chg="del mod">
+          <ac:chgData name="Nhut DOAN NGUYEN" userId="d7212ade-34df-43ef-b0a5-cb321af945d9" providerId="ADAL" clId="{51DED03C-BB6F-49A2-B443-0FC1DDC50DED}" dt="2019-11-11T23:24:26.592" v="608" actId="478"/>
+          <ac:cxnSpMkLst>
+            <pc:docMk/>
+            <pc:sldMk cId="1440260042" sldId="261"/>
+            <ac:cxnSpMk id="48" creationId="{2123147A-306D-4360-B4D1-F2AF513BEEEF}"/>
+          </ac:cxnSpMkLst>
+        </pc:cxnChg>
+        <pc:cxnChg chg="del">
+          <ac:chgData name="Nhut DOAN NGUYEN" userId="d7212ade-34df-43ef-b0a5-cb321af945d9" providerId="ADAL" clId="{51DED03C-BB6F-49A2-B443-0FC1DDC50DED}" dt="2019-11-11T23:24:26.592" v="608" actId="478"/>
+          <ac:cxnSpMkLst>
+            <pc:docMk/>
+            <pc:sldMk cId="1440260042" sldId="261"/>
+            <ac:cxnSpMk id="50" creationId="{19843E4A-054B-4217-B9C4-A89ACCA72B2F}"/>
+          </ac:cxnSpMkLst>
+        </pc:cxnChg>
+        <pc:cxnChg chg="del mod">
+          <ac:chgData name="Nhut DOAN NGUYEN" userId="d7212ade-34df-43ef-b0a5-cb321af945d9" providerId="ADAL" clId="{51DED03C-BB6F-49A2-B443-0FC1DDC50DED}" dt="2019-11-11T23:24:17.172" v="604" actId="478"/>
+          <ac:cxnSpMkLst>
+            <pc:docMk/>
+            <pc:sldMk cId="1440260042" sldId="261"/>
+            <ac:cxnSpMk id="52" creationId="{0CAF88D5-BE1C-4A4C-9A3C-F70B5570AA3A}"/>
+          </ac:cxnSpMkLst>
+        </pc:cxnChg>
+        <pc:cxnChg chg="del">
+          <ac:chgData name="Nhut DOAN NGUYEN" userId="d7212ade-34df-43ef-b0a5-cb321af945d9" providerId="ADAL" clId="{51DED03C-BB6F-49A2-B443-0FC1DDC50DED}" dt="2019-11-11T23:24:17.172" v="604" actId="478"/>
+          <ac:cxnSpMkLst>
+            <pc:docMk/>
+            <pc:sldMk cId="1440260042" sldId="261"/>
+            <ac:cxnSpMk id="54" creationId="{EEA28B46-16E8-4A0E-848B-F682B64CE995}"/>
+          </ac:cxnSpMkLst>
+        </pc:cxnChg>
+      </pc:sldChg>
+      <pc:sldChg chg="add del">
+        <pc:chgData name="Nhut DOAN NGUYEN" userId="d7212ade-34df-43ef-b0a5-cb321af945d9" providerId="ADAL" clId="{51DED03C-BB6F-49A2-B443-0FC1DDC50DED}" dt="2019-11-11T23:32:49.300" v="616" actId="2696"/>
+        <pc:sldMkLst>
+          <pc:docMk/>
+          <pc:sldMk cId="2097531634" sldId="262"/>
+        </pc:sldMkLst>
+      </pc:sldChg>
+      <pc:sldChg chg="delSp modSp add">
+        <pc:chgData name="Nhut DOAN NGUYEN" userId="d7212ade-34df-43ef-b0a5-cb321af945d9" providerId="ADAL" clId="{51DED03C-BB6F-49A2-B443-0FC1DDC50DED}" dt="2019-11-11T23:33:06.439" v="621" actId="478"/>
+        <pc:sldMkLst>
+          <pc:docMk/>
+          <pc:sldMk cId="1280034146" sldId="263"/>
+        </pc:sldMkLst>
+        <pc:spChg chg="del">
+          <ac:chgData name="Nhut DOAN NGUYEN" userId="d7212ade-34df-43ef-b0a5-cb321af945d9" providerId="ADAL" clId="{51DED03C-BB6F-49A2-B443-0FC1DDC50DED}" dt="2019-11-11T23:32:57.234" v="617" actId="478"/>
+          <ac:spMkLst>
+            <pc:docMk/>
+            <pc:sldMk cId="1280034146" sldId="263"/>
+            <ac:spMk id="4" creationId="{F697C020-4794-47E4-B14F-D062237DA5BC}"/>
+          </ac:spMkLst>
+        </pc:spChg>
+        <pc:spChg chg="del">
+          <ac:chgData name="Nhut DOAN NGUYEN" userId="d7212ade-34df-43ef-b0a5-cb321af945d9" providerId="ADAL" clId="{51DED03C-BB6F-49A2-B443-0FC1DDC50DED}" dt="2019-11-11T23:32:57.234" v="617" actId="478"/>
+          <ac:spMkLst>
+            <pc:docMk/>
+            <pc:sldMk cId="1280034146" sldId="263"/>
+            <ac:spMk id="5" creationId="{6746CAAB-D3C5-4C1A-9C3F-3DBB89E5C95B}"/>
+          </ac:spMkLst>
+        </pc:spChg>
+        <pc:spChg chg="del">
+          <ac:chgData name="Nhut DOAN NGUYEN" userId="d7212ade-34df-43ef-b0a5-cb321af945d9" providerId="ADAL" clId="{51DED03C-BB6F-49A2-B443-0FC1DDC50DED}" dt="2019-11-11T23:32:57.234" v="617" actId="478"/>
+          <ac:spMkLst>
+            <pc:docMk/>
+            <pc:sldMk cId="1280034146" sldId="263"/>
+            <ac:spMk id="7" creationId="{EA89A71D-2FE3-4A36-B820-3508994A7EC3}"/>
+          </ac:spMkLst>
+        </pc:spChg>
+        <pc:spChg chg="del">
+          <ac:chgData name="Nhut DOAN NGUYEN" userId="d7212ade-34df-43ef-b0a5-cb321af945d9" providerId="ADAL" clId="{51DED03C-BB6F-49A2-B443-0FC1DDC50DED}" dt="2019-11-11T23:32:59.630" v="618" actId="478"/>
+          <ac:spMkLst>
+            <pc:docMk/>
+            <pc:sldMk cId="1280034146" sldId="263"/>
+            <ac:spMk id="8" creationId="{04ECF46D-C76B-4D43-A1AC-A21ADA02A34D}"/>
+          </ac:spMkLst>
+        </pc:spChg>
+        <pc:spChg chg="del">
+          <ac:chgData name="Nhut DOAN NGUYEN" userId="d7212ade-34df-43ef-b0a5-cb321af945d9" providerId="ADAL" clId="{51DED03C-BB6F-49A2-B443-0FC1DDC50DED}" dt="2019-11-11T23:33:02.016" v="619" actId="478"/>
+          <ac:spMkLst>
+            <pc:docMk/>
+            <pc:sldMk cId="1280034146" sldId="263"/>
+            <ac:spMk id="10" creationId="{FF83EDEB-EEE1-41C4-9756-CD597487D99B}"/>
+          </ac:spMkLst>
+        </pc:spChg>
+        <pc:spChg chg="del">
+          <ac:chgData name="Nhut DOAN NGUYEN" userId="d7212ade-34df-43ef-b0a5-cb321af945d9" providerId="ADAL" clId="{51DED03C-BB6F-49A2-B443-0FC1DDC50DED}" dt="2019-11-11T23:32:59.630" v="618" actId="478"/>
+          <ac:spMkLst>
+            <pc:docMk/>
+            <pc:sldMk cId="1280034146" sldId="263"/>
+            <ac:spMk id="11" creationId="{ED525DFF-504A-4070-94F5-463213F78CBB}"/>
+          </ac:spMkLst>
+        </pc:spChg>
+        <pc:spChg chg="del">
+          <ac:chgData name="Nhut DOAN NGUYEN" userId="d7212ade-34df-43ef-b0a5-cb321af945d9" providerId="ADAL" clId="{51DED03C-BB6F-49A2-B443-0FC1DDC50DED}" dt="2019-11-11T23:33:02.016" v="619" actId="478"/>
+          <ac:spMkLst>
+            <pc:docMk/>
+            <pc:sldMk cId="1280034146" sldId="263"/>
+            <ac:spMk id="14" creationId="{577D9363-6DC6-45C5-9712-A8623B11DD83}"/>
+          </ac:spMkLst>
+        </pc:spChg>
+        <pc:spChg chg="del">
+          <ac:chgData name="Nhut DOAN NGUYEN" userId="d7212ade-34df-43ef-b0a5-cb321af945d9" providerId="ADAL" clId="{51DED03C-BB6F-49A2-B443-0FC1DDC50DED}" dt="2019-11-11T23:32:57.234" v="617" actId="478"/>
+          <ac:spMkLst>
+            <pc:docMk/>
+            <pc:sldMk cId="1280034146" sldId="263"/>
+            <ac:spMk id="55" creationId="{A24E4A53-116A-4B05-931E-25E6DA986428}"/>
+          </ac:spMkLst>
+        </pc:spChg>
+        <pc:spChg chg="del">
+          <ac:chgData name="Nhut DOAN NGUYEN" userId="d7212ade-34df-43ef-b0a5-cb321af945d9" providerId="ADAL" clId="{51DED03C-BB6F-49A2-B443-0FC1DDC50DED}" dt="2019-11-11T23:32:57.234" v="617" actId="478"/>
+          <ac:spMkLst>
+            <pc:docMk/>
+            <pc:sldMk cId="1280034146" sldId="263"/>
+            <ac:spMk id="56" creationId="{D98C9F07-B468-48B8-A2EC-CB4AA3433007}"/>
+          </ac:spMkLst>
+        </pc:spChg>
+        <pc:spChg chg="del">
+          <ac:chgData name="Nhut DOAN NGUYEN" userId="d7212ade-34df-43ef-b0a5-cb321af945d9" providerId="ADAL" clId="{51DED03C-BB6F-49A2-B443-0FC1DDC50DED}" dt="2019-11-11T23:32:57.234" v="617" actId="478"/>
+          <ac:spMkLst>
+            <pc:docMk/>
+            <pc:sldMk cId="1280034146" sldId="263"/>
+            <ac:spMk id="57" creationId="{BE9A953B-4140-4D55-AA29-8EAA3E6EAC19}"/>
+          </ac:spMkLst>
+        </pc:spChg>
+        <pc:spChg chg="del">
+          <ac:chgData name="Nhut DOAN NGUYEN" userId="d7212ade-34df-43ef-b0a5-cb321af945d9" providerId="ADAL" clId="{51DED03C-BB6F-49A2-B443-0FC1DDC50DED}" dt="2019-11-11T23:32:57.234" v="617" actId="478"/>
+          <ac:spMkLst>
+            <pc:docMk/>
+            <pc:sldMk cId="1280034146" sldId="263"/>
+            <ac:spMk id="58" creationId="{8CEF25F8-000F-4664-BD3A-6C5DECBD41A7}"/>
+          </ac:spMkLst>
+        </pc:spChg>
+        <pc:spChg chg="del">
+          <ac:chgData name="Nhut DOAN NGUYEN" userId="d7212ade-34df-43ef-b0a5-cb321af945d9" providerId="ADAL" clId="{51DED03C-BB6F-49A2-B443-0FC1DDC50DED}" dt="2019-11-11T23:32:57.234" v="617" actId="478"/>
+          <ac:spMkLst>
+            <pc:docMk/>
+            <pc:sldMk cId="1280034146" sldId="263"/>
+            <ac:spMk id="67" creationId="{8990D107-3C45-438C-9E5F-FC91985ABA79}"/>
+          </ac:spMkLst>
+        </pc:spChg>
+        <pc:spChg chg="del">
+          <ac:chgData name="Nhut DOAN NGUYEN" userId="d7212ade-34df-43ef-b0a5-cb321af945d9" providerId="ADAL" clId="{51DED03C-BB6F-49A2-B443-0FC1DDC50DED}" dt="2019-11-11T23:32:57.234" v="617" actId="478"/>
+          <ac:spMkLst>
+            <pc:docMk/>
+            <pc:sldMk cId="1280034146" sldId="263"/>
+            <ac:spMk id="69" creationId="{CCF4AD14-7522-4FDC-9A66-DF9A4812E745}"/>
+          </ac:spMkLst>
+        </pc:spChg>
+        <pc:spChg chg="del">
+          <ac:chgData name="Nhut DOAN NGUYEN" userId="d7212ade-34df-43ef-b0a5-cb321af945d9" providerId="ADAL" clId="{51DED03C-BB6F-49A2-B443-0FC1DDC50DED}" dt="2019-11-11T23:32:57.234" v="617" actId="478"/>
+          <ac:spMkLst>
+            <pc:docMk/>
+            <pc:sldMk cId="1280034146" sldId="263"/>
+            <ac:spMk id="70" creationId="{BFE1B509-7AE7-4AFF-8DE3-7810CF89A8D4}"/>
+          </ac:spMkLst>
+        </pc:spChg>
+        <pc:spChg chg="del">
+          <ac:chgData name="Nhut DOAN NGUYEN" userId="d7212ade-34df-43ef-b0a5-cb321af945d9" providerId="ADAL" clId="{51DED03C-BB6F-49A2-B443-0FC1DDC50DED}" dt="2019-11-11T23:32:57.234" v="617" actId="478"/>
+          <ac:spMkLst>
+            <pc:docMk/>
+            <pc:sldMk cId="1280034146" sldId="263"/>
+            <ac:spMk id="73" creationId="{443F4DC3-BB07-4A15-997E-36D2C9A663CB}"/>
+          </ac:spMkLst>
+        </pc:spChg>
+        <pc:spChg chg="del">
+          <ac:chgData name="Nhut DOAN NGUYEN" userId="d7212ade-34df-43ef-b0a5-cb321af945d9" providerId="ADAL" clId="{51DED03C-BB6F-49A2-B443-0FC1DDC50DED}" dt="2019-11-11T23:32:57.234" v="617" actId="478"/>
+          <ac:spMkLst>
+            <pc:docMk/>
+            <pc:sldMk cId="1280034146" sldId="263"/>
+            <ac:spMk id="74" creationId="{21DC3087-8AB3-4078-AB9F-694E8C3C4DC1}"/>
+          </ac:spMkLst>
+        </pc:spChg>
+        <pc:spChg chg="del">
+          <ac:chgData name="Nhut DOAN NGUYEN" userId="d7212ade-34df-43ef-b0a5-cb321af945d9" providerId="ADAL" clId="{51DED03C-BB6F-49A2-B443-0FC1DDC50DED}" dt="2019-11-11T23:32:57.234" v="617" actId="478"/>
+          <ac:spMkLst>
+            <pc:docMk/>
+            <pc:sldMk cId="1280034146" sldId="263"/>
+            <ac:spMk id="75" creationId="{7FD7AE9E-A357-4388-A42A-3C97CC57DFEA}"/>
+          </ac:spMkLst>
+        </pc:spChg>
+        <pc:spChg chg="del">
+          <ac:chgData name="Nhut DOAN NGUYEN" userId="d7212ade-34df-43ef-b0a5-cb321af945d9" providerId="ADAL" clId="{51DED03C-BB6F-49A2-B443-0FC1DDC50DED}" dt="2019-11-11T23:32:59.630" v="618" actId="478"/>
+          <ac:spMkLst>
+            <pc:docMk/>
+            <pc:sldMk cId="1280034146" sldId="263"/>
+            <ac:spMk id="76" creationId="{E5C0CD96-8B55-4284-B656-E38771588BEA}"/>
+          </ac:spMkLst>
+        </pc:spChg>
+        <pc:spChg chg="del">
+          <ac:chgData name="Nhut DOAN NGUYEN" userId="d7212ade-34df-43ef-b0a5-cb321af945d9" providerId="ADAL" clId="{51DED03C-BB6F-49A2-B443-0FC1DDC50DED}" dt="2019-11-11T23:33:02.016" v="619" actId="478"/>
+          <ac:spMkLst>
+            <pc:docMk/>
+            <pc:sldMk cId="1280034146" sldId="263"/>
+            <ac:spMk id="78" creationId="{CF6DC8DB-46A6-4165-A360-9116ABA15F2B}"/>
+          </ac:spMkLst>
+        </pc:spChg>
+        <pc:spChg chg="del">
+          <ac:chgData name="Nhut DOAN NGUYEN" userId="d7212ade-34df-43ef-b0a5-cb321af945d9" providerId="ADAL" clId="{51DED03C-BB6F-49A2-B443-0FC1DDC50DED}" dt="2019-11-11T23:32:59.630" v="618" actId="478"/>
+          <ac:spMkLst>
+            <pc:docMk/>
+            <pc:sldMk cId="1280034146" sldId="263"/>
+            <ac:spMk id="79" creationId="{61F91505-AE21-4E8D-9F65-2F4FC3D5AD56}"/>
+          </ac:spMkLst>
+        </pc:spChg>
+        <pc:spChg chg="del">
+          <ac:chgData name="Nhut DOAN NGUYEN" userId="d7212ade-34df-43ef-b0a5-cb321af945d9" providerId="ADAL" clId="{51DED03C-BB6F-49A2-B443-0FC1DDC50DED}" dt="2019-11-11T23:33:04.417" v="620" actId="478"/>
+          <ac:spMkLst>
+            <pc:docMk/>
+            <pc:sldMk cId="1280034146" sldId="263"/>
+            <ac:spMk id="80" creationId="{0643C5FA-7C93-4EFD-B0D9-C18F58DE5EC0}"/>
+          </ac:spMkLst>
+        </pc:spChg>
+        <pc:spChg chg="del">
+          <ac:chgData name="Nhut DOAN NGUYEN" userId="d7212ade-34df-43ef-b0a5-cb321af945d9" providerId="ADAL" clId="{51DED03C-BB6F-49A2-B443-0FC1DDC50DED}" dt="2019-11-11T23:33:02.016" v="619" actId="478"/>
+          <ac:spMkLst>
+            <pc:docMk/>
+            <pc:sldMk cId="1280034146" sldId="263"/>
+            <ac:spMk id="81" creationId="{2E1E23C0-6EB5-4FA8-A1D4-3573C87A01BE}"/>
+          </ac:spMkLst>
+        </pc:spChg>
+        <pc:cxnChg chg="del mod">
+          <ac:chgData name="Nhut DOAN NGUYEN" userId="d7212ade-34df-43ef-b0a5-cb321af945d9" providerId="ADAL" clId="{51DED03C-BB6F-49A2-B443-0FC1DDC50DED}" dt="2019-11-11T23:32:57.234" v="617" actId="478"/>
+          <ac:cxnSpMkLst>
+            <pc:docMk/>
+            <pc:sldMk cId="1280034146" sldId="263"/>
+            <ac:cxnSpMk id="16" creationId="{4438300A-2C1E-4714-BFD4-2E5E8E4EA2B6}"/>
+          </ac:cxnSpMkLst>
+        </pc:cxnChg>
+        <pc:cxnChg chg="del">
+          <ac:chgData name="Nhut DOAN NGUYEN" userId="d7212ade-34df-43ef-b0a5-cb321af945d9" providerId="ADAL" clId="{51DED03C-BB6F-49A2-B443-0FC1DDC50DED}" dt="2019-11-11T23:32:57.234" v="617" actId="478"/>
+          <ac:cxnSpMkLst>
+            <pc:docMk/>
+            <pc:sldMk cId="1280034146" sldId="263"/>
+            <ac:cxnSpMk id="18" creationId="{11FD1652-9ED9-43DD-A19A-55069D295275}"/>
+          </ac:cxnSpMkLst>
+        </pc:cxnChg>
+        <pc:cxnChg chg="del mod">
+          <ac:chgData name="Nhut DOAN NGUYEN" userId="d7212ade-34df-43ef-b0a5-cb321af945d9" providerId="ADAL" clId="{51DED03C-BB6F-49A2-B443-0FC1DDC50DED}" dt="2019-11-11T23:32:57.234" v="617" actId="478"/>
+          <ac:cxnSpMkLst>
+            <pc:docMk/>
+            <pc:sldMk cId="1280034146" sldId="263"/>
+            <ac:cxnSpMk id="20" creationId="{D6DCB3F2-50A5-4804-95A8-E80A7E5F5AB3}"/>
+          </ac:cxnSpMkLst>
+        </pc:cxnChg>
+        <pc:cxnChg chg="del">
+          <ac:chgData name="Nhut DOAN NGUYEN" userId="d7212ade-34df-43ef-b0a5-cb321af945d9" providerId="ADAL" clId="{51DED03C-BB6F-49A2-B443-0FC1DDC50DED}" dt="2019-11-11T23:32:57.234" v="617" actId="478"/>
+          <ac:cxnSpMkLst>
+            <pc:docMk/>
+            <pc:sldMk cId="1280034146" sldId="263"/>
+            <ac:cxnSpMk id="24" creationId="{D062D7D3-6D26-4A3C-BF9A-4FEECD7FAD8E}"/>
+          </ac:cxnSpMkLst>
+        </pc:cxnChg>
+        <pc:cxnChg chg="del">
+          <ac:chgData name="Nhut DOAN NGUYEN" userId="d7212ade-34df-43ef-b0a5-cb321af945d9" providerId="ADAL" clId="{51DED03C-BB6F-49A2-B443-0FC1DDC50DED}" dt="2019-11-11T23:32:57.234" v="617" actId="478"/>
+          <ac:cxnSpMkLst>
+            <pc:docMk/>
+            <pc:sldMk cId="1280034146" sldId="263"/>
+            <ac:cxnSpMk id="26" creationId="{F308478F-E970-41C9-933D-A44F5058D6EE}"/>
+          </ac:cxnSpMkLst>
+        </pc:cxnChg>
+        <pc:cxnChg chg="del">
+          <ac:chgData name="Nhut DOAN NGUYEN" userId="d7212ade-34df-43ef-b0a5-cb321af945d9" providerId="ADAL" clId="{51DED03C-BB6F-49A2-B443-0FC1DDC50DED}" dt="2019-11-11T23:32:57.234" v="617" actId="478"/>
+          <ac:cxnSpMkLst>
+            <pc:docMk/>
+            <pc:sldMk cId="1280034146" sldId="263"/>
+            <ac:cxnSpMk id="28" creationId="{2E01EA5D-3799-4FE9-A15E-691AFAAD8FEB}"/>
+          </ac:cxnSpMkLst>
+        </pc:cxnChg>
+        <pc:cxnChg chg="del">
+          <ac:chgData name="Nhut DOAN NGUYEN" userId="d7212ade-34df-43ef-b0a5-cb321af945d9" providerId="ADAL" clId="{51DED03C-BB6F-49A2-B443-0FC1DDC50DED}" dt="2019-11-11T23:32:57.234" v="617" actId="478"/>
+          <ac:cxnSpMkLst>
+            <pc:docMk/>
+            <pc:sldMk cId="1280034146" sldId="263"/>
+            <ac:cxnSpMk id="30" creationId="{190B51C5-F37B-4C40-9CAB-A3F6873AAC4E}"/>
+          </ac:cxnSpMkLst>
+        </pc:cxnChg>
+        <pc:cxnChg chg="del mod">
+          <ac:chgData name="Nhut DOAN NGUYEN" userId="d7212ade-34df-43ef-b0a5-cb321af945d9" providerId="ADAL" clId="{51DED03C-BB6F-49A2-B443-0FC1DDC50DED}" dt="2019-11-11T23:32:57.234" v="617" actId="478"/>
+          <ac:cxnSpMkLst>
+            <pc:docMk/>
+            <pc:sldMk cId="1280034146" sldId="263"/>
+            <ac:cxnSpMk id="32" creationId="{2FAF8528-0D59-48E1-91CE-1C72F174FA27}"/>
+          </ac:cxnSpMkLst>
+        </pc:cxnChg>
+        <pc:cxnChg chg="del mod">
+          <ac:chgData name="Nhut DOAN NGUYEN" userId="d7212ade-34df-43ef-b0a5-cb321af945d9" providerId="ADAL" clId="{51DED03C-BB6F-49A2-B443-0FC1DDC50DED}" dt="2019-11-11T23:32:57.234" v="617" actId="478"/>
+          <ac:cxnSpMkLst>
+            <pc:docMk/>
+            <pc:sldMk cId="1280034146" sldId="263"/>
+            <ac:cxnSpMk id="40" creationId="{4F4BD4E8-52F0-42E6-AD0F-2C340DBEA386}"/>
+          </ac:cxnSpMkLst>
+        </pc:cxnChg>
+        <pc:cxnChg chg="del">
+          <ac:chgData name="Nhut DOAN NGUYEN" userId="d7212ade-34df-43ef-b0a5-cb321af945d9" providerId="ADAL" clId="{51DED03C-BB6F-49A2-B443-0FC1DDC50DED}" dt="2019-11-11T23:32:57.234" v="617" actId="478"/>
+          <ac:cxnSpMkLst>
+            <pc:docMk/>
+            <pc:sldMk cId="1280034146" sldId="263"/>
+            <ac:cxnSpMk id="42" creationId="{228BA909-583C-4327-A629-F80912AB7A83}"/>
+          </ac:cxnSpMkLst>
+        </pc:cxnChg>
+        <pc:cxnChg chg="del mod">
+          <ac:chgData name="Nhut DOAN NGUYEN" userId="d7212ade-34df-43ef-b0a5-cb321af945d9" providerId="ADAL" clId="{51DED03C-BB6F-49A2-B443-0FC1DDC50DED}" dt="2019-11-11T23:32:59.630" v="618" actId="478"/>
+          <ac:cxnSpMkLst>
+            <pc:docMk/>
+            <pc:sldMk cId="1280034146" sldId="263"/>
+            <ac:cxnSpMk id="44" creationId="{40E6EC3D-9B26-4BF0-9D31-37859FFC2D51}"/>
+          </ac:cxnSpMkLst>
+        </pc:cxnChg>
+        <pc:cxnChg chg="del">
+          <ac:chgData name="Nhut DOAN NGUYEN" userId="d7212ade-34df-43ef-b0a5-cb321af945d9" providerId="ADAL" clId="{51DED03C-BB6F-49A2-B443-0FC1DDC50DED}" dt="2019-11-11T23:32:59.630" v="618" actId="478"/>
+          <ac:cxnSpMkLst>
+            <pc:docMk/>
+            <pc:sldMk cId="1280034146" sldId="263"/>
+            <ac:cxnSpMk id="46" creationId="{95330A63-B35C-4DB6-A98A-B47B77085D88}"/>
+          </ac:cxnSpMkLst>
+        </pc:cxnChg>
+        <pc:cxnChg chg="del">
+          <ac:chgData name="Nhut DOAN NGUYEN" userId="d7212ade-34df-43ef-b0a5-cb321af945d9" providerId="ADAL" clId="{51DED03C-BB6F-49A2-B443-0FC1DDC50DED}" dt="2019-11-11T23:33:06.439" v="621" actId="478"/>
+          <ac:cxnSpMkLst>
+            <pc:docMk/>
+            <pc:sldMk cId="1280034146" sldId="263"/>
+            <ac:cxnSpMk id="50" creationId="{19843E4A-054B-4217-B9C4-A89ACCA72B2F}"/>
+          </ac:cxnSpMkLst>
+        </pc:cxnChg>
+        <pc:cxnChg chg="del mod">
+          <ac:chgData name="Nhut DOAN NGUYEN" userId="d7212ade-34df-43ef-b0a5-cb321af945d9" providerId="ADAL" clId="{51DED03C-BB6F-49A2-B443-0FC1DDC50DED}" dt="2019-11-11T23:33:02.016" v="619" actId="478"/>
+          <ac:cxnSpMkLst>
+            <pc:docMk/>
+            <pc:sldMk cId="1280034146" sldId="263"/>
+            <ac:cxnSpMk id="52" creationId="{0CAF88D5-BE1C-4A4C-9A3C-F70B5570AA3A}"/>
+          </ac:cxnSpMkLst>
+        </pc:cxnChg>
+        <pc:cxnChg chg="del">
+          <ac:chgData name="Nhut DOAN NGUYEN" userId="d7212ade-34df-43ef-b0a5-cb321af945d9" providerId="ADAL" clId="{51DED03C-BB6F-49A2-B443-0FC1DDC50DED}" dt="2019-11-11T23:33:02.016" v="619" actId="478"/>
+          <ac:cxnSpMkLst>
+            <pc:docMk/>
+            <pc:sldMk cId="1280034146" sldId="263"/>
+            <ac:cxnSpMk id="54" creationId="{EEA28B46-16E8-4A0E-848B-F682B64CE995}"/>
+          </ac:cxnSpMkLst>
+        </pc:cxnChg>
+      </pc:sldChg>
+      <pc:sldChg chg="delSp modSp add">
+        <pc:chgData name="Nhut DOAN NGUYEN" userId="d7212ade-34df-43ef-b0a5-cb321af945d9" providerId="ADAL" clId="{51DED03C-BB6F-49A2-B443-0FC1DDC50DED}" dt="2019-11-11T23:49:37.933" v="629" actId="478"/>
+        <pc:sldMkLst>
+          <pc:docMk/>
+          <pc:sldMk cId="3251881791" sldId="264"/>
+        </pc:sldMkLst>
+        <pc:spChg chg="del">
+          <ac:chgData name="Nhut DOAN NGUYEN" userId="d7212ade-34df-43ef-b0a5-cb321af945d9" providerId="ADAL" clId="{51DED03C-BB6F-49A2-B443-0FC1DDC50DED}" dt="2019-11-11T23:49:15.262" v="623" actId="478"/>
+          <ac:spMkLst>
+            <pc:docMk/>
+            <pc:sldMk cId="3251881791" sldId="264"/>
+            <ac:spMk id="5" creationId="{6746CAAB-D3C5-4C1A-9C3F-3DBB89E5C95B}"/>
+          </ac:spMkLst>
+        </pc:spChg>
+        <pc:spChg chg="del">
+          <ac:chgData name="Nhut DOAN NGUYEN" userId="d7212ade-34df-43ef-b0a5-cb321af945d9" providerId="ADAL" clId="{51DED03C-BB6F-49A2-B443-0FC1DDC50DED}" dt="2019-11-11T23:49:26.117" v="624" actId="478"/>
+          <ac:spMkLst>
+            <pc:docMk/>
+            <pc:sldMk cId="3251881791" sldId="264"/>
+            <ac:spMk id="7" creationId="{EA89A71D-2FE3-4A36-B820-3508994A7EC3}"/>
+          </ac:spMkLst>
+        </pc:spChg>
+        <pc:spChg chg="del">
+          <ac:chgData name="Nhut DOAN NGUYEN" userId="d7212ade-34df-43ef-b0a5-cb321af945d9" providerId="ADAL" clId="{51DED03C-BB6F-49A2-B443-0FC1DDC50DED}" dt="2019-11-11T23:49:15.262" v="623" actId="478"/>
+          <ac:spMkLst>
+            <pc:docMk/>
+            <pc:sldMk cId="3251881791" sldId="264"/>
+            <ac:spMk id="8" creationId="{04ECF46D-C76B-4D43-A1AC-A21ADA02A34D}"/>
+          </ac:spMkLst>
+        </pc:spChg>
+        <pc:spChg chg="del">
+          <ac:chgData name="Nhut DOAN NGUYEN" userId="d7212ade-34df-43ef-b0a5-cb321af945d9" providerId="ADAL" clId="{51DED03C-BB6F-49A2-B443-0FC1DDC50DED}" dt="2019-11-11T23:49:26.117" v="624" actId="478"/>
+          <ac:spMkLst>
+            <pc:docMk/>
+            <pc:sldMk cId="3251881791" sldId="264"/>
+            <ac:spMk id="10" creationId="{FF83EDEB-EEE1-41C4-9756-CD597487D99B}"/>
+          </ac:spMkLst>
+        </pc:spChg>
+        <pc:spChg chg="del">
+          <ac:chgData name="Nhut DOAN NGUYEN" userId="d7212ade-34df-43ef-b0a5-cb321af945d9" providerId="ADAL" clId="{51DED03C-BB6F-49A2-B443-0FC1DDC50DED}" dt="2019-11-11T23:49:15.262" v="623" actId="478"/>
+          <ac:spMkLst>
+            <pc:docMk/>
+            <pc:sldMk cId="3251881791" sldId="264"/>
+            <ac:spMk id="11" creationId="{ED525DFF-504A-4070-94F5-463213F78CBB}"/>
+          </ac:spMkLst>
+        </pc:spChg>
+        <pc:spChg chg="del">
+          <ac:chgData name="Nhut DOAN NGUYEN" userId="d7212ade-34df-43ef-b0a5-cb321af945d9" providerId="ADAL" clId="{51DED03C-BB6F-49A2-B443-0FC1DDC50DED}" dt="2019-11-11T23:49:32.451" v="626" actId="478"/>
+          <ac:spMkLst>
+            <pc:docMk/>
+            <pc:sldMk cId="3251881791" sldId="264"/>
+            <ac:spMk id="12" creationId="{8C9AB467-55CA-4EEF-9363-22CE9EBABB8E}"/>
+          </ac:spMkLst>
+        </pc:spChg>
+        <pc:spChg chg="del">
+          <ac:chgData name="Nhut DOAN NGUYEN" userId="d7212ade-34df-43ef-b0a5-cb321af945d9" providerId="ADAL" clId="{51DED03C-BB6F-49A2-B443-0FC1DDC50DED}" dt="2019-11-11T23:49:26.117" v="624" actId="478"/>
+          <ac:spMkLst>
+            <pc:docMk/>
+            <pc:sldMk cId="3251881791" sldId="264"/>
+            <ac:spMk id="14" creationId="{577D9363-6DC6-45C5-9712-A8623B11DD83}"/>
+          </ac:spMkLst>
+        </pc:spChg>
+        <pc:spChg chg="del">
+          <ac:chgData name="Nhut DOAN NGUYEN" userId="d7212ade-34df-43ef-b0a5-cb321af945d9" providerId="ADAL" clId="{51DED03C-BB6F-49A2-B443-0FC1DDC50DED}" dt="2019-11-11T23:49:29.516" v="625" actId="478"/>
+          <ac:spMkLst>
+            <pc:docMk/>
+            <pc:sldMk cId="3251881791" sldId="264"/>
+            <ac:spMk id="55" creationId="{A24E4A53-116A-4B05-931E-25E6DA986428}"/>
+          </ac:spMkLst>
+        </pc:spChg>
+        <pc:spChg chg="del">
+          <ac:chgData name="Nhut DOAN NGUYEN" userId="d7212ade-34df-43ef-b0a5-cb321af945d9" providerId="ADAL" clId="{51DED03C-BB6F-49A2-B443-0FC1DDC50DED}" dt="2019-11-11T23:49:29.516" v="625" actId="478"/>
+          <ac:spMkLst>
+            <pc:docMk/>
+            <pc:sldMk cId="3251881791" sldId="264"/>
+            <ac:spMk id="56" creationId="{D98C9F07-B468-48B8-A2EC-CB4AA3433007}"/>
+          </ac:spMkLst>
+        </pc:spChg>
+        <pc:spChg chg="del">
+          <ac:chgData name="Nhut DOAN NGUYEN" userId="d7212ade-34df-43ef-b0a5-cb321af945d9" providerId="ADAL" clId="{51DED03C-BB6F-49A2-B443-0FC1DDC50DED}" dt="2019-11-11T23:49:26.117" v="624" actId="478"/>
+          <ac:spMkLst>
+            <pc:docMk/>
+            <pc:sldMk cId="3251881791" sldId="264"/>
+            <ac:spMk id="57" creationId="{BE9A953B-4140-4D55-AA29-8EAA3E6EAC19}"/>
+          </ac:spMkLst>
+        </pc:spChg>
+        <pc:spChg chg="del">
+          <ac:chgData name="Nhut DOAN NGUYEN" userId="d7212ade-34df-43ef-b0a5-cb321af945d9" providerId="ADAL" clId="{51DED03C-BB6F-49A2-B443-0FC1DDC50DED}" dt="2019-11-11T23:49:15.262" v="623" actId="478"/>
+          <ac:spMkLst>
+            <pc:docMk/>
+            <pc:sldMk cId="3251881791" sldId="264"/>
+            <ac:spMk id="58" creationId="{8CEF25F8-000F-4664-BD3A-6C5DECBD41A7}"/>
+          </ac:spMkLst>
+        </pc:spChg>
+        <pc:spChg chg="del">
+          <ac:chgData name="Nhut DOAN NGUYEN" userId="d7212ade-34df-43ef-b0a5-cb321af945d9" providerId="ADAL" clId="{51DED03C-BB6F-49A2-B443-0FC1DDC50DED}" dt="2019-11-11T23:49:32.451" v="626" actId="478"/>
+          <ac:spMkLst>
+            <pc:docMk/>
+            <pc:sldMk cId="3251881791" sldId="264"/>
+            <ac:spMk id="66" creationId="{F3CCD863-4E7C-4D17-BEFE-A65DDFB8F83D}"/>
+          </ac:spMkLst>
+        </pc:spChg>
+        <pc:spChg chg="del">
+          <ac:chgData name="Nhut DOAN NGUYEN" userId="d7212ade-34df-43ef-b0a5-cb321af945d9" providerId="ADAL" clId="{51DED03C-BB6F-49A2-B443-0FC1DDC50DED}" dt="2019-11-11T23:49:26.117" v="624" actId="478"/>
+          <ac:spMkLst>
+            <pc:docMk/>
+            <pc:sldMk cId="3251881791" sldId="264"/>
+            <ac:spMk id="67" creationId="{8990D107-3C45-438C-9E5F-FC91985ABA79}"/>
+          </ac:spMkLst>
+        </pc:spChg>
+        <pc:spChg chg="del">
+          <ac:chgData name="Nhut DOAN NGUYEN" userId="d7212ade-34df-43ef-b0a5-cb321af945d9" providerId="ADAL" clId="{51DED03C-BB6F-49A2-B443-0FC1DDC50DED}" dt="2019-11-11T23:49:26.117" v="624" actId="478"/>
+          <ac:spMkLst>
+            <pc:docMk/>
+            <pc:sldMk cId="3251881791" sldId="264"/>
+            <ac:spMk id="70" creationId="{BFE1B509-7AE7-4AFF-8DE3-7810CF89A8D4}"/>
+          </ac:spMkLst>
+        </pc:spChg>
+        <pc:spChg chg="del">
+          <ac:chgData name="Nhut DOAN NGUYEN" userId="d7212ade-34df-43ef-b0a5-cb321af945d9" providerId="ADAL" clId="{51DED03C-BB6F-49A2-B443-0FC1DDC50DED}" dt="2019-11-11T23:49:26.117" v="624" actId="478"/>
+          <ac:spMkLst>
+            <pc:docMk/>
+            <pc:sldMk cId="3251881791" sldId="264"/>
+            <ac:spMk id="73" creationId="{443F4DC3-BB07-4A15-997E-36D2C9A663CB}"/>
+          </ac:spMkLst>
+        </pc:spChg>
+        <pc:spChg chg="del">
+          <ac:chgData name="Nhut DOAN NGUYEN" userId="d7212ade-34df-43ef-b0a5-cb321af945d9" providerId="ADAL" clId="{51DED03C-BB6F-49A2-B443-0FC1DDC50DED}" dt="2019-11-11T23:49:15.262" v="623" actId="478"/>
+          <ac:spMkLst>
+            <pc:docMk/>
+            <pc:sldMk cId="3251881791" sldId="264"/>
+            <ac:spMk id="74" creationId="{21DC3087-8AB3-4078-AB9F-694E8C3C4DC1}"/>
+          </ac:spMkLst>
+        </pc:spChg>
+        <pc:spChg chg="del">
+          <ac:chgData name="Nhut DOAN NGUYEN" userId="d7212ade-34df-43ef-b0a5-cb321af945d9" providerId="ADAL" clId="{51DED03C-BB6F-49A2-B443-0FC1DDC50DED}" dt="2019-11-11T23:49:15.262" v="623" actId="478"/>
+          <ac:spMkLst>
+            <pc:docMk/>
+            <pc:sldMk cId="3251881791" sldId="264"/>
+            <ac:spMk id="75" creationId="{7FD7AE9E-A357-4388-A42A-3C97CC57DFEA}"/>
+          </ac:spMkLst>
+        </pc:spChg>
+        <pc:spChg chg="del">
+          <ac:chgData name="Nhut DOAN NGUYEN" userId="d7212ade-34df-43ef-b0a5-cb321af945d9" providerId="ADAL" clId="{51DED03C-BB6F-49A2-B443-0FC1DDC50DED}" dt="2019-11-11T23:49:15.262" v="623" actId="478"/>
+          <ac:spMkLst>
+            <pc:docMk/>
+            <pc:sldMk cId="3251881791" sldId="264"/>
+            <ac:spMk id="76" creationId="{E5C0CD96-8B55-4284-B656-E38771588BEA}"/>
+          </ac:spMkLst>
+        </pc:spChg>
+        <pc:spChg chg="del">
+          <ac:chgData name="Nhut DOAN NGUYEN" userId="d7212ade-34df-43ef-b0a5-cb321af945d9" providerId="ADAL" clId="{51DED03C-BB6F-49A2-B443-0FC1DDC50DED}" dt="2019-11-11T23:49:26.117" v="624" actId="478"/>
+          <ac:spMkLst>
+            <pc:docMk/>
+            <pc:sldMk cId="3251881791" sldId="264"/>
+            <ac:spMk id="78" creationId="{CF6DC8DB-46A6-4165-A360-9116ABA15F2B}"/>
+          </ac:spMkLst>
+        </pc:spChg>
+        <pc:spChg chg="del">
+          <ac:chgData name="Nhut DOAN NGUYEN" userId="d7212ade-34df-43ef-b0a5-cb321af945d9" providerId="ADAL" clId="{51DED03C-BB6F-49A2-B443-0FC1DDC50DED}" dt="2019-11-11T23:49:15.262" v="623" actId="478"/>
+          <ac:spMkLst>
+            <pc:docMk/>
+            <pc:sldMk cId="3251881791" sldId="264"/>
+            <ac:spMk id="79" creationId="{61F91505-AE21-4E8D-9F65-2F4FC3D5AD56}"/>
+          </ac:spMkLst>
+        </pc:spChg>
+        <pc:spChg chg="del">
+          <ac:chgData name="Nhut DOAN NGUYEN" userId="d7212ade-34df-43ef-b0a5-cb321af945d9" providerId="ADAL" clId="{51DED03C-BB6F-49A2-B443-0FC1DDC50DED}" dt="2019-11-11T23:49:29.516" v="625" actId="478"/>
+          <ac:spMkLst>
+            <pc:docMk/>
+            <pc:sldMk cId="3251881791" sldId="264"/>
+            <ac:spMk id="80" creationId="{0643C5FA-7C93-4EFD-B0D9-C18F58DE5EC0}"/>
+          </ac:spMkLst>
+        </pc:spChg>
+        <pc:spChg chg="del">
+          <ac:chgData name="Nhut DOAN NGUYEN" userId="d7212ade-34df-43ef-b0a5-cb321af945d9" providerId="ADAL" clId="{51DED03C-BB6F-49A2-B443-0FC1DDC50DED}" dt="2019-11-11T23:49:26.117" v="624" actId="478"/>
+          <ac:spMkLst>
+            <pc:docMk/>
+            <pc:sldMk cId="3251881791" sldId="264"/>
+            <ac:spMk id="81" creationId="{2E1E23C0-6EB5-4FA8-A1D4-3573C87A01BE}"/>
+          </ac:spMkLst>
+        </pc:spChg>
+        <pc:cxnChg chg="del mod">
+          <ac:chgData name="Nhut DOAN NGUYEN" userId="d7212ade-34df-43ef-b0a5-cb321af945d9" providerId="ADAL" clId="{51DED03C-BB6F-49A2-B443-0FC1DDC50DED}" dt="2019-11-11T23:49:34.681" v="627" actId="478"/>
+          <ac:cxnSpMkLst>
+            <pc:docMk/>
+            <pc:sldMk cId="3251881791" sldId="264"/>
+            <ac:cxnSpMk id="16" creationId="{4438300A-2C1E-4714-BFD4-2E5E8E4EA2B6}"/>
+          </ac:cxnSpMkLst>
+        </pc:cxnChg>
+        <pc:cxnChg chg="del">
+          <ac:chgData name="Nhut DOAN NGUYEN" userId="d7212ade-34df-43ef-b0a5-cb321af945d9" providerId="ADAL" clId="{51DED03C-BB6F-49A2-B443-0FC1DDC50DED}" dt="2019-11-11T23:49:29.516" v="625" actId="478"/>
+          <ac:cxnSpMkLst>
+            <pc:docMk/>
+            <pc:sldMk cId="3251881791" sldId="264"/>
+            <ac:cxnSpMk id="18" creationId="{11FD1652-9ED9-43DD-A19A-55069D295275}"/>
+          </ac:cxnSpMkLst>
+        </pc:cxnChg>
+        <pc:cxnChg chg="del mod">
+          <ac:chgData name="Nhut DOAN NGUYEN" userId="d7212ade-34df-43ef-b0a5-cb321af945d9" providerId="ADAL" clId="{51DED03C-BB6F-49A2-B443-0FC1DDC50DED}" dt="2019-11-11T23:49:37.933" v="629" actId="478"/>
+          <ac:cxnSpMkLst>
+            <pc:docMk/>
+            <pc:sldMk cId="3251881791" sldId="264"/>
+            <ac:cxnSpMk id="20" creationId="{D6DCB3F2-50A5-4804-95A8-E80A7E5F5AB3}"/>
+          </ac:cxnSpMkLst>
+        </pc:cxnChg>
+        <pc:cxnChg chg="del">
+          <ac:chgData name="Nhut DOAN NGUYEN" userId="d7212ade-34df-43ef-b0a5-cb321af945d9" providerId="ADAL" clId="{51DED03C-BB6F-49A2-B443-0FC1DDC50DED}" dt="2019-11-11T23:49:29.516" v="625" actId="478"/>
+          <ac:cxnSpMkLst>
+            <pc:docMk/>
+            <pc:sldMk cId="3251881791" sldId="264"/>
+            <ac:cxnSpMk id="24" creationId="{D062D7D3-6D26-4A3C-BF9A-4FEECD7FAD8E}"/>
+          </ac:cxnSpMkLst>
+        </pc:cxnChg>
+        <pc:cxnChg chg="del">
+          <ac:chgData name="Nhut DOAN NGUYEN" userId="d7212ade-34df-43ef-b0a5-cb321af945d9" providerId="ADAL" clId="{51DED03C-BB6F-49A2-B443-0FC1DDC50DED}" dt="2019-11-11T23:49:36.814" v="628" actId="478"/>
+          <ac:cxnSpMkLst>
+            <pc:docMk/>
+            <pc:sldMk cId="3251881791" sldId="264"/>
+            <ac:cxnSpMk id="28" creationId="{2E01EA5D-3799-4FE9-A15E-691AFAAD8FEB}"/>
+          </ac:cxnSpMkLst>
+        </pc:cxnChg>
+        <pc:cxnChg chg="del">
+          <ac:chgData name="Nhut DOAN NGUYEN" userId="d7212ade-34df-43ef-b0a5-cb321af945d9" providerId="ADAL" clId="{51DED03C-BB6F-49A2-B443-0FC1DDC50DED}" dt="2019-11-11T23:49:15.262" v="623" actId="478"/>
+          <ac:cxnSpMkLst>
+            <pc:docMk/>
+            <pc:sldMk cId="3251881791" sldId="264"/>
+            <ac:cxnSpMk id="30" creationId="{190B51C5-F37B-4C40-9CAB-A3F6873AAC4E}"/>
+          </ac:cxnSpMkLst>
+        </pc:cxnChg>
+        <pc:cxnChg chg="del mod">
+          <ac:chgData name="Nhut DOAN NGUYEN" userId="d7212ade-34df-43ef-b0a5-cb321af945d9" providerId="ADAL" clId="{51DED03C-BB6F-49A2-B443-0FC1DDC50DED}" dt="2019-11-11T23:49:15.262" v="623" actId="478"/>
+          <ac:cxnSpMkLst>
+            <pc:docMk/>
+            <pc:sldMk cId="3251881791" sldId="264"/>
+            <ac:cxnSpMk id="32" creationId="{2FAF8528-0D59-48E1-91CE-1C72F174FA27}"/>
+          </ac:cxnSpMkLst>
+        </pc:cxnChg>
+        <pc:cxnChg chg="del mod">
+          <ac:chgData name="Nhut DOAN NGUYEN" userId="d7212ade-34df-43ef-b0a5-cb321af945d9" providerId="ADAL" clId="{51DED03C-BB6F-49A2-B443-0FC1DDC50DED}" dt="2019-11-11T23:49:26.117" v="624" actId="478"/>
+          <ac:cxnSpMkLst>
+            <pc:docMk/>
+            <pc:sldMk cId="3251881791" sldId="264"/>
+            <ac:cxnSpMk id="40" creationId="{4F4BD4E8-52F0-42E6-AD0F-2C340DBEA386}"/>
+          </ac:cxnSpMkLst>
+        </pc:cxnChg>
+        <pc:cxnChg chg="del">
+          <ac:chgData name="Nhut DOAN NGUYEN" userId="d7212ade-34df-43ef-b0a5-cb321af945d9" providerId="ADAL" clId="{51DED03C-BB6F-49A2-B443-0FC1DDC50DED}" dt="2019-11-11T23:49:26.117" v="624" actId="478"/>
+          <ac:cxnSpMkLst>
+            <pc:docMk/>
+            <pc:sldMk cId="3251881791" sldId="264"/>
+            <ac:cxnSpMk id="42" creationId="{228BA909-583C-4327-A629-F80912AB7A83}"/>
+          </ac:cxnSpMkLst>
+        </pc:cxnChg>
+        <pc:cxnChg chg="del mod">
+          <ac:chgData name="Nhut DOAN NGUYEN" userId="d7212ade-34df-43ef-b0a5-cb321af945d9" providerId="ADAL" clId="{51DED03C-BB6F-49A2-B443-0FC1DDC50DED}" dt="2019-11-11T23:49:15.262" v="623" actId="478"/>
+          <ac:cxnSpMkLst>
+            <pc:docMk/>
+            <pc:sldMk cId="3251881791" sldId="264"/>
+            <ac:cxnSpMk id="44" creationId="{40E6EC3D-9B26-4BF0-9D31-37859FFC2D51}"/>
+          </ac:cxnSpMkLst>
+        </pc:cxnChg>
+        <pc:cxnChg chg="del">
+          <ac:chgData name="Nhut DOAN NGUYEN" userId="d7212ade-34df-43ef-b0a5-cb321af945d9" providerId="ADAL" clId="{51DED03C-BB6F-49A2-B443-0FC1DDC50DED}" dt="2019-11-11T23:49:15.262" v="623" actId="478"/>
+          <ac:cxnSpMkLst>
+            <pc:docMk/>
+            <pc:sldMk cId="3251881791" sldId="264"/>
+            <ac:cxnSpMk id="46" creationId="{95330A63-B35C-4DB6-A98A-B47B77085D88}"/>
+          </ac:cxnSpMkLst>
+        </pc:cxnChg>
+        <pc:cxnChg chg="del mod">
+          <ac:chgData name="Nhut DOAN NGUYEN" userId="d7212ade-34df-43ef-b0a5-cb321af945d9" providerId="ADAL" clId="{51DED03C-BB6F-49A2-B443-0FC1DDC50DED}" dt="2019-11-11T23:49:32.451" v="626" actId="478"/>
+          <ac:cxnSpMkLst>
+            <pc:docMk/>
+            <pc:sldMk cId="3251881791" sldId="264"/>
+            <ac:cxnSpMk id="48" creationId="{2123147A-306D-4360-B4D1-F2AF513BEEEF}"/>
+          </ac:cxnSpMkLst>
+        </pc:cxnChg>
+        <pc:cxnChg chg="del">
+          <ac:chgData name="Nhut DOAN NGUYEN" userId="d7212ade-34df-43ef-b0a5-cb321af945d9" providerId="ADAL" clId="{51DED03C-BB6F-49A2-B443-0FC1DDC50DED}" dt="2019-11-11T23:49:29.516" v="625" actId="478"/>
+          <ac:cxnSpMkLst>
+            <pc:docMk/>
+            <pc:sldMk cId="3251881791" sldId="264"/>
+            <ac:cxnSpMk id="50" creationId="{19843E4A-054B-4217-B9C4-A89ACCA72B2F}"/>
+          </ac:cxnSpMkLst>
+        </pc:cxnChg>
+        <pc:cxnChg chg="del mod">
+          <ac:chgData name="Nhut DOAN NGUYEN" userId="d7212ade-34df-43ef-b0a5-cb321af945d9" providerId="ADAL" clId="{51DED03C-BB6F-49A2-B443-0FC1DDC50DED}" dt="2019-11-11T23:49:26.117" v="624" actId="478"/>
+          <ac:cxnSpMkLst>
+            <pc:docMk/>
+            <pc:sldMk cId="3251881791" sldId="264"/>
+            <ac:cxnSpMk id="52" creationId="{0CAF88D5-BE1C-4A4C-9A3C-F70B5570AA3A}"/>
+          </ac:cxnSpMkLst>
+        </pc:cxnChg>
+        <pc:cxnChg chg="del">
+          <ac:chgData name="Nhut DOAN NGUYEN" userId="d7212ade-34df-43ef-b0a5-cb321af945d9" providerId="ADAL" clId="{51DED03C-BB6F-49A2-B443-0FC1DDC50DED}" dt="2019-11-11T23:49:26.117" v="624" actId="478"/>
+          <ac:cxnSpMkLst>
+            <pc:docMk/>
+            <pc:sldMk cId="3251881791" sldId="264"/>
             <ac:cxnSpMk id="54" creationId="{EEA28B46-16E8-4A0E-848B-F682B64CE995}"/>
           </ac:cxnSpMkLst>
         </pc:cxnChg>
@@ -5746,6 +7998,1328 @@
 </p:sld>
 </file>
 
+<file path=ppt/slides/slide2.xml><?xml version="1.0" encoding="utf-8"?>
+<p:sld xmlns:a="http://schemas.openxmlformats.org/drawingml/2006/main" xmlns:r="http://schemas.openxmlformats.org/officeDocument/2006/relationships" xmlns:p="http://schemas.openxmlformats.org/presentationml/2006/main">
+  <p:cSld>
+    <p:spTree>
+      <p:nvGrpSpPr>
+        <p:cNvPr id="1" name=""/>
+        <p:cNvGrpSpPr/>
+        <p:nvPr/>
+      </p:nvGrpSpPr>
+      <p:grpSpPr>
+        <a:xfrm>
+          <a:off x="0" y="0"/>
+          <a:ext cx="0" cy="0"/>
+          <a:chOff x="0" y="0"/>
+          <a:chExt cx="0" cy="0"/>
+        </a:xfrm>
+      </p:grpSpPr>
+      <p:sp>
+        <p:nvSpPr>
+          <p:cNvPr id="4" name="Rectangle: Rounded Corners 3">
+            <a:extLst>
+              <a:ext uri="{FF2B5EF4-FFF2-40B4-BE49-F238E27FC236}">
+                <a16:creationId xmlns:a16="http://schemas.microsoft.com/office/drawing/2014/main" id="{F697C020-4794-47E4-B14F-D062237DA5BC}"/>
+              </a:ext>
+            </a:extLst>
+          </p:cNvPr>
+          <p:cNvSpPr/>
+          <p:nvPr/>
+        </p:nvSpPr>
+        <p:spPr>
+          <a:xfrm>
+            <a:off x="4226560" y="568960"/>
+            <a:ext cx="3515360" cy="690880"/>
+          </a:xfrm>
+          <a:prstGeom prst="roundRect">
+            <a:avLst/>
+          </a:prstGeom>
+        </p:spPr>
+        <p:style>
+          <a:lnRef idx="1">
+            <a:schemeClr val="accent6"/>
+          </a:lnRef>
+          <a:fillRef idx="3">
+            <a:schemeClr val="accent6"/>
+          </a:fillRef>
+          <a:effectRef idx="2">
+            <a:schemeClr val="accent6"/>
+          </a:effectRef>
+          <a:fontRef idx="minor">
+            <a:schemeClr val="lt1"/>
+          </a:fontRef>
+        </p:style>
+        <p:txBody>
+          <a:bodyPr rtlCol="0" anchor="ctr"/>
+          <a:lstStyle/>
+          <a:p>
+            <a:pPr algn="ctr"/>
+            <a:r>
+              <a:rPr lang="en-US" dirty="0"/>
+              <a:t>Main repository, branch </a:t>
+            </a:r>
+            <a:r>
+              <a:rPr lang="en-US" b="1" dirty="0"/>
+              <a:t>develop</a:t>
+            </a:r>
+          </a:p>
+          <a:p>
+            <a:pPr algn="ctr"/>
+            <a:r>
+              <a:rPr lang="en-US" dirty="0"/>
+              <a:t>(github.com)</a:t>
+            </a:r>
+          </a:p>
+        </p:txBody>
+      </p:sp>
+    </p:spTree>
+    <p:extLst>
+      <p:ext uri="{BB962C8B-B14F-4D97-AF65-F5344CB8AC3E}">
+        <p14:creationId xmlns:p14="http://schemas.microsoft.com/office/powerpoint/2010/main" val="3173195116"/>
+      </p:ext>
+    </p:extLst>
+  </p:cSld>
+  <p:clrMapOvr>
+    <a:masterClrMapping/>
+  </p:clrMapOvr>
+</p:sld>
+</file>
+
+<file path=ppt/slides/slide3.xml><?xml version="1.0" encoding="utf-8"?>
+<p:sld xmlns:a="http://schemas.openxmlformats.org/drawingml/2006/main" xmlns:r="http://schemas.openxmlformats.org/officeDocument/2006/relationships" xmlns:p="http://schemas.openxmlformats.org/presentationml/2006/main">
+  <p:cSld>
+    <p:spTree>
+      <p:nvGrpSpPr>
+        <p:cNvPr id="1" name=""/>
+        <p:cNvGrpSpPr/>
+        <p:nvPr/>
+      </p:nvGrpSpPr>
+      <p:grpSpPr>
+        <a:xfrm>
+          <a:off x="0" y="0"/>
+          <a:ext cx="0" cy="0"/>
+          <a:chOff x="0" y="0"/>
+          <a:chExt cx="0" cy="0"/>
+        </a:xfrm>
+      </p:grpSpPr>
+      <p:sp>
+        <p:nvSpPr>
+          <p:cNvPr id="4" name="Rectangle: Rounded Corners 3">
+            <a:extLst>
+              <a:ext uri="{FF2B5EF4-FFF2-40B4-BE49-F238E27FC236}">
+                <a16:creationId xmlns:a16="http://schemas.microsoft.com/office/drawing/2014/main" id="{F697C020-4794-47E4-B14F-D062237DA5BC}"/>
+              </a:ext>
+            </a:extLst>
+          </p:cNvPr>
+          <p:cNvSpPr/>
+          <p:nvPr/>
+        </p:nvSpPr>
+        <p:spPr>
+          <a:xfrm>
+            <a:off x="4226560" y="568960"/>
+            <a:ext cx="3515360" cy="690880"/>
+          </a:xfrm>
+          <a:prstGeom prst="roundRect">
+            <a:avLst/>
+          </a:prstGeom>
+        </p:spPr>
+        <p:style>
+          <a:lnRef idx="1">
+            <a:schemeClr val="accent6"/>
+          </a:lnRef>
+          <a:fillRef idx="3">
+            <a:schemeClr val="accent6"/>
+          </a:fillRef>
+          <a:effectRef idx="2">
+            <a:schemeClr val="accent6"/>
+          </a:effectRef>
+          <a:fontRef idx="minor">
+            <a:schemeClr val="lt1"/>
+          </a:fontRef>
+        </p:style>
+        <p:txBody>
+          <a:bodyPr rtlCol="0" anchor="ctr"/>
+          <a:lstStyle/>
+          <a:p>
+            <a:pPr algn="ctr"/>
+            <a:r>
+              <a:rPr lang="en-US" dirty="0"/>
+              <a:t>Main repository, branch </a:t>
+            </a:r>
+            <a:r>
+              <a:rPr lang="en-US" b="1" dirty="0"/>
+              <a:t>develop</a:t>
+            </a:r>
+          </a:p>
+          <a:p>
+            <a:pPr algn="ctr"/>
+            <a:r>
+              <a:rPr lang="en-US" dirty="0"/>
+              <a:t>(github.com)</a:t>
+            </a:r>
+          </a:p>
+        </p:txBody>
+      </p:sp>
+      <p:sp>
+        <p:nvSpPr>
+          <p:cNvPr id="5" name="Rectangle: Rounded Corners 4">
+            <a:extLst>
+              <a:ext uri="{FF2B5EF4-FFF2-40B4-BE49-F238E27FC236}">
+                <a16:creationId xmlns:a16="http://schemas.microsoft.com/office/drawing/2014/main" id="{6746CAAB-D3C5-4C1A-9C3F-3DBB89E5C95B}"/>
+              </a:ext>
+            </a:extLst>
+          </p:cNvPr>
+          <p:cNvSpPr/>
+          <p:nvPr/>
+        </p:nvSpPr>
+        <p:spPr>
+          <a:xfrm>
+            <a:off x="914400" y="2138679"/>
+            <a:ext cx="2946400" cy="690880"/>
+          </a:xfrm>
+          <a:prstGeom prst="roundRect">
+            <a:avLst/>
+          </a:prstGeom>
+        </p:spPr>
+        <p:style>
+          <a:lnRef idx="0">
+            <a:schemeClr val="accent1"/>
+          </a:lnRef>
+          <a:fillRef idx="3">
+            <a:schemeClr val="accent1"/>
+          </a:fillRef>
+          <a:effectRef idx="3">
+            <a:schemeClr val="accent1"/>
+          </a:effectRef>
+          <a:fontRef idx="minor">
+            <a:schemeClr val="lt1"/>
+          </a:fontRef>
+        </p:style>
+        <p:txBody>
+          <a:bodyPr rtlCol="0" anchor="ctr"/>
+          <a:lstStyle/>
+          <a:p>
+            <a:pPr algn="ctr"/>
+            <a:r>
+              <a:rPr lang="en-US" dirty="0"/>
+              <a:t>Main repository, branch </a:t>
+            </a:r>
+            <a:r>
+              <a:rPr lang="en-US" b="1" dirty="0"/>
+              <a:t>A</a:t>
+            </a:r>
+          </a:p>
+          <a:p>
+            <a:pPr algn="ctr"/>
+            <a:r>
+              <a:rPr lang="en-US" dirty="0"/>
+              <a:t>(github.com)</a:t>
+            </a:r>
+          </a:p>
+        </p:txBody>
+      </p:sp>
+      <p:cxnSp>
+        <p:nvCxnSpPr>
+          <p:cNvPr id="16" name="Straight Arrow Connector 15">
+            <a:extLst>
+              <a:ext uri="{FF2B5EF4-FFF2-40B4-BE49-F238E27FC236}">
+                <a16:creationId xmlns:a16="http://schemas.microsoft.com/office/drawing/2014/main" id="{4438300A-2C1E-4714-BFD4-2E5E8E4EA2B6}"/>
+              </a:ext>
+            </a:extLst>
+          </p:cNvPr>
+          <p:cNvCxnSpPr>
+            <a:stCxn id="4" idx="2"/>
+            <a:endCxn id="5" idx="0"/>
+          </p:cNvCxnSpPr>
+          <p:nvPr/>
+        </p:nvCxnSpPr>
+        <p:spPr>
+          <a:xfrm flipH="1">
+            <a:off x="2387600" y="1259840"/>
+            <a:ext cx="3596640" cy="878839"/>
+          </a:xfrm>
+          <a:prstGeom prst="straightConnector1">
+            <a:avLst/>
+          </a:prstGeom>
+          <a:ln>
+            <a:tailEnd type="triangle"/>
+          </a:ln>
+        </p:spPr>
+        <p:style>
+          <a:lnRef idx="1">
+            <a:schemeClr val="accent1"/>
+          </a:lnRef>
+          <a:fillRef idx="0">
+            <a:schemeClr val="accent1"/>
+          </a:fillRef>
+          <a:effectRef idx="0">
+            <a:schemeClr val="accent1"/>
+          </a:effectRef>
+          <a:fontRef idx="minor">
+            <a:schemeClr val="tx1"/>
+          </a:fontRef>
+        </p:style>
+      </p:cxnSp>
+      <p:sp>
+        <p:nvSpPr>
+          <p:cNvPr id="49" name="TextBox 48">
+            <a:extLst>
+              <a:ext uri="{FF2B5EF4-FFF2-40B4-BE49-F238E27FC236}">
+                <a16:creationId xmlns:a16="http://schemas.microsoft.com/office/drawing/2014/main" id="{D453986A-1040-49C6-9861-A7C244E7DB73}"/>
+              </a:ext>
+            </a:extLst>
+          </p:cNvPr>
+          <p:cNvSpPr txBox="1"/>
+          <p:nvPr/>
+        </p:nvSpPr>
+        <p:spPr>
+          <a:xfrm>
+            <a:off x="3674411" y="1759476"/>
+            <a:ext cx="936475" cy="246221"/>
+          </a:xfrm>
+          <a:prstGeom prst="rect">
+            <a:avLst/>
+          </a:prstGeom>
+          <a:noFill/>
+        </p:spPr>
+        <p:txBody>
+          <a:bodyPr wrap="none" rtlCol="0">
+            <a:spAutoFit/>
+          </a:bodyPr>
+          <a:lstStyle/>
+          <a:p>
+            <a:r>
+              <a:rPr lang="en-US" sz="1000" dirty="0"/>
+              <a:t>create branch </a:t>
+            </a:r>
+          </a:p>
+        </p:txBody>
+      </p:sp>
+    </p:spTree>
+    <p:extLst>
+      <p:ext uri="{BB962C8B-B14F-4D97-AF65-F5344CB8AC3E}">
+        <p14:creationId xmlns:p14="http://schemas.microsoft.com/office/powerpoint/2010/main" val="1284329534"/>
+      </p:ext>
+    </p:extLst>
+  </p:cSld>
+  <p:clrMapOvr>
+    <a:masterClrMapping/>
+  </p:clrMapOvr>
+</p:sld>
+</file>
+
+<file path=ppt/slides/slide4.xml><?xml version="1.0" encoding="utf-8"?>
+<p:sld xmlns:a="http://schemas.openxmlformats.org/drawingml/2006/main" xmlns:r="http://schemas.openxmlformats.org/officeDocument/2006/relationships" xmlns:p="http://schemas.openxmlformats.org/presentationml/2006/main">
+  <p:cSld>
+    <p:spTree>
+      <p:nvGrpSpPr>
+        <p:cNvPr id="1" name=""/>
+        <p:cNvGrpSpPr/>
+        <p:nvPr/>
+      </p:nvGrpSpPr>
+      <p:grpSpPr>
+        <a:xfrm>
+          <a:off x="0" y="0"/>
+          <a:ext cx="0" cy="0"/>
+          <a:chOff x="0" y="0"/>
+          <a:chExt cx="0" cy="0"/>
+        </a:xfrm>
+      </p:grpSpPr>
+      <p:sp>
+        <p:nvSpPr>
+          <p:cNvPr id="5" name="Rectangle: Rounded Corners 4">
+            <a:extLst>
+              <a:ext uri="{FF2B5EF4-FFF2-40B4-BE49-F238E27FC236}">
+                <a16:creationId xmlns:a16="http://schemas.microsoft.com/office/drawing/2014/main" id="{6746CAAB-D3C5-4C1A-9C3F-3DBB89E5C95B}"/>
+              </a:ext>
+            </a:extLst>
+          </p:cNvPr>
+          <p:cNvSpPr/>
+          <p:nvPr/>
+        </p:nvSpPr>
+        <p:spPr>
+          <a:xfrm>
+            <a:off x="914400" y="2138679"/>
+            <a:ext cx="2946400" cy="690880"/>
+          </a:xfrm>
+          <a:prstGeom prst="roundRect">
+            <a:avLst/>
+          </a:prstGeom>
+        </p:spPr>
+        <p:style>
+          <a:lnRef idx="0">
+            <a:schemeClr val="accent1"/>
+          </a:lnRef>
+          <a:fillRef idx="3">
+            <a:schemeClr val="accent1"/>
+          </a:fillRef>
+          <a:effectRef idx="3">
+            <a:schemeClr val="accent1"/>
+          </a:effectRef>
+          <a:fontRef idx="minor">
+            <a:schemeClr val="lt1"/>
+          </a:fontRef>
+        </p:style>
+        <p:txBody>
+          <a:bodyPr rtlCol="0" anchor="ctr"/>
+          <a:lstStyle/>
+          <a:p>
+            <a:pPr algn="ctr"/>
+            <a:r>
+              <a:rPr lang="en-US" dirty="0"/>
+              <a:t>Main repository, branch </a:t>
+            </a:r>
+            <a:r>
+              <a:rPr lang="en-US" b="1" dirty="0"/>
+              <a:t>A</a:t>
+            </a:r>
+          </a:p>
+          <a:p>
+            <a:pPr algn="ctr"/>
+            <a:r>
+              <a:rPr lang="en-US" dirty="0"/>
+              <a:t>(github.com)</a:t>
+            </a:r>
+          </a:p>
+        </p:txBody>
+      </p:sp>
+    </p:spTree>
+    <p:extLst>
+      <p:ext uri="{BB962C8B-B14F-4D97-AF65-F5344CB8AC3E}">
+        <p14:creationId xmlns:p14="http://schemas.microsoft.com/office/powerpoint/2010/main" val="4063598463"/>
+      </p:ext>
+    </p:extLst>
+  </p:cSld>
+  <p:clrMapOvr>
+    <a:masterClrMapping/>
+  </p:clrMapOvr>
+</p:sld>
+</file>
+
+<file path=ppt/slides/slide5.xml><?xml version="1.0" encoding="utf-8"?>
+<p:sld xmlns:a="http://schemas.openxmlformats.org/drawingml/2006/main" xmlns:r="http://schemas.openxmlformats.org/officeDocument/2006/relationships" xmlns:p="http://schemas.openxmlformats.org/presentationml/2006/main">
+  <p:cSld>
+    <p:spTree>
+      <p:nvGrpSpPr>
+        <p:cNvPr id="1" name=""/>
+        <p:cNvGrpSpPr/>
+        <p:nvPr/>
+      </p:nvGrpSpPr>
+      <p:grpSpPr>
+        <a:xfrm>
+          <a:off x="0" y="0"/>
+          <a:ext cx="0" cy="0"/>
+          <a:chOff x="0" y="0"/>
+          <a:chExt cx="0" cy="0"/>
+        </a:xfrm>
+      </p:grpSpPr>
+      <p:sp>
+        <p:nvSpPr>
+          <p:cNvPr id="12" name="Rectangle: Rounded Corners 11">
+            <a:extLst>
+              <a:ext uri="{FF2B5EF4-FFF2-40B4-BE49-F238E27FC236}">
+                <a16:creationId xmlns:a16="http://schemas.microsoft.com/office/drawing/2014/main" id="{8C9AB467-55CA-4EEF-9363-22CE9EBABB8E}"/>
+              </a:ext>
+            </a:extLst>
+          </p:cNvPr>
+          <p:cNvSpPr/>
+          <p:nvPr/>
+        </p:nvSpPr>
+        <p:spPr>
+          <a:xfrm>
+            <a:off x="4226560" y="5369557"/>
+            <a:ext cx="3515360" cy="690880"/>
+          </a:xfrm>
+          <a:prstGeom prst="roundRect">
+            <a:avLst/>
+          </a:prstGeom>
+        </p:spPr>
+        <p:style>
+          <a:lnRef idx="0">
+            <a:schemeClr val="accent4"/>
+          </a:lnRef>
+          <a:fillRef idx="3">
+            <a:schemeClr val="accent4"/>
+          </a:fillRef>
+          <a:effectRef idx="3">
+            <a:schemeClr val="accent4"/>
+          </a:effectRef>
+          <a:fontRef idx="minor">
+            <a:schemeClr val="lt1"/>
+          </a:fontRef>
+        </p:style>
+        <p:txBody>
+          <a:bodyPr rtlCol="0" anchor="ctr"/>
+          <a:lstStyle/>
+          <a:p>
+            <a:pPr algn="ctr"/>
+            <a:r>
+              <a:rPr lang="en-US" dirty="0"/>
+              <a:t>Working directory, branch </a:t>
+            </a:r>
+            <a:r>
+              <a:rPr lang="en-US" b="1" dirty="0"/>
+              <a:t>develop</a:t>
+            </a:r>
+          </a:p>
+          <a:p>
+            <a:pPr algn="ctr"/>
+            <a:r>
+              <a:rPr lang="en-US" dirty="0"/>
+              <a:t>(local computer)</a:t>
+            </a:r>
+          </a:p>
+        </p:txBody>
+      </p:sp>
+      <p:sp>
+        <p:nvSpPr>
+          <p:cNvPr id="80" name="TextBox 79">
+            <a:extLst>
+              <a:ext uri="{FF2B5EF4-FFF2-40B4-BE49-F238E27FC236}">
+                <a16:creationId xmlns:a16="http://schemas.microsoft.com/office/drawing/2014/main" id="{0643C5FA-7C93-4EFD-B0D9-C18F58DE5EC0}"/>
+              </a:ext>
+            </a:extLst>
+          </p:cNvPr>
+          <p:cNvSpPr txBox="1"/>
+          <p:nvPr/>
+        </p:nvSpPr>
+        <p:spPr>
+          <a:xfrm>
+            <a:off x="4871785" y="4879336"/>
+            <a:ext cx="708848" cy="246221"/>
+          </a:xfrm>
+          <a:prstGeom prst="rect">
+            <a:avLst/>
+          </a:prstGeom>
+          <a:solidFill>
+            <a:schemeClr val="tx1">
+              <a:lumMod val="65000"/>
+              <a:lumOff val="35000"/>
+            </a:schemeClr>
+          </a:solidFill>
+        </p:spPr>
+        <p:txBody>
+          <a:bodyPr wrap="none" rtlCol="0">
+            <a:spAutoFit/>
+          </a:bodyPr>
+          <a:lstStyle/>
+          <a:p>
+            <a:r>
+              <a:rPr lang="en-US" sz="1000" dirty="0">
+                <a:solidFill>
+                  <a:schemeClr val="bg1"/>
+                </a:solidFill>
+              </a:rPr>
+              <a:t>git branch</a:t>
+            </a:r>
+          </a:p>
+        </p:txBody>
+      </p:sp>
+    </p:spTree>
+    <p:extLst>
+      <p:ext uri="{BB962C8B-B14F-4D97-AF65-F5344CB8AC3E}">
+        <p14:creationId xmlns:p14="http://schemas.microsoft.com/office/powerpoint/2010/main" val="1440260042"/>
+      </p:ext>
+    </p:extLst>
+  </p:cSld>
+  <p:clrMapOvr>
+    <a:masterClrMapping/>
+  </p:clrMapOvr>
+</p:sld>
+</file>
+
+<file path=ppt/slides/slide6.xml><?xml version="1.0" encoding="utf-8"?>
+<p:sld xmlns:a="http://schemas.openxmlformats.org/drawingml/2006/main" xmlns:r="http://schemas.openxmlformats.org/officeDocument/2006/relationships" xmlns:p="http://schemas.openxmlformats.org/presentationml/2006/main">
+  <p:cSld>
+    <p:spTree>
+      <p:nvGrpSpPr>
+        <p:cNvPr id="1" name=""/>
+        <p:cNvGrpSpPr/>
+        <p:nvPr/>
+      </p:nvGrpSpPr>
+      <p:grpSpPr>
+        <a:xfrm>
+          <a:off x="0" y="0"/>
+          <a:ext cx="0" cy="0"/>
+          <a:chOff x="0" y="0"/>
+          <a:chExt cx="0" cy="0"/>
+        </a:xfrm>
+      </p:grpSpPr>
+      <p:sp>
+        <p:nvSpPr>
+          <p:cNvPr id="9" name="Rectangle: Rounded Corners 8">
+            <a:extLst>
+              <a:ext uri="{FF2B5EF4-FFF2-40B4-BE49-F238E27FC236}">
+                <a16:creationId xmlns:a16="http://schemas.microsoft.com/office/drawing/2014/main" id="{29680307-A9F2-4402-B9FD-23DA3BC5544A}"/>
+              </a:ext>
+            </a:extLst>
+          </p:cNvPr>
+          <p:cNvSpPr/>
+          <p:nvPr/>
+        </p:nvSpPr>
+        <p:spPr>
+          <a:xfrm>
+            <a:off x="4226560" y="3698236"/>
+            <a:ext cx="3515360" cy="690880"/>
+          </a:xfrm>
+          <a:prstGeom prst="roundRect">
+            <a:avLst/>
+          </a:prstGeom>
+        </p:spPr>
+        <p:style>
+          <a:lnRef idx="0">
+            <a:schemeClr val="accent2"/>
+          </a:lnRef>
+          <a:fillRef idx="3">
+            <a:schemeClr val="accent2"/>
+          </a:fillRef>
+          <a:effectRef idx="3">
+            <a:schemeClr val="accent2"/>
+          </a:effectRef>
+          <a:fontRef idx="minor">
+            <a:schemeClr val="lt1"/>
+          </a:fontRef>
+        </p:style>
+        <p:txBody>
+          <a:bodyPr rtlCol="0" anchor="ctr"/>
+          <a:lstStyle/>
+          <a:p>
+            <a:pPr algn="ctr"/>
+            <a:r>
+              <a:rPr lang="en-US" dirty="0"/>
+              <a:t>Local repository, branch </a:t>
+            </a:r>
+            <a:r>
+              <a:rPr lang="en-US" b="1" dirty="0"/>
+              <a:t>develop</a:t>
+            </a:r>
+          </a:p>
+          <a:p>
+            <a:pPr algn="ctr"/>
+            <a:r>
+              <a:rPr lang="en-US" dirty="0"/>
+              <a:t>(local computer)</a:t>
+            </a:r>
+          </a:p>
+        </p:txBody>
+      </p:sp>
+      <p:sp>
+        <p:nvSpPr>
+          <p:cNvPr id="12" name="Rectangle: Rounded Corners 11">
+            <a:extLst>
+              <a:ext uri="{FF2B5EF4-FFF2-40B4-BE49-F238E27FC236}">
+                <a16:creationId xmlns:a16="http://schemas.microsoft.com/office/drawing/2014/main" id="{8C9AB467-55CA-4EEF-9363-22CE9EBABB8E}"/>
+              </a:ext>
+            </a:extLst>
+          </p:cNvPr>
+          <p:cNvSpPr/>
+          <p:nvPr/>
+        </p:nvSpPr>
+        <p:spPr>
+          <a:xfrm>
+            <a:off x="4226560" y="5369557"/>
+            <a:ext cx="3515360" cy="690880"/>
+          </a:xfrm>
+          <a:prstGeom prst="roundRect">
+            <a:avLst/>
+          </a:prstGeom>
+        </p:spPr>
+        <p:style>
+          <a:lnRef idx="0">
+            <a:schemeClr val="accent4"/>
+          </a:lnRef>
+          <a:fillRef idx="3">
+            <a:schemeClr val="accent4"/>
+          </a:fillRef>
+          <a:effectRef idx="3">
+            <a:schemeClr val="accent4"/>
+          </a:effectRef>
+          <a:fontRef idx="minor">
+            <a:schemeClr val="lt1"/>
+          </a:fontRef>
+        </p:style>
+        <p:txBody>
+          <a:bodyPr rtlCol="0" anchor="ctr"/>
+          <a:lstStyle/>
+          <a:p>
+            <a:pPr algn="ctr"/>
+            <a:r>
+              <a:rPr lang="en-US" dirty="0"/>
+              <a:t>Working directory, branch </a:t>
+            </a:r>
+            <a:r>
+              <a:rPr lang="en-US" b="1" dirty="0"/>
+              <a:t>develop</a:t>
+            </a:r>
+          </a:p>
+          <a:p>
+            <a:pPr algn="ctr"/>
+            <a:r>
+              <a:rPr lang="en-US" dirty="0"/>
+              <a:t>(local computer)</a:t>
+            </a:r>
+          </a:p>
+        </p:txBody>
+      </p:sp>
+      <p:cxnSp>
+        <p:nvCxnSpPr>
+          <p:cNvPr id="48" name="Straight Arrow Connector 47">
+            <a:extLst>
+              <a:ext uri="{FF2B5EF4-FFF2-40B4-BE49-F238E27FC236}">
+                <a16:creationId xmlns:a16="http://schemas.microsoft.com/office/drawing/2014/main" id="{2123147A-306D-4360-B4D1-F2AF513BEEEF}"/>
+              </a:ext>
+            </a:extLst>
+          </p:cNvPr>
+          <p:cNvCxnSpPr>
+            <a:stCxn id="12" idx="0"/>
+            <a:endCxn id="9" idx="2"/>
+          </p:cNvCxnSpPr>
+          <p:nvPr/>
+        </p:nvCxnSpPr>
+        <p:spPr>
+          <a:xfrm flipV="1">
+            <a:off x="5984240" y="4389116"/>
+            <a:ext cx="0" cy="980441"/>
+          </a:xfrm>
+          <a:prstGeom prst="straightConnector1">
+            <a:avLst/>
+          </a:prstGeom>
+          <a:ln>
+            <a:tailEnd type="triangle"/>
+          </a:ln>
+        </p:spPr>
+        <p:style>
+          <a:lnRef idx="1">
+            <a:schemeClr val="accent1"/>
+          </a:lnRef>
+          <a:fillRef idx="0">
+            <a:schemeClr val="accent1"/>
+          </a:fillRef>
+          <a:effectRef idx="0">
+            <a:schemeClr val="accent1"/>
+          </a:effectRef>
+          <a:fontRef idx="minor">
+            <a:schemeClr val="tx1"/>
+          </a:fontRef>
+        </p:style>
+      </p:cxnSp>
+      <p:sp>
+        <p:nvSpPr>
+          <p:cNvPr id="66" name="TextBox 65">
+            <a:extLst>
+              <a:ext uri="{FF2B5EF4-FFF2-40B4-BE49-F238E27FC236}">
+                <a16:creationId xmlns:a16="http://schemas.microsoft.com/office/drawing/2014/main" id="{F3CCD863-4E7C-4D17-BEFE-A65DDFB8F83D}"/>
+              </a:ext>
+            </a:extLst>
+          </p:cNvPr>
+          <p:cNvSpPr txBox="1"/>
+          <p:nvPr/>
+        </p:nvSpPr>
+        <p:spPr>
+          <a:xfrm>
+            <a:off x="6102059" y="4521949"/>
+            <a:ext cx="745717" cy="246221"/>
+          </a:xfrm>
+          <a:prstGeom prst="rect">
+            <a:avLst/>
+          </a:prstGeom>
+          <a:solidFill>
+            <a:schemeClr val="tx1">
+              <a:lumMod val="65000"/>
+              <a:lumOff val="35000"/>
+            </a:schemeClr>
+          </a:solidFill>
+        </p:spPr>
+        <p:txBody>
+          <a:bodyPr wrap="none" rtlCol="0">
+            <a:spAutoFit/>
+          </a:bodyPr>
+          <a:lstStyle/>
+          <a:p>
+            <a:r>
+              <a:rPr lang="en-US" sz="1000" dirty="0">
+                <a:solidFill>
+                  <a:schemeClr val="bg1"/>
+                </a:solidFill>
+              </a:rPr>
+              <a:t>git commit</a:t>
+            </a:r>
+          </a:p>
+        </p:txBody>
+      </p:sp>
+    </p:spTree>
+    <p:extLst>
+      <p:ext uri="{BB962C8B-B14F-4D97-AF65-F5344CB8AC3E}">
+        <p14:creationId xmlns:p14="http://schemas.microsoft.com/office/powerpoint/2010/main" val="1280034146"/>
+      </p:ext>
+    </p:extLst>
+  </p:cSld>
+  <p:clrMapOvr>
+    <a:masterClrMapping/>
+  </p:clrMapOvr>
+</p:sld>
+</file>
+
+<file path=ppt/slides/slide7.xml><?xml version="1.0" encoding="utf-8"?>
+<p:sld xmlns:a="http://schemas.openxmlformats.org/drawingml/2006/main" xmlns:r="http://schemas.openxmlformats.org/officeDocument/2006/relationships" xmlns:p="http://schemas.openxmlformats.org/presentationml/2006/main">
+  <p:cSld>
+    <p:spTree>
+      <p:nvGrpSpPr>
+        <p:cNvPr id="1" name=""/>
+        <p:cNvGrpSpPr/>
+        <p:nvPr/>
+      </p:nvGrpSpPr>
+      <p:grpSpPr>
+        <a:xfrm>
+          <a:off x="0" y="0"/>
+          <a:ext cx="0" cy="0"/>
+          <a:chOff x="0" y="0"/>
+          <a:chExt cx="0" cy="0"/>
+        </a:xfrm>
+      </p:grpSpPr>
+      <p:sp>
+        <p:nvSpPr>
+          <p:cNvPr id="4" name="Rectangle: Rounded Corners 3">
+            <a:extLst>
+              <a:ext uri="{FF2B5EF4-FFF2-40B4-BE49-F238E27FC236}">
+                <a16:creationId xmlns:a16="http://schemas.microsoft.com/office/drawing/2014/main" id="{F697C020-4794-47E4-B14F-D062237DA5BC}"/>
+              </a:ext>
+            </a:extLst>
+          </p:cNvPr>
+          <p:cNvSpPr/>
+          <p:nvPr/>
+        </p:nvSpPr>
+        <p:spPr>
+          <a:xfrm>
+            <a:off x="4226560" y="568960"/>
+            <a:ext cx="3515360" cy="690880"/>
+          </a:xfrm>
+          <a:prstGeom prst="roundRect">
+            <a:avLst/>
+          </a:prstGeom>
+        </p:spPr>
+        <p:style>
+          <a:lnRef idx="1">
+            <a:schemeClr val="accent6"/>
+          </a:lnRef>
+          <a:fillRef idx="3">
+            <a:schemeClr val="accent6"/>
+          </a:fillRef>
+          <a:effectRef idx="2">
+            <a:schemeClr val="accent6"/>
+          </a:effectRef>
+          <a:fontRef idx="minor">
+            <a:schemeClr val="lt1"/>
+          </a:fontRef>
+        </p:style>
+        <p:txBody>
+          <a:bodyPr rtlCol="0" anchor="ctr"/>
+          <a:lstStyle/>
+          <a:p>
+            <a:pPr algn="ctr"/>
+            <a:r>
+              <a:rPr lang="en-US" dirty="0"/>
+              <a:t>Main repository, branch </a:t>
+            </a:r>
+            <a:r>
+              <a:rPr lang="en-US" b="1" dirty="0"/>
+              <a:t>develop</a:t>
+            </a:r>
+          </a:p>
+          <a:p>
+            <a:pPr algn="ctr"/>
+            <a:r>
+              <a:rPr lang="en-US" dirty="0"/>
+              <a:t>(github.com)</a:t>
+            </a:r>
+          </a:p>
+        </p:txBody>
+      </p:sp>
+      <p:sp>
+        <p:nvSpPr>
+          <p:cNvPr id="9" name="Rectangle: Rounded Corners 8">
+            <a:extLst>
+              <a:ext uri="{FF2B5EF4-FFF2-40B4-BE49-F238E27FC236}">
+                <a16:creationId xmlns:a16="http://schemas.microsoft.com/office/drawing/2014/main" id="{29680307-A9F2-4402-B9FD-23DA3BC5544A}"/>
+              </a:ext>
+            </a:extLst>
+          </p:cNvPr>
+          <p:cNvSpPr/>
+          <p:nvPr/>
+        </p:nvSpPr>
+        <p:spPr>
+          <a:xfrm>
+            <a:off x="4226560" y="3698236"/>
+            <a:ext cx="3515360" cy="690880"/>
+          </a:xfrm>
+          <a:prstGeom prst="roundRect">
+            <a:avLst/>
+          </a:prstGeom>
+        </p:spPr>
+        <p:style>
+          <a:lnRef idx="0">
+            <a:schemeClr val="accent2"/>
+          </a:lnRef>
+          <a:fillRef idx="3">
+            <a:schemeClr val="accent2"/>
+          </a:fillRef>
+          <a:effectRef idx="3">
+            <a:schemeClr val="accent2"/>
+          </a:effectRef>
+          <a:fontRef idx="minor">
+            <a:schemeClr val="lt1"/>
+          </a:fontRef>
+        </p:style>
+        <p:txBody>
+          <a:bodyPr rtlCol="0" anchor="ctr"/>
+          <a:lstStyle/>
+          <a:p>
+            <a:pPr algn="ctr"/>
+            <a:r>
+              <a:rPr lang="en-US" dirty="0"/>
+              <a:t>Local repository, branch </a:t>
+            </a:r>
+            <a:r>
+              <a:rPr lang="en-US" b="1" dirty="0"/>
+              <a:t>develop</a:t>
+            </a:r>
+          </a:p>
+          <a:p>
+            <a:pPr algn="ctr"/>
+            <a:r>
+              <a:rPr lang="en-US" dirty="0"/>
+              <a:t>(local computer)</a:t>
+            </a:r>
+          </a:p>
+        </p:txBody>
+      </p:sp>
+      <p:cxnSp>
+        <p:nvCxnSpPr>
+          <p:cNvPr id="26" name="Straight Arrow Connector 25">
+            <a:extLst>
+              <a:ext uri="{FF2B5EF4-FFF2-40B4-BE49-F238E27FC236}">
+                <a16:creationId xmlns:a16="http://schemas.microsoft.com/office/drawing/2014/main" id="{F308478F-E970-41C9-933D-A44F5058D6EE}"/>
+              </a:ext>
+            </a:extLst>
+          </p:cNvPr>
+          <p:cNvCxnSpPr>
+            <a:cxnSpLocks/>
+          </p:cNvCxnSpPr>
+          <p:nvPr/>
+        </p:nvCxnSpPr>
+        <p:spPr>
+          <a:xfrm flipV="1">
+            <a:off x="5974080" y="1244606"/>
+            <a:ext cx="0" cy="2438396"/>
+          </a:xfrm>
+          <a:prstGeom prst="straightConnector1">
+            <a:avLst/>
+          </a:prstGeom>
+          <a:ln>
+            <a:tailEnd type="triangle"/>
+          </a:ln>
+        </p:spPr>
+        <p:style>
+          <a:lnRef idx="1">
+            <a:schemeClr val="accent1"/>
+          </a:lnRef>
+          <a:fillRef idx="0">
+            <a:schemeClr val="accent1"/>
+          </a:fillRef>
+          <a:effectRef idx="0">
+            <a:schemeClr val="accent1"/>
+          </a:effectRef>
+          <a:fontRef idx="minor">
+            <a:schemeClr val="tx1"/>
+          </a:fontRef>
+        </p:style>
+      </p:cxnSp>
+      <p:sp>
+        <p:nvSpPr>
+          <p:cNvPr id="69" name="TextBox 68">
+            <a:extLst>
+              <a:ext uri="{FF2B5EF4-FFF2-40B4-BE49-F238E27FC236}">
+                <a16:creationId xmlns:a16="http://schemas.microsoft.com/office/drawing/2014/main" id="{CCF4AD14-7522-4FDC-9A66-DF9A4812E745}"/>
+              </a:ext>
+            </a:extLst>
+          </p:cNvPr>
+          <p:cNvSpPr txBox="1"/>
+          <p:nvPr/>
+        </p:nvSpPr>
+        <p:spPr>
+          <a:xfrm>
+            <a:off x="6076509" y="2463804"/>
+            <a:ext cx="598241" cy="246221"/>
+          </a:xfrm>
+          <a:prstGeom prst="rect">
+            <a:avLst/>
+          </a:prstGeom>
+          <a:solidFill>
+            <a:schemeClr val="tx1">
+              <a:lumMod val="65000"/>
+              <a:lumOff val="35000"/>
+            </a:schemeClr>
+          </a:solidFill>
+        </p:spPr>
+        <p:txBody>
+          <a:bodyPr wrap="none" rtlCol="0">
+            <a:spAutoFit/>
+          </a:bodyPr>
+          <a:lstStyle/>
+          <a:p>
+            <a:r>
+              <a:rPr lang="en-US" sz="1000" dirty="0">
+                <a:solidFill>
+                  <a:schemeClr val="bg1"/>
+                </a:solidFill>
+              </a:rPr>
+              <a:t>git push</a:t>
+            </a:r>
+          </a:p>
+        </p:txBody>
+      </p:sp>
+    </p:spTree>
+    <p:extLst>
+      <p:ext uri="{BB962C8B-B14F-4D97-AF65-F5344CB8AC3E}">
+        <p14:creationId xmlns:p14="http://schemas.microsoft.com/office/powerpoint/2010/main" val="3251881791"/>
+      </p:ext>
+    </p:extLst>
+  </p:cSld>
+  <p:clrMapOvr>
+    <a:masterClrMapping/>
+  </p:clrMapOvr>
+</p:sld>
+</file>
+
+<file path=ppt/slides/slide8.xml><?xml version="1.0" encoding="utf-8"?>
+<p:sld xmlns:a="http://schemas.openxmlformats.org/drawingml/2006/main" xmlns:r="http://schemas.openxmlformats.org/officeDocument/2006/relationships" xmlns:p="http://schemas.openxmlformats.org/presentationml/2006/main">
+  <p:cSld>
+    <p:spTree>
+      <p:nvGrpSpPr>
+        <p:cNvPr id="1" name=""/>
+        <p:cNvGrpSpPr/>
+        <p:nvPr/>
+      </p:nvGrpSpPr>
+      <p:grpSpPr>
+        <a:xfrm>
+          <a:off x="0" y="0"/>
+          <a:ext cx="0" cy="0"/>
+          <a:chOff x="0" y="0"/>
+          <a:chExt cx="0" cy="0"/>
+        </a:xfrm>
+      </p:grpSpPr>
+      <p:sp>
+        <p:nvSpPr>
+          <p:cNvPr id="4" name="Rectangle: Rounded Corners 3">
+            <a:extLst>
+              <a:ext uri="{FF2B5EF4-FFF2-40B4-BE49-F238E27FC236}">
+                <a16:creationId xmlns:a16="http://schemas.microsoft.com/office/drawing/2014/main" id="{F697C020-4794-47E4-B14F-D062237DA5BC}"/>
+              </a:ext>
+            </a:extLst>
+          </p:cNvPr>
+          <p:cNvSpPr/>
+          <p:nvPr/>
+        </p:nvSpPr>
+        <p:spPr>
+          <a:xfrm>
+            <a:off x="4226560" y="568960"/>
+            <a:ext cx="3515360" cy="690880"/>
+          </a:xfrm>
+          <a:prstGeom prst="roundRect">
+            <a:avLst/>
+          </a:prstGeom>
+        </p:spPr>
+        <p:style>
+          <a:lnRef idx="1">
+            <a:schemeClr val="accent6"/>
+          </a:lnRef>
+          <a:fillRef idx="3">
+            <a:schemeClr val="accent6"/>
+          </a:fillRef>
+          <a:effectRef idx="2">
+            <a:schemeClr val="accent6"/>
+          </a:effectRef>
+          <a:fontRef idx="minor">
+            <a:schemeClr val="lt1"/>
+          </a:fontRef>
+        </p:style>
+        <p:txBody>
+          <a:bodyPr rtlCol="0" anchor="ctr"/>
+          <a:lstStyle/>
+          <a:p>
+            <a:pPr algn="ctr"/>
+            <a:r>
+              <a:rPr lang="en-US" dirty="0"/>
+              <a:t>Main repository, branch </a:t>
+            </a:r>
+            <a:r>
+              <a:rPr lang="en-US" b="1" dirty="0"/>
+              <a:t>develop</a:t>
+            </a:r>
+          </a:p>
+          <a:p>
+            <a:pPr algn="ctr"/>
+            <a:r>
+              <a:rPr lang="en-US" dirty="0"/>
+              <a:t>(github.com)</a:t>
+            </a:r>
+          </a:p>
+        </p:txBody>
+      </p:sp>
+      <p:sp>
+        <p:nvSpPr>
+          <p:cNvPr id="9" name="Rectangle: Rounded Corners 8">
+            <a:extLst>
+              <a:ext uri="{FF2B5EF4-FFF2-40B4-BE49-F238E27FC236}">
+                <a16:creationId xmlns:a16="http://schemas.microsoft.com/office/drawing/2014/main" id="{29680307-A9F2-4402-B9FD-23DA3BC5544A}"/>
+              </a:ext>
+            </a:extLst>
+          </p:cNvPr>
+          <p:cNvSpPr/>
+          <p:nvPr/>
+        </p:nvSpPr>
+        <p:spPr>
+          <a:xfrm>
+            <a:off x="4226560" y="3698236"/>
+            <a:ext cx="3515360" cy="690880"/>
+          </a:xfrm>
+          <a:prstGeom prst="roundRect">
+            <a:avLst/>
+          </a:prstGeom>
+        </p:spPr>
+        <p:style>
+          <a:lnRef idx="0">
+            <a:schemeClr val="accent2"/>
+          </a:lnRef>
+          <a:fillRef idx="3">
+            <a:schemeClr val="accent2"/>
+          </a:fillRef>
+          <a:effectRef idx="3">
+            <a:schemeClr val="accent2"/>
+          </a:effectRef>
+          <a:fontRef idx="minor">
+            <a:schemeClr val="lt1"/>
+          </a:fontRef>
+        </p:style>
+        <p:txBody>
+          <a:bodyPr rtlCol="0" anchor="ctr"/>
+          <a:lstStyle/>
+          <a:p>
+            <a:pPr algn="ctr"/>
+            <a:r>
+              <a:rPr lang="en-US" dirty="0"/>
+              <a:t>Local repository, branch </a:t>
+            </a:r>
+            <a:r>
+              <a:rPr lang="en-US" b="1" dirty="0"/>
+              <a:t>develop</a:t>
+            </a:r>
+          </a:p>
+          <a:p>
+            <a:pPr algn="ctr"/>
+            <a:r>
+              <a:rPr lang="en-US" dirty="0"/>
+              <a:t>(local computer)</a:t>
+            </a:r>
+          </a:p>
+        </p:txBody>
+      </p:sp>
+      <p:sp>
+        <p:nvSpPr>
+          <p:cNvPr id="12" name="Rectangle: Rounded Corners 11">
+            <a:extLst>
+              <a:ext uri="{FF2B5EF4-FFF2-40B4-BE49-F238E27FC236}">
+                <a16:creationId xmlns:a16="http://schemas.microsoft.com/office/drawing/2014/main" id="{8C9AB467-55CA-4EEF-9363-22CE9EBABB8E}"/>
+              </a:ext>
+            </a:extLst>
+          </p:cNvPr>
+          <p:cNvSpPr/>
+          <p:nvPr/>
+        </p:nvSpPr>
+        <p:spPr>
+          <a:xfrm>
+            <a:off x="4226560" y="5369557"/>
+            <a:ext cx="3515360" cy="690880"/>
+          </a:xfrm>
+          <a:prstGeom prst="roundRect">
+            <a:avLst/>
+          </a:prstGeom>
+        </p:spPr>
+        <p:style>
+          <a:lnRef idx="0">
+            <a:schemeClr val="accent4"/>
+          </a:lnRef>
+          <a:fillRef idx="3">
+            <a:schemeClr val="accent4"/>
+          </a:fillRef>
+          <a:effectRef idx="3">
+            <a:schemeClr val="accent4"/>
+          </a:effectRef>
+          <a:fontRef idx="minor">
+            <a:schemeClr val="lt1"/>
+          </a:fontRef>
+        </p:style>
+        <p:txBody>
+          <a:bodyPr rtlCol="0" anchor="ctr"/>
+          <a:lstStyle/>
+          <a:p>
+            <a:pPr algn="ctr"/>
+            <a:r>
+              <a:rPr lang="en-US" dirty="0"/>
+              <a:t>Working directory, branch </a:t>
+            </a:r>
+            <a:r>
+              <a:rPr lang="en-US" b="1" dirty="0"/>
+              <a:t>develop</a:t>
+            </a:r>
+          </a:p>
+          <a:p>
+            <a:pPr algn="ctr"/>
+            <a:r>
+              <a:rPr lang="en-US" dirty="0"/>
+              <a:t>(local computer)</a:t>
+            </a:r>
+          </a:p>
+        </p:txBody>
+      </p:sp>
+      <p:cxnSp>
+        <p:nvCxnSpPr>
+          <p:cNvPr id="18" name="Straight Arrow Connector 17">
+            <a:extLst>
+              <a:ext uri="{FF2B5EF4-FFF2-40B4-BE49-F238E27FC236}">
+                <a16:creationId xmlns:a16="http://schemas.microsoft.com/office/drawing/2014/main" id="{11FD1652-9ED9-43DD-A19A-55069D295275}"/>
+              </a:ext>
+            </a:extLst>
+          </p:cNvPr>
+          <p:cNvCxnSpPr>
+            <a:cxnSpLocks/>
+          </p:cNvCxnSpPr>
+          <p:nvPr/>
+        </p:nvCxnSpPr>
+        <p:spPr>
+          <a:xfrm>
+            <a:off x="5801360" y="1244606"/>
+            <a:ext cx="0" cy="2438396"/>
+          </a:xfrm>
+          <a:prstGeom prst="straightConnector1">
+            <a:avLst/>
+          </a:prstGeom>
+          <a:ln>
+            <a:tailEnd type="triangle"/>
+          </a:ln>
+        </p:spPr>
+        <p:style>
+          <a:lnRef idx="1">
+            <a:schemeClr val="accent1"/>
+          </a:lnRef>
+          <a:fillRef idx="0">
+            <a:schemeClr val="accent1"/>
+          </a:fillRef>
+          <a:effectRef idx="0">
+            <a:schemeClr val="accent1"/>
+          </a:effectRef>
+          <a:fontRef idx="minor">
+            <a:schemeClr val="tx1"/>
+          </a:fontRef>
+        </p:style>
+      </p:cxnSp>
+      <p:cxnSp>
+        <p:nvCxnSpPr>
+          <p:cNvPr id="50" name="Straight Arrow Connector 49">
+            <a:extLst>
+              <a:ext uri="{FF2B5EF4-FFF2-40B4-BE49-F238E27FC236}">
+                <a16:creationId xmlns:a16="http://schemas.microsoft.com/office/drawing/2014/main" id="{19843E4A-054B-4217-B9C4-A89ACCA72B2F}"/>
+              </a:ext>
+            </a:extLst>
+          </p:cNvPr>
+          <p:cNvCxnSpPr/>
+          <p:nvPr/>
+        </p:nvCxnSpPr>
+        <p:spPr>
+          <a:xfrm>
+            <a:off x="5801360" y="4389116"/>
+            <a:ext cx="0" cy="980441"/>
+          </a:xfrm>
+          <a:prstGeom prst="straightConnector1">
+            <a:avLst/>
+          </a:prstGeom>
+          <a:ln>
+            <a:tailEnd type="triangle"/>
+          </a:ln>
+        </p:spPr>
+        <p:style>
+          <a:lnRef idx="1">
+            <a:schemeClr val="accent1"/>
+          </a:lnRef>
+          <a:fillRef idx="0">
+            <a:schemeClr val="accent1"/>
+          </a:fillRef>
+          <a:effectRef idx="0">
+            <a:schemeClr val="accent1"/>
+          </a:effectRef>
+          <a:fontRef idx="minor">
+            <a:schemeClr val="tx1"/>
+          </a:fontRef>
+        </p:style>
+      </p:cxnSp>
+      <p:sp>
+        <p:nvSpPr>
+          <p:cNvPr id="56" name="TextBox 55">
+            <a:extLst>
+              <a:ext uri="{FF2B5EF4-FFF2-40B4-BE49-F238E27FC236}">
+                <a16:creationId xmlns:a16="http://schemas.microsoft.com/office/drawing/2014/main" id="{D98C9F07-B468-48B8-A2EC-CB4AA3433007}"/>
+              </a:ext>
+            </a:extLst>
+          </p:cNvPr>
+          <p:cNvSpPr txBox="1"/>
+          <p:nvPr/>
+        </p:nvSpPr>
+        <p:spPr>
+          <a:xfrm>
+            <a:off x="4501709" y="2463804"/>
+            <a:ext cx="1207382" cy="246221"/>
+          </a:xfrm>
+          <a:prstGeom prst="rect">
+            <a:avLst/>
+          </a:prstGeom>
+          <a:solidFill>
+            <a:schemeClr val="tx1">
+              <a:lumMod val="65000"/>
+              <a:lumOff val="35000"/>
+            </a:schemeClr>
+          </a:solidFill>
+        </p:spPr>
+        <p:txBody>
+          <a:bodyPr wrap="none" rtlCol="0">
+            <a:spAutoFit/>
+          </a:bodyPr>
+          <a:lstStyle/>
+          <a:p>
+            <a:r>
+              <a:rPr lang="en-US" sz="1000" dirty="0">
+                <a:solidFill>
+                  <a:schemeClr val="bg1"/>
+                </a:solidFill>
+              </a:rPr>
+              <a:t>git clone (first time)</a:t>
+            </a:r>
+          </a:p>
+        </p:txBody>
+      </p:sp>
+    </p:spTree>
+    <p:extLst>
+      <p:ext uri="{BB962C8B-B14F-4D97-AF65-F5344CB8AC3E}">
+        <p14:creationId xmlns:p14="http://schemas.microsoft.com/office/powerpoint/2010/main" val="1254696603"/>
+      </p:ext>
+    </p:extLst>
+  </p:cSld>
+  <p:clrMapOvr>
+    <a:masterClrMapping/>
+  </p:clrMapOvr>
+</p:sld>
+</file>
+
 <file path=ppt/theme/theme1.xml><?xml version="1.0" encoding="utf-8"?>
 <a:theme xmlns:a="http://schemas.openxmlformats.org/drawingml/2006/main" name="Office Theme">
   <a:themeElements>
@@ -6042,6 +9616,21 @@
 </file>
 
 <file path=customXml/item1.xml><?xml version="1.0" encoding="utf-8"?>
+<p:properties xmlns:p="http://schemas.microsoft.com/office/2006/metadata/properties" xmlns:xsi="http://www.w3.org/2001/XMLSchema-instance" xmlns:pc="http://schemas.microsoft.com/office/infopath/2007/PartnerControls">
+  <documentManagement/>
+</p:properties>
+</file>
+
+<file path=customXml/item2.xml><?xml version="1.0" encoding="utf-8"?>
+<?mso-contentType ?>
+<FormTemplates xmlns="http://schemas.microsoft.com/sharepoint/v3/contenttype/forms">
+  <Display>DocumentLibraryForm</Display>
+  <Edit>DocumentLibraryForm</Edit>
+  <New>DocumentLibraryForm</New>
+</FormTemplates>
+</file>
+
+<file path=customXml/item3.xml><?xml version="1.0" encoding="utf-8"?>
 <ct:contentTypeSchema xmlns:ct="http://schemas.microsoft.com/office/2006/metadata/contentType" xmlns:ma="http://schemas.microsoft.com/office/2006/metadata/properties/metaAttributes" ct:_="" ma:_="" ma:contentTypeName="Document" ma:contentTypeID="0x010100D3212D8B9F2A084F85A0C4B39973AD61" ma:contentTypeVersion="11" ma:contentTypeDescription="Create a new document." ma:contentTypeScope="" ma:versionID="e8e7a80e7e7a07c78961354e3e109049">
   <xsd:schema xmlns:xsd="http://www.w3.org/2001/XMLSchema" xmlns:xs="http://www.w3.org/2001/XMLSchema" xmlns:p="http://schemas.microsoft.com/office/2006/metadata/properties" xmlns:ns3="47a6c9ea-8ca1-4148-a51c-674433223c5e" xmlns:ns4="c1aa9305-1f6d-4921-a20c-6f8071a3d59e" targetNamespace="http://schemas.microsoft.com/office/2006/metadata/properties" ma:root="true" ma:fieldsID="51b059689a350970cae1069953ffd311" ns3:_="" ns4:_="">
     <xsd:import namespace="47a6c9ea-8ca1-4148-a51c-674433223c5e"/>
@@ -6250,22 +9839,32 @@
 </ct:contentTypeSchema>
 </file>
 
-<file path=customXml/item2.xml><?xml version="1.0" encoding="utf-8"?>
-<?mso-contentType ?>
-<FormTemplates xmlns="http://schemas.microsoft.com/sharepoint/v3/contenttype/forms">
-  <Display>DocumentLibraryForm</Display>
-  <Edit>DocumentLibraryForm</Edit>
-  <New>DocumentLibraryForm</New>
-</FormTemplates>
+<file path=customXml/itemProps1.xml><?xml version="1.0" encoding="utf-8"?>
+<ds:datastoreItem xmlns:ds="http://schemas.openxmlformats.org/officeDocument/2006/customXml" ds:itemID="{8BCD9C3B-1CF4-47B2-BEE4-25A4D571E42D}">
+  <ds:schemaRefs>
+    <ds:schemaRef ds:uri="http://purl.org/dc/elements/1.1/"/>
+    <ds:schemaRef ds:uri="http://schemas.microsoft.com/office/2006/documentManagement/types"/>
+    <ds:schemaRef ds:uri="http://purl.org/dc/terms/"/>
+    <ds:schemaRef ds:uri="http://schemas.openxmlformats.org/package/2006/metadata/core-properties"/>
+    <ds:schemaRef ds:uri="http://purl.org/dc/dcmitype/"/>
+    <ds:schemaRef ds:uri="http://schemas.microsoft.com/office/infopath/2007/PartnerControls"/>
+    <ds:schemaRef ds:uri="c1aa9305-1f6d-4921-a20c-6f8071a3d59e"/>
+    <ds:schemaRef ds:uri="47a6c9ea-8ca1-4148-a51c-674433223c5e"/>
+    <ds:schemaRef ds:uri="http://schemas.microsoft.com/office/2006/metadata/properties"/>
+    <ds:schemaRef ds:uri="http://www.w3.org/XML/1998/namespace"/>
+  </ds:schemaRefs>
+</ds:datastoreItem>
 </file>
 
-<file path=customXml/item3.xml><?xml version="1.0" encoding="utf-8"?>
-<p:properties xmlns:p="http://schemas.microsoft.com/office/2006/metadata/properties" xmlns:xsi="http://www.w3.org/2001/XMLSchema-instance" xmlns:pc="http://schemas.microsoft.com/office/infopath/2007/PartnerControls">
-  <documentManagement/>
-</p:properties>
+<file path=customXml/itemProps2.xml><?xml version="1.0" encoding="utf-8"?>
+<ds:datastoreItem xmlns:ds="http://schemas.openxmlformats.org/officeDocument/2006/customXml" ds:itemID="{997DA7E4-3EBF-41EA-8FCF-E4EB2DED9A66}">
+  <ds:schemaRefs>
+    <ds:schemaRef ds:uri="http://schemas.microsoft.com/sharepoint/v3/contenttype/forms"/>
+  </ds:schemaRefs>
+</ds:datastoreItem>
 </file>
 
-<file path=customXml/itemProps1.xml><?xml version="1.0" encoding="utf-8"?>
+<file path=customXml/itemProps3.xml><?xml version="1.0" encoding="utf-8"?>
 <ds:datastoreItem xmlns:ds="http://schemas.openxmlformats.org/officeDocument/2006/customXml" ds:itemID="{06BE6F58-EA36-4DEF-8916-461BA3390375}">
   <ds:schemaRefs>
     <ds:schemaRef ds:uri="http://schemas.microsoft.com/office/2006/metadata/contentType"/>
@@ -6282,29 +9881,4 @@
     <ds:schemaRef ds:uri="http://schemas.microsoft.com/internal/obd"/>
   </ds:schemaRefs>
 </ds:datastoreItem>
-</file>
-
-<file path=customXml/itemProps2.xml><?xml version="1.0" encoding="utf-8"?>
-<ds:datastoreItem xmlns:ds="http://schemas.openxmlformats.org/officeDocument/2006/customXml" ds:itemID="{997DA7E4-3EBF-41EA-8FCF-E4EB2DED9A66}">
-  <ds:schemaRefs>
-    <ds:schemaRef ds:uri="http://schemas.microsoft.com/sharepoint/v3/contenttype/forms"/>
-  </ds:schemaRefs>
-</ds:datastoreItem>
-</file>
-
-<file path=customXml/itemProps3.xml><?xml version="1.0" encoding="utf-8"?>
-<ds:datastoreItem xmlns:ds="http://schemas.openxmlformats.org/officeDocument/2006/customXml" ds:itemID="{8BCD9C3B-1CF4-47B2-BEE4-25A4D571E42D}">
-  <ds:schemaRefs>
-    <ds:schemaRef ds:uri="http://purl.org/dc/elements/1.1/"/>
-    <ds:schemaRef ds:uri="http://schemas.microsoft.com/office/2006/metadata/properties"/>
-    <ds:schemaRef ds:uri="http://purl.org/dc/terms/"/>
-    <ds:schemaRef ds:uri="http://schemas.openxmlformats.org/package/2006/metadata/core-properties"/>
-    <ds:schemaRef ds:uri="http://schemas.microsoft.com/office/infopath/2007/PartnerControls"/>
-    <ds:schemaRef ds:uri="http://schemas.microsoft.com/office/2006/documentManagement/types"/>
-    <ds:schemaRef ds:uri="c1aa9305-1f6d-4921-a20c-6f8071a3d59e"/>
-    <ds:schemaRef ds:uri="47a6c9ea-8ca1-4148-a51c-674433223c5e"/>
-    <ds:schemaRef ds:uri="http://www.w3.org/XML/1998/namespace"/>
-    <ds:schemaRef ds:uri="http://purl.org/dc/dcmitype/"/>
-  </ds:schemaRefs>
-</ds:datastoreItem>
 </file>
</xml_diff>